<commit_message>
Updated version from Alex.
</commit_message>
<xml_diff>
--- a/2015_DOE_Review/SuperBigBite DAQ update-Oct-20-2015.pptx
+++ b/2015_DOE_Review/SuperBigBite DAQ update-Oct-20-2015.pptx
@@ -5311,22 +5311,22 @@
         </p:spPr>
         <p:txBody>
           <a:bodyPr>
-            <a:normAutofit fontScale="90000"/>
+            <a:noAutofit/>
           </a:bodyPr>
           <a:lstStyle/>
           <a:p>
             <a:r>
-              <a:rPr lang="en-US" dirty="0" smtClean="0"/>
+              <a:rPr lang="en-US" sz="3600" dirty="0" smtClean="0"/>
               <a:t>Readout trigger rate ~ 5kHz, Buffer Level = 4,</a:t>
             </a:r>
             <a:br>
-              <a:rPr lang="en-US" dirty="0" smtClean="0"/>
+              <a:rPr lang="en-US" sz="3600" dirty="0" smtClean="0"/>
             </a:br>
             <a:r>
-              <a:rPr lang="en-US" dirty="0" smtClean="0"/>
+              <a:rPr lang="en-US" sz="3600" dirty="0" smtClean="0"/>
               <a:t>No pedestal suppression (8ADC)</a:t>
             </a:r>
-            <a:endParaRPr lang="en-US" dirty="0"/>
+            <a:endParaRPr lang="en-US" sz="3600" dirty="0"/>
           </a:p>
         </p:txBody>
       </p:sp>
@@ -6131,13 +6131,8 @@
             </a:pPr>
             <a:r>
               <a:rPr lang="en-US" dirty="0" smtClean="0"/>
-              <a:t>Sends time frame </a:t>
-            </a:r>
-            <a:r>
-              <a:rPr lang="en-US" dirty="0" smtClean="0"/>
-              <a:t>info</a:t>
-            </a:r>
-            <a:endParaRPr lang="en-US" dirty="0" smtClean="0"/>
+              <a:t>Sends time frame info</a:t>
+            </a:r>
           </a:p>
         </p:txBody>
       </p:sp>
@@ -6431,8 +6426,56 @@
           <a:p>
             <a:r>
               <a:rPr lang="en-US" dirty="0" smtClean="0"/>
-              <a:t>HPS firmware  installed on  FADC and GTP</a:t>
-            </a:r>
+              <a:t>HPS firmware  installed on  FADC and </a:t>
+            </a:r>
+            <a:r>
+              <a:rPr lang="en-US" dirty="0" smtClean="0"/>
+              <a:t>GTP</a:t>
+            </a:r>
+          </a:p>
+          <a:p>
+            <a:r>
+              <a:rPr lang="en-US" dirty="0" smtClean="0"/>
+              <a:t>FADC readout tested with </a:t>
+            </a:r>
+            <a:r>
+              <a:rPr lang="en-US" dirty="0" err="1" smtClean="0"/>
+              <a:t>cosmics</a:t>
+            </a:r>
+            <a:endParaRPr lang="en-US" dirty="0" smtClean="0"/>
+          </a:p>
+          <a:p>
+            <a:r>
+              <a:rPr lang="en-US" dirty="0" smtClean="0"/>
+              <a:t>Testing triggering capability</a:t>
+            </a:r>
+          </a:p>
+          <a:p>
+            <a:endParaRPr lang="en-US" dirty="0"/>
+          </a:p>
+          <a:p>
+            <a:r>
+              <a:rPr lang="en-US" dirty="0" smtClean="0"/>
+              <a:t>Need</a:t>
+            </a:r>
+          </a:p>
+          <a:p>
+            <a:pPr lvl="1"/>
+            <a:r>
+              <a:rPr lang="en-US" dirty="0" smtClean="0"/>
+              <a:t>implement decoder for analysis</a:t>
+            </a:r>
+          </a:p>
+          <a:p>
+            <a:pPr lvl="1"/>
+            <a:r>
+              <a:rPr lang="en-US" dirty="0" smtClean="0"/>
+              <a:t>Test using 2 crates and new VTP</a:t>
+            </a:r>
+            <a:endParaRPr lang="en-US" dirty="0" smtClean="0"/>
+          </a:p>
+          <a:p>
+            <a:endParaRPr lang="en-US" dirty="0" smtClean="0"/>
           </a:p>
           <a:p>
             <a:endParaRPr lang="en-US" dirty="0"/>
@@ -6651,9 +6694,16 @@
             <p:ph idx="1"/>
           </p:nvPr>
         </p:nvSpPr>
-        <p:spPr/>
-        <p:txBody>
-          <a:bodyPr/>
+        <p:spPr>
+          <a:xfrm>
+            <a:off x="457200" y="1600200"/>
+            <a:ext cx="3276600" cy="5029200"/>
+          </a:xfrm>
+        </p:spPr>
+        <p:txBody>
+          <a:bodyPr>
+            <a:normAutofit fontScale="92500"/>
+          </a:bodyPr>
           <a:lstStyle/>
           <a:p>
             <a:r>
@@ -6664,12 +6714,45 @@
           <a:p>
             <a:r>
               <a:rPr lang="en-US" dirty="0" smtClean="0"/>
-              <a:t>Maybe issue with communication with APV being investigated </a:t>
-            </a:r>
-            <a:endParaRPr lang="en-US" dirty="0"/>
-          </a:p>
-        </p:txBody>
-      </p:sp>
+              <a:t>Data structure looks fine but no data from APV</a:t>
+            </a:r>
+            <a:r>
+              <a:rPr lang="en-US" dirty="0" smtClean="0"/>
+              <a:t>  </a:t>
+            </a:r>
+          </a:p>
+          <a:p>
+            <a:r>
+              <a:rPr lang="en-US" dirty="0" smtClean="0"/>
+              <a:t>Maybe issue with communication with APV (I2C timing ) being investigated</a:t>
+            </a:r>
+          </a:p>
+        </p:txBody>
+      </p:sp>
+      <p:pic>
+        <p:nvPicPr>
+          <p:cNvPr id="4" name="Picture 3"/>
+          <p:cNvPicPr>
+            <a:picLocks noChangeAspect="1"/>
+          </p:cNvPicPr>
+          <p:nvPr/>
+        </p:nvPicPr>
+        <p:blipFill>
+          <a:blip r:embed="rId2"/>
+          <a:stretch>
+            <a:fillRect/>
+          </a:stretch>
+        </p:blipFill>
+        <p:spPr>
+          <a:xfrm>
+            <a:off x="3657600" y="1752600"/>
+            <a:ext cx="5486400" cy="3395828"/>
+          </a:xfrm>
+          <a:prstGeom prst="rect">
+            <a:avLst/>
+          </a:prstGeom>
+        </p:spPr>
+      </p:pic>
     </p:spTree>
     <p:extLst>
       <p:ext uri="{BB962C8B-B14F-4D97-AF65-F5344CB8AC3E}">
@@ -6735,13 +6818,44 @@
         </p:nvSpPr>
         <p:spPr/>
         <p:txBody>
-          <a:bodyPr/>
+          <a:bodyPr>
+            <a:normAutofit fontScale="92500" lnSpcReduction="10000"/>
+          </a:bodyPr>
           <a:lstStyle/>
           <a:p>
             <a:r>
               <a:rPr lang="en-US" dirty="0" smtClean="0"/>
-              <a:t>Aurora protocol based</a:t>
-            </a:r>
+              <a:t>Aurora protocol </a:t>
+            </a:r>
+            <a:r>
+              <a:rPr lang="en-US" dirty="0" smtClean="0"/>
+              <a:t>based</a:t>
+            </a:r>
+          </a:p>
+          <a:p>
+            <a:r>
+              <a:rPr lang="en-US" dirty="0"/>
+              <a:t>2</a:t>
+            </a:r>
+            <a:r>
+              <a:rPr lang="en-US" dirty="0" smtClean="0"/>
+              <a:t> </a:t>
+            </a:r>
+            <a:r>
+              <a:rPr lang="en-US" dirty="0" err="1" smtClean="0"/>
+              <a:t>Gbit</a:t>
+            </a:r>
+            <a:r>
+              <a:rPr lang="en-US" dirty="0" smtClean="0"/>
+              <a:t> optical link : 250 MB/s per link</a:t>
+            </a:r>
+          </a:p>
+          <a:p>
+            <a:r>
+              <a:rPr lang="en-US" dirty="0" smtClean="0"/>
+              <a:t>Readout up to 32 MPD in parallel : 8 GB/s bandwidth compared to 100 MB/s using VME</a:t>
+            </a:r>
+            <a:endParaRPr lang="en-US" dirty="0" smtClean="0"/>
           </a:p>
           <a:p>
             <a:r>
@@ -6752,11 +6866,7 @@
           <a:p>
             <a:r>
               <a:rPr lang="en-US" dirty="0" smtClean="0"/>
-              <a:t>Link from MPD to </a:t>
-            </a:r>
-            <a:r>
-              <a:rPr lang="en-US" dirty="0" smtClean="0"/>
-              <a:t>SSP module working from Ben </a:t>
+              <a:t>Link from MPD to SSP module working from Ben </a:t>
             </a:r>
             <a:r>
               <a:rPr lang="en-US" dirty="0" err="1" smtClean="0"/>
@@ -6787,6 +6897,13 @@
   <p:clrMapOvr>
     <a:masterClrMapping/>
   </p:clrMapOvr>
+  <p:timing>
+    <p:tnLst>
+      <p:par>
+        <p:cTn id="1" dur="indefinite" restart="never" nodeType="tmRoot"/>
+      </p:par>
+    </p:tnLst>
+  </p:timing>
 </p:sld>
 </file>
 
@@ -6817,7 +6934,12 @@
             <p:ph type="title"/>
           </p:nvPr>
         </p:nvSpPr>
-        <p:spPr/>
+        <p:spPr>
+          <a:xfrm>
+            <a:off x="495300" y="-26042"/>
+            <a:ext cx="8229600" cy="1143000"/>
+          </a:xfrm>
+        </p:spPr>
         <p:txBody>
           <a:bodyPr/>
           <a:lstStyle/>
@@ -6830,25 +6952,592 @@
           </a:p>
         </p:txBody>
       </p:sp>
-      <p:sp>
-        <p:nvSpPr>
-          <p:cNvPr id="3" name="Content Placeholder 2"/>
-          <p:cNvSpPr>
-            <a:spLocks noGrp="1"/>
-          </p:cNvSpPr>
+      <p:graphicFrame>
+        <p:nvGraphicFramePr>
+          <p:cNvPr id="4" name="Content Placeholder 3"/>
+          <p:cNvGraphicFramePr>
+            <a:graphicFrameLocks noGrp="1"/>
+          </p:cNvGraphicFramePr>
           <p:nvPr>
             <p:ph idx="1"/>
+            <p:extLst>
+              <p:ext uri="{D42A27DB-BD31-4B8C-83A1-F6EECF244321}">
+                <p14:modId xmlns:p14="http://schemas.microsoft.com/office/powerpoint/2010/main" val="383598450"/>
+              </p:ext>
+            </p:extLst>
           </p:nvPr>
-        </p:nvSpPr>
-        <p:spPr/>
-        <p:txBody>
-          <a:bodyPr/>
-          <a:lstStyle/>
-          <a:p>
-            <a:endParaRPr lang="en-US" dirty="0"/>
-          </a:p>
-        </p:txBody>
-      </p:sp>
+        </p:nvGraphicFramePr>
+        <p:xfrm>
+          <a:off x="304800" y="868681"/>
+          <a:ext cx="8763000" cy="5989319"/>
+        </p:xfrm>
+        <a:graphic>
+          <a:graphicData uri="http://schemas.openxmlformats.org/drawingml/2006/table">
+            <a:tbl>
+              <a:tblPr firstRow="1" bandRow="1">
+                <a:tableStyleId>{5C22544A-7EE6-4342-B048-85BDC9FD1C3A}</a:tableStyleId>
+              </a:tblPr>
+              <a:tblGrid>
+                <a:gridCol w="2190750">
+                  <a:extLst>
+                    <a:ext uri="{9D8B030D-6E8A-4147-A177-3AD203B41FA5}">
+                      <a16:colId xmlns:a16="http://schemas.microsoft.com/office/drawing/2014/main" val="2383147881"/>
+                    </a:ext>
+                  </a:extLst>
+                </a:gridCol>
+                <a:gridCol w="2190750">
+                  <a:extLst>
+                    <a:ext uri="{9D8B030D-6E8A-4147-A177-3AD203B41FA5}">
+                      <a16:colId xmlns:a16="http://schemas.microsoft.com/office/drawing/2014/main" val="3539225061"/>
+                    </a:ext>
+                  </a:extLst>
+                </a:gridCol>
+                <a:gridCol w="2190750">
+                  <a:extLst>
+                    <a:ext uri="{9D8B030D-6E8A-4147-A177-3AD203B41FA5}">
+                      <a16:colId xmlns:a16="http://schemas.microsoft.com/office/drawing/2014/main" val="449586720"/>
+                    </a:ext>
+                  </a:extLst>
+                </a:gridCol>
+                <a:gridCol w="2190750">
+                  <a:extLst>
+                    <a:ext uri="{9D8B030D-6E8A-4147-A177-3AD203B41FA5}">
+                      <a16:colId xmlns:a16="http://schemas.microsoft.com/office/drawing/2014/main" val="3861353694"/>
+                    </a:ext>
+                  </a:extLst>
+                </a:gridCol>
+              </a:tblGrid>
+              <a:tr h="685799">
+                <a:tc>
+                  <a:txBody>
+                    <a:bodyPr/>
+                    <a:lstStyle/>
+                    <a:p>
+                      <a:pPr algn="ctr"/>
+                      <a:r>
+                        <a:rPr lang="en-US" dirty="0" smtClean="0"/>
+                        <a:t>4</a:t>
+                      </a:r>
+                      <a:r>
+                        <a:rPr lang="en-US" baseline="30000" dirty="0" smtClean="0"/>
+                        <a:t>th</a:t>
+                      </a:r>
+                      <a:r>
+                        <a:rPr lang="en-US" baseline="0" dirty="0" smtClean="0"/>
+                        <a:t> quarter 2015</a:t>
+                      </a:r>
+                      <a:endParaRPr lang="en-US" dirty="0"/>
+                    </a:p>
+                  </a:txBody>
+                  <a:tcPr/>
+                </a:tc>
+                <a:tc>
+                  <a:txBody>
+                    <a:bodyPr/>
+                    <a:lstStyle/>
+                    <a:p>
+                      <a:pPr algn="ctr"/>
+                      <a:r>
+                        <a:rPr lang="en-US" dirty="0" smtClean="0"/>
+                        <a:t>1</a:t>
+                      </a:r>
+                      <a:r>
+                        <a:rPr lang="en-US" baseline="30000" dirty="0" smtClean="0"/>
+                        <a:t>st</a:t>
+                      </a:r>
+                      <a:r>
+                        <a:rPr lang="en-US" baseline="0" dirty="0" smtClean="0"/>
+                        <a:t> quarter 2016</a:t>
+                      </a:r>
+                      <a:endParaRPr lang="en-US" dirty="0"/>
+                    </a:p>
+                  </a:txBody>
+                  <a:tcPr/>
+                </a:tc>
+                <a:tc>
+                  <a:txBody>
+                    <a:bodyPr/>
+                    <a:lstStyle/>
+                    <a:p>
+                      <a:pPr marL="0" marR="0" indent="0" algn="ctr" defTabSz="914400" rtl="0" eaLnBrk="1" fontAlgn="auto" latinLnBrk="0" hangingPunct="1">
+                        <a:lnSpc>
+                          <a:spcPct val="100000"/>
+                        </a:lnSpc>
+                        <a:spcBef>
+                          <a:spcPts val="0"/>
+                        </a:spcBef>
+                        <a:spcAft>
+                          <a:spcPts val="0"/>
+                        </a:spcAft>
+                        <a:buClrTx/>
+                        <a:buSzTx/>
+                        <a:buFontTx/>
+                        <a:buNone/>
+                        <a:tabLst/>
+                        <a:defRPr/>
+                      </a:pPr>
+                      <a:r>
+                        <a:rPr lang="en-US" baseline="0" dirty="0" smtClean="0"/>
+                        <a:t>2</a:t>
+                      </a:r>
+                      <a:r>
+                        <a:rPr lang="en-US" baseline="30000" dirty="0" smtClean="0"/>
+                        <a:t>st</a:t>
+                      </a:r>
+                      <a:r>
+                        <a:rPr lang="en-US" baseline="0" dirty="0" smtClean="0"/>
+                        <a:t> quarter 2016</a:t>
+                      </a:r>
+                      <a:endParaRPr lang="en-US" dirty="0" smtClean="0"/>
+                    </a:p>
+                    <a:p>
+                      <a:pPr algn="ctr"/>
+                      <a:endParaRPr lang="en-US" dirty="0"/>
+                    </a:p>
+                  </a:txBody>
+                  <a:tcPr/>
+                </a:tc>
+                <a:tc>
+                  <a:txBody>
+                    <a:bodyPr/>
+                    <a:lstStyle/>
+                    <a:p>
+                      <a:pPr marL="0" marR="0" indent="0" algn="ctr" defTabSz="914400" rtl="0" eaLnBrk="1" fontAlgn="auto" latinLnBrk="0" hangingPunct="1">
+                        <a:lnSpc>
+                          <a:spcPct val="100000"/>
+                        </a:lnSpc>
+                        <a:spcBef>
+                          <a:spcPts val="0"/>
+                        </a:spcBef>
+                        <a:spcAft>
+                          <a:spcPts val="0"/>
+                        </a:spcAft>
+                        <a:buClrTx/>
+                        <a:buSzTx/>
+                        <a:buFontTx/>
+                        <a:buNone/>
+                        <a:tabLst/>
+                        <a:defRPr/>
+                      </a:pPr>
+                      <a:r>
+                        <a:rPr lang="en-US" baseline="0" dirty="0" smtClean="0"/>
+                        <a:t>3</a:t>
+                      </a:r>
+                      <a:r>
+                        <a:rPr lang="en-US" baseline="30000" dirty="0" smtClean="0"/>
+                        <a:t>rd</a:t>
+                      </a:r>
+                      <a:r>
+                        <a:rPr lang="en-US" baseline="0" dirty="0" smtClean="0"/>
+                        <a:t> quarter 2016</a:t>
+                      </a:r>
+                      <a:endParaRPr lang="en-US" dirty="0" smtClean="0"/>
+                    </a:p>
+                    <a:p>
+                      <a:pPr algn="ctr"/>
+                      <a:endParaRPr lang="en-US" dirty="0"/>
+                    </a:p>
+                  </a:txBody>
+                  <a:tcPr/>
+                </a:tc>
+                <a:extLst>
+                  <a:ext uri="{0D108BD9-81ED-4DB2-BD59-A6C34878D82A}">
+                    <a16:rowId xmlns:a16="http://schemas.microsoft.com/office/drawing/2014/main" val="660863743"/>
+                  </a:ext>
+                </a:extLst>
+              </a:tr>
+              <a:tr h="4325836">
+                <a:tc>
+                  <a:txBody>
+                    <a:bodyPr/>
+                    <a:lstStyle/>
+                    <a:p>
+                      <a:pPr marL="285750" indent="-285750" algn="ctr">
+                        <a:buFont typeface="Arial" panose="020B0604020202020204" pitchFamily="34" charset="0"/>
+                        <a:buChar char="•"/>
+                      </a:pPr>
+                      <a:r>
+                        <a:rPr lang="en-US" dirty="0" smtClean="0"/>
+                        <a:t>Finish MPD CODA readout debugging</a:t>
+                      </a:r>
+                    </a:p>
+                    <a:p>
+                      <a:pPr marL="285750" indent="-285750" algn="ctr">
+                        <a:buFont typeface="Arial" panose="020B0604020202020204" pitchFamily="34" charset="0"/>
+                        <a:buChar char="•"/>
+                      </a:pPr>
+                      <a:r>
+                        <a:rPr lang="en-US" dirty="0" smtClean="0"/>
+                        <a:t>Finish </a:t>
+                      </a:r>
+                      <a:r>
+                        <a:rPr lang="en-US" dirty="0" err="1" smtClean="0"/>
+                        <a:t>Fastbus</a:t>
+                      </a:r>
+                      <a:r>
+                        <a:rPr lang="en-US" dirty="0" smtClean="0"/>
+                        <a:t> Readout debugging</a:t>
+                      </a:r>
+                    </a:p>
+                    <a:p>
+                      <a:pPr marL="285750" indent="-285750" algn="ctr">
+                        <a:buFont typeface="Arial" panose="020B0604020202020204" pitchFamily="34" charset="0"/>
+                        <a:buChar char="•"/>
+                      </a:pPr>
+                      <a:r>
+                        <a:rPr lang="en-US" dirty="0" smtClean="0"/>
+                        <a:t>Small scale setup</a:t>
+                      </a:r>
+                    </a:p>
+                    <a:p>
+                      <a:pPr algn="ctr"/>
+                      <a:r>
+                        <a:rPr lang="en-US" dirty="0" smtClean="0"/>
+                        <a:t>Test 200 KHz L1 and 5 KHz coincidence with </a:t>
+                      </a:r>
+                      <a:r>
+                        <a:rPr lang="en-US" dirty="0" err="1" smtClean="0"/>
+                        <a:t>Fastbus</a:t>
+                      </a:r>
+                      <a:r>
+                        <a:rPr lang="en-US" dirty="0" smtClean="0"/>
+                        <a:t>, MPD and HCAL FADC</a:t>
+                      </a:r>
+                    </a:p>
+                    <a:p>
+                      <a:pPr marL="285750" indent="-285750" algn="ctr">
+                        <a:buFont typeface="Arial" panose="020B0604020202020204" pitchFamily="34" charset="0"/>
+                        <a:buChar char="•"/>
+                      </a:pPr>
+                      <a:r>
+                        <a:rPr lang="en-US" dirty="0" err="1" smtClean="0"/>
+                        <a:t>Cdet</a:t>
+                      </a:r>
+                      <a:r>
+                        <a:rPr lang="en-US" dirty="0" smtClean="0"/>
+                        <a:t> </a:t>
+                      </a:r>
+                      <a:r>
+                        <a:rPr lang="en-US" dirty="0" err="1" smtClean="0"/>
+                        <a:t>Fastbus</a:t>
+                      </a:r>
+                      <a:endParaRPr lang="en-US" dirty="0" smtClean="0"/>
+                    </a:p>
+                    <a:p>
+                      <a:pPr marL="285750" indent="-285750" algn="ctr">
+                        <a:buFont typeface="Arial" panose="020B0604020202020204" pitchFamily="34" charset="0"/>
+                        <a:buChar char="•"/>
+                      </a:pPr>
+                      <a:r>
+                        <a:rPr lang="en-US" dirty="0" smtClean="0"/>
+                        <a:t>Analysis software : check</a:t>
+                      </a:r>
+                      <a:r>
+                        <a:rPr lang="en-US" baseline="0" dirty="0" smtClean="0"/>
+                        <a:t> </a:t>
+                      </a:r>
+                      <a:r>
+                        <a:rPr lang="en-US" dirty="0" smtClean="0"/>
+                        <a:t>synchronization</a:t>
+                      </a:r>
+                    </a:p>
+                    <a:p>
+                      <a:pPr marL="285750" indent="-285750" algn="ctr">
+                        <a:buFont typeface="Arial" panose="020B0604020202020204" pitchFamily="34" charset="0"/>
+                        <a:buChar char="•"/>
+                      </a:pPr>
+                      <a:r>
+                        <a:rPr lang="en-US" dirty="0" smtClean="0"/>
+                        <a:t>Test MPD optical readout</a:t>
+                      </a:r>
+                    </a:p>
+                    <a:p>
+                      <a:pPr marL="285750" indent="-285750" algn="ctr">
+                        <a:buFont typeface="Arial" panose="020B0604020202020204" pitchFamily="34" charset="0"/>
+                        <a:buChar char="•"/>
+                      </a:pPr>
+                      <a:r>
+                        <a:rPr lang="en-US" dirty="0" smtClean="0"/>
+                        <a:t>HCAL</a:t>
+                      </a:r>
+                      <a:r>
+                        <a:rPr lang="en-US" baseline="0" dirty="0" smtClean="0"/>
+                        <a:t> trigger ordered</a:t>
+                      </a:r>
+                      <a:endParaRPr lang="en-US" dirty="0"/>
+                    </a:p>
+                  </a:txBody>
+                  <a:tcPr/>
+                </a:tc>
+                <a:tc>
+                  <a:txBody>
+                    <a:bodyPr/>
+                    <a:lstStyle/>
+                    <a:p>
+                      <a:pPr marL="285750" indent="-285750" algn="ctr">
+                        <a:buFont typeface="Arial" panose="020B0604020202020204" pitchFamily="34" charset="0"/>
+                        <a:buChar char="•"/>
+                      </a:pPr>
+                      <a:r>
+                        <a:rPr lang="en-US" dirty="0" smtClean="0"/>
+                        <a:t>Implement new HCAL Trigger module</a:t>
+                      </a:r>
+                    </a:p>
+                    <a:p>
+                      <a:pPr marL="285750" indent="-285750" algn="ctr">
+                        <a:buFont typeface="Arial" panose="020B0604020202020204" pitchFamily="34" charset="0"/>
+                        <a:buChar char="•"/>
+                      </a:pPr>
+                      <a:r>
+                        <a:rPr lang="en-US" dirty="0" smtClean="0"/>
+                        <a:t>HCAL </a:t>
+                      </a:r>
+                      <a:r>
+                        <a:rPr lang="en-US" dirty="0" err="1" smtClean="0"/>
+                        <a:t>cosmics</a:t>
+                      </a:r>
+                      <a:endParaRPr lang="en-US" dirty="0" smtClean="0"/>
+                    </a:p>
+                    <a:p>
+                      <a:pPr marL="285750" indent="-285750" algn="ctr">
+                        <a:buFont typeface="Arial" panose="020B0604020202020204" pitchFamily="34" charset="0"/>
+                        <a:buChar char="•"/>
+                      </a:pPr>
+                      <a:r>
+                        <a:rPr lang="en-US" dirty="0" smtClean="0"/>
+                        <a:t>GEM</a:t>
+                      </a:r>
+                      <a:r>
+                        <a:rPr lang="en-US" baseline="0" dirty="0" smtClean="0"/>
+                        <a:t> </a:t>
+                      </a:r>
+                      <a:r>
+                        <a:rPr lang="en-US" baseline="0" dirty="0" err="1" smtClean="0"/>
+                        <a:t>cosmics</a:t>
+                      </a:r>
+                      <a:r>
+                        <a:rPr lang="en-US" baseline="0" dirty="0" smtClean="0"/>
+                        <a:t> with MPD</a:t>
+                      </a:r>
+                    </a:p>
+                    <a:p>
+                      <a:pPr marL="285750" indent="-285750" algn="ctr">
+                        <a:buFont typeface="Arial" panose="020B0604020202020204" pitchFamily="34" charset="0"/>
+                        <a:buChar char="•"/>
+                      </a:pPr>
+                      <a:endParaRPr lang="en-US" baseline="0" dirty="0" smtClean="0"/>
+                    </a:p>
+                    <a:p>
+                      <a:pPr marL="285750" indent="-285750" algn="ctr">
+                        <a:buFont typeface="Arial" panose="020B0604020202020204" pitchFamily="34" charset="0"/>
+                        <a:buChar char="•"/>
+                      </a:pPr>
+                      <a:r>
+                        <a:rPr lang="en-US" baseline="0" dirty="0" smtClean="0"/>
+                        <a:t>Test GEM readout with optical link in high background at UVA</a:t>
+                      </a:r>
+                    </a:p>
+                    <a:p>
+                      <a:pPr marL="285750" indent="-285750" algn="ctr">
+                        <a:buFont typeface="Arial" panose="020B0604020202020204" pitchFamily="34" charset="0"/>
+                        <a:buChar char="•"/>
+                      </a:pPr>
+                      <a:r>
+                        <a:rPr lang="en-US" baseline="0" dirty="0" smtClean="0"/>
+                        <a:t>Develop GEM analysis software</a:t>
+                      </a:r>
+                    </a:p>
+                    <a:p>
+                      <a:pPr algn="ctr"/>
+                      <a:endParaRPr lang="en-US" baseline="0" dirty="0" smtClean="0"/>
+                    </a:p>
+                    <a:p>
+                      <a:pPr algn="ctr"/>
+                      <a:endParaRPr lang="en-US" baseline="0" dirty="0" smtClean="0"/>
+                    </a:p>
+                    <a:p>
+                      <a:pPr algn="ctr"/>
+                      <a:endParaRPr lang="en-US" baseline="0" dirty="0" smtClean="0"/>
+                    </a:p>
+                    <a:p>
+                      <a:pPr algn="ctr"/>
+                      <a:endParaRPr lang="en-US" dirty="0"/>
+                    </a:p>
+                  </a:txBody>
+                  <a:tcPr/>
+                </a:tc>
+                <a:tc>
+                  <a:txBody>
+                    <a:bodyPr/>
+                    <a:lstStyle/>
+                    <a:p>
+                      <a:pPr marL="285750" marR="0" indent="-285750" algn="ctr" defTabSz="914400" rtl="0" eaLnBrk="1" fontAlgn="auto" latinLnBrk="0" hangingPunct="1">
+                        <a:lnSpc>
+                          <a:spcPct val="100000"/>
+                        </a:lnSpc>
+                        <a:spcBef>
+                          <a:spcPts val="0"/>
+                        </a:spcBef>
+                        <a:spcAft>
+                          <a:spcPts val="0"/>
+                        </a:spcAft>
+                        <a:buClrTx/>
+                        <a:buSzTx/>
+                        <a:buFont typeface="Arial" panose="020B0604020202020204" pitchFamily="34" charset="0"/>
+                        <a:buChar char="•"/>
+                        <a:tabLst/>
+                        <a:defRPr/>
+                      </a:pPr>
+                      <a:r>
+                        <a:rPr lang="en-US" dirty="0" smtClean="0"/>
+                        <a:t>GEM installed on </a:t>
+                      </a:r>
+                      <a:r>
+                        <a:rPr lang="en-US" dirty="0" err="1" smtClean="0"/>
+                        <a:t>BigBite</a:t>
+                      </a:r>
+                      <a:r>
+                        <a:rPr lang="en-US" baseline="0" dirty="0" smtClean="0"/>
+                        <a:t> for tritium experiment</a:t>
+                      </a:r>
+                      <a:endParaRPr lang="en-US" dirty="0" smtClean="0"/>
+                    </a:p>
+                    <a:p>
+                      <a:pPr algn="ctr"/>
+                      <a:endParaRPr lang="en-US" dirty="0" smtClean="0"/>
+                    </a:p>
+                    <a:p>
+                      <a:pPr marL="285750" indent="-285750" algn="ctr">
+                        <a:buFont typeface="Arial" panose="020B0604020202020204" pitchFamily="34" charset="0"/>
+                        <a:buChar char="•"/>
+                      </a:pPr>
+                      <a:r>
+                        <a:rPr lang="en-US" dirty="0" err="1" smtClean="0"/>
+                        <a:t>ECal</a:t>
+                      </a:r>
+                      <a:r>
+                        <a:rPr lang="en-US" dirty="0" smtClean="0"/>
+                        <a:t> </a:t>
+                      </a:r>
+                      <a:r>
+                        <a:rPr lang="en-US" dirty="0" err="1" smtClean="0"/>
+                        <a:t>cosmics</a:t>
+                      </a:r>
+                      <a:endParaRPr lang="en-US" dirty="0" smtClean="0"/>
+                    </a:p>
+                    <a:p>
+                      <a:pPr marL="285750" indent="-285750" algn="ctr">
+                        <a:buFont typeface="Arial" panose="020B0604020202020204" pitchFamily="34" charset="0"/>
+                        <a:buChar char="•"/>
+                      </a:pPr>
+                      <a:endParaRPr lang="en-US" dirty="0" smtClean="0"/>
+                    </a:p>
+                    <a:p>
+                      <a:pPr marL="285750" marR="0" indent="-285750" algn="ctr" defTabSz="914400" rtl="0" eaLnBrk="1" fontAlgn="auto" latinLnBrk="0" hangingPunct="1">
+                        <a:lnSpc>
+                          <a:spcPct val="100000"/>
+                        </a:lnSpc>
+                        <a:spcBef>
+                          <a:spcPts val="0"/>
+                        </a:spcBef>
+                        <a:spcAft>
+                          <a:spcPts val="0"/>
+                        </a:spcAft>
+                        <a:buClrTx/>
+                        <a:buSzTx/>
+                        <a:buFont typeface="Arial" panose="020B0604020202020204" pitchFamily="34" charset="0"/>
+                        <a:buChar char="•"/>
+                        <a:tabLst/>
+                        <a:defRPr/>
+                      </a:pPr>
+                      <a:r>
+                        <a:rPr lang="en-US" dirty="0" smtClean="0"/>
+                        <a:t>Parasitic test during DVCS : </a:t>
+                      </a:r>
+                      <a:r>
+                        <a:rPr lang="en-US" dirty="0" err="1" smtClean="0"/>
+                        <a:t>Fastbus</a:t>
+                      </a:r>
+                      <a:r>
+                        <a:rPr lang="en-US" dirty="0" smtClean="0"/>
+                        <a:t> and FADC setup</a:t>
+                      </a:r>
+                    </a:p>
+                    <a:p>
+                      <a:pPr marL="0" indent="0" algn="ctr">
+                        <a:buFont typeface="Arial" panose="020B0604020202020204" pitchFamily="34" charset="0"/>
+                        <a:buNone/>
+                      </a:pPr>
+                      <a:endParaRPr lang="en-US" dirty="0"/>
+                    </a:p>
+                  </a:txBody>
+                  <a:tcPr/>
+                </a:tc>
+                <a:tc>
+                  <a:txBody>
+                    <a:bodyPr/>
+                    <a:lstStyle/>
+                    <a:p>
+                      <a:pPr marL="285750" indent="-285750" algn="ctr">
+                        <a:buFont typeface="Arial" panose="020B0604020202020204" pitchFamily="34" charset="0"/>
+                        <a:buChar char="•"/>
+                      </a:pPr>
+                      <a:r>
+                        <a:rPr lang="en-US" dirty="0" smtClean="0"/>
+                        <a:t>Tritium experiment</a:t>
+                      </a:r>
+                    </a:p>
+                    <a:p>
+                      <a:pPr marL="285750" marR="0" indent="-285750" algn="ctr" defTabSz="914400" rtl="0" eaLnBrk="1" fontAlgn="auto" latinLnBrk="0" hangingPunct="1">
+                        <a:lnSpc>
+                          <a:spcPct val="100000"/>
+                        </a:lnSpc>
+                        <a:spcBef>
+                          <a:spcPts val="0"/>
+                        </a:spcBef>
+                        <a:spcAft>
+                          <a:spcPts val="0"/>
+                        </a:spcAft>
+                        <a:buClrTx/>
+                        <a:buSzTx/>
+                        <a:buFont typeface="Arial" panose="020B0604020202020204" pitchFamily="34" charset="0"/>
+                        <a:buChar char="•"/>
+                        <a:tabLst/>
+                        <a:defRPr/>
+                      </a:pPr>
+                      <a:r>
+                        <a:rPr lang="en-US" dirty="0" smtClean="0"/>
+                        <a:t>Parasitic test during Tritium : </a:t>
+                      </a:r>
+                      <a:r>
+                        <a:rPr lang="en-US" dirty="0" err="1" smtClean="0"/>
+                        <a:t>Fastbus</a:t>
+                      </a:r>
+                      <a:r>
+                        <a:rPr lang="en-US" dirty="0" smtClean="0"/>
+                        <a:t> and FADC setup</a:t>
+                      </a:r>
+                    </a:p>
+                    <a:p>
+                      <a:pPr marL="0" indent="0" algn="ctr">
+                        <a:buFont typeface="Arial" panose="020B0604020202020204" pitchFamily="34" charset="0"/>
+                        <a:buNone/>
+                      </a:pPr>
+                      <a:endParaRPr lang="en-US" dirty="0" smtClean="0"/>
+                    </a:p>
+                  </a:txBody>
+                  <a:tcPr/>
+                </a:tc>
+                <a:extLst>
+                  <a:ext uri="{0D108BD9-81ED-4DB2-BD59-A6C34878D82A}">
+                    <a16:rowId xmlns:a16="http://schemas.microsoft.com/office/drawing/2014/main" val="85563496"/>
+                  </a:ext>
+                </a:extLst>
+              </a:tr>
+            </a:tbl>
+          </a:graphicData>
+        </a:graphic>
+      </p:graphicFrame>
     </p:spTree>
     <p:extLst>
       <p:ext uri="{BB962C8B-B14F-4D97-AF65-F5344CB8AC3E}">
@@ -6859,6 +7548,13 @@
   <p:clrMapOvr>
     <a:masterClrMapping/>
   </p:clrMapOvr>
+  <p:timing>
+    <p:tnLst>
+      <p:par>
+        <p:cTn id="1" dur="indefinite" restart="never" nodeType="tmRoot"/>
+      </p:par>
+    </p:tnLst>
+  </p:timing>
 </p:sld>
 </file>
 
@@ -6894,7 +7590,11 @@
           <a:bodyPr/>
           <a:lstStyle/>
           <a:p>
-            <a:endParaRPr lang="en-US"/>
+            <a:r>
+              <a:rPr lang="en-US" dirty="0" smtClean="0"/>
+              <a:t>Man power</a:t>
+            </a:r>
+            <a:endParaRPr lang="en-US" dirty="0"/>
           </a:p>
         </p:txBody>
       </p:sp>
@@ -6910,23 +7610,195 @@
         </p:nvSpPr>
         <p:spPr/>
         <p:txBody>
-          <a:bodyPr/>
+          <a:bodyPr>
+            <a:normAutofit fontScale="92500" lnSpcReduction="10000"/>
+          </a:bodyPr>
           <a:lstStyle/>
           <a:p>
-            <a:endParaRPr lang="en-US"/>
+            <a:r>
+              <a:rPr lang="en-US" dirty="0" err="1" smtClean="0"/>
+              <a:t>Fastbus</a:t>
+            </a:r>
+            <a:endParaRPr lang="en-US" dirty="0" smtClean="0"/>
+          </a:p>
+          <a:p>
+            <a:pPr lvl="1"/>
+            <a:r>
+              <a:rPr lang="en-US" dirty="0" smtClean="0"/>
+              <a:t>JLAB : </a:t>
+            </a:r>
+            <a:r>
+              <a:rPr lang="en-US" dirty="0" err="1" smtClean="0"/>
+              <a:t>Dasuni</a:t>
+            </a:r>
+            <a:r>
+              <a:rPr lang="en-US" dirty="0" smtClean="0"/>
+              <a:t> </a:t>
+            </a:r>
+            <a:r>
+              <a:rPr lang="en-US" dirty="0" err="1" smtClean="0"/>
+              <a:t>Adikaram</a:t>
+            </a:r>
+            <a:r>
+              <a:rPr lang="en-US" dirty="0" smtClean="0"/>
+              <a:t>, Mark Jones, Robert Michaels, Bryan </a:t>
+            </a:r>
+            <a:r>
+              <a:rPr lang="en-US" dirty="0" err="1" smtClean="0"/>
+              <a:t>Moffit</a:t>
+            </a:r>
+            <a:r>
+              <a:rPr lang="en-US" dirty="0" smtClean="0"/>
+              <a:t>, William </a:t>
+            </a:r>
+            <a:r>
+              <a:rPr lang="en-US" dirty="0" err="1" smtClean="0"/>
+              <a:t>Gu</a:t>
+            </a:r>
+            <a:endParaRPr lang="en-US" dirty="0" smtClean="0"/>
+          </a:p>
+          <a:p>
+            <a:r>
+              <a:rPr lang="en-US" dirty="0" smtClean="0"/>
+              <a:t>MPD</a:t>
+            </a:r>
+          </a:p>
+          <a:p>
+            <a:pPr lvl="1"/>
+            <a:r>
+              <a:rPr lang="en-US" dirty="0" smtClean="0"/>
+              <a:t>INFN : </a:t>
+            </a:r>
+            <a:r>
+              <a:rPr lang="en-US" dirty="0" err="1" smtClean="0"/>
+              <a:t>Evaristo</a:t>
+            </a:r>
+            <a:r>
+              <a:rPr lang="en-US" dirty="0" smtClean="0"/>
+              <a:t> </a:t>
+            </a:r>
+            <a:r>
+              <a:rPr lang="en-US" dirty="0" err="1" smtClean="0"/>
+              <a:t>Cisbani</a:t>
+            </a:r>
+            <a:r>
+              <a:rPr lang="en-US" dirty="0" smtClean="0"/>
+              <a:t>, Paolo </a:t>
+            </a:r>
+            <a:r>
+              <a:rPr lang="en-US" dirty="0" err="1" smtClean="0"/>
+              <a:t>Musico</a:t>
+            </a:r>
+            <a:endParaRPr lang="en-US" dirty="0" smtClean="0"/>
+          </a:p>
+          <a:p>
+            <a:pPr lvl="1"/>
+            <a:r>
+              <a:rPr lang="en-US" dirty="0" smtClean="0"/>
+              <a:t>UVA : </a:t>
+            </a:r>
+            <a:r>
+              <a:rPr lang="en-US" dirty="0" err="1" smtClean="0"/>
+              <a:t>Danning</a:t>
+            </a:r>
+            <a:r>
+              <a:rPr lang="en-US" dirty="0" smtClean="0"/>
+              <a:t> Di, Kondo </a:t>
+            </a:r>
+            <a:r>
+              <a:rPr lang="en-US" dirty="0" err="1" smtClean="0"/>
+              <a:t>Gnanvo</a:t>
+            </a:r>
+            <a:r>
+              <a:rPr lang="en-US" dirty="0" smtClean="0"/>
+              <a:t>, </a:t>
+            </a:r>
+            <a:r>
+              <a:rPr lang="en-US" dirty="0" err="1" smtClean="0"/>
+              <a:t>Nilanga</a:t>
+            </a:r>
+            <a:r>
+              <a:rPr lang="en-US" dirty="0" smtClean="0"/>
+              <a:t> </a:t>
+            </a:r>
+            <a:r>
+              <a:rPr lang="en-US" dirty="0" err="1" smtClean="0"/>
+              <a:t>Linayage</a:t>
+            </a:r>
+            <a:endParaRPr lang="en-US" dirty="0" smtClean="0"/>
+          </a:p>
+          <a:p>
+            <a:pPr lvl="1"/>
+            <a:r>
+              <a:rPr lang="en-US" dirty="0" smtClean="0"/>
+              <a:t>JLAB : Ben </a:t>
+            </a:r>
+            <a:r>
+              <a:rPr lang="en-US" dirty="0" err="1" smtClean="0"/>
+              <a:t>Raydo</a:t>
+            </a:r>
+            <a:r>
+              <a:rPr lang="en-US" dirty="0" smtClean="0"/>
+              <a:t>, Bryan </a:t>
+            </a:r>
+            <a:r>
+              <a:rPr lang="en-US" dirty="0" err="1" smtClean="0"/>
+              <a:t>Moffit</a:t>
+            </a:r>
+            <a:endParaRPr lang="en-US" dirty="0" smtClean="0"/>
+          </a:p>
+          <a:p>
+            <a:pPr lvl="1"/>
+            <a:r>
+              <a:rPr lang="en-US" dirty="0" smtClean="0"/>
+              <a:t>Stony Brook : Seamus Riordan</a:t>
+            </a:r>
+          </a:p>
+          <a:p>
+            <a:r>
+              <a:rPr lang="en-US" dirty="0" smtClean="0"/>
+              <a:t>HCAL</a:t>
+            </a:r>
+          </a:p>
+          <a:p>
+            <a:pPr lvl="1"/>
+            <a:r>
+              <a:rPr lang="en-US" dirty="0" smtClean="0"/>
+              <a:t>JLAB : Alexandre Camsonne, Ben </a:t>
+            </a:r>
+            <a:r>
+              <a:rPr lang="en-US" dirty="0" err="1" smtClean="0"/>
+              <a:t>Raydo</a:t>
+            </a:r>
+            <a:r>
+              <a:rPr lang="en-US" dirty="0" smtClean="0"/>
+              <a:t>, Bryan </a:t>
+            </a:r>
+            <a:r>
+              <a:rPr lang="en-US" dirty="0" err="1" smtClean="0"/>
+              <a:t>Moffit</a:t>
+            </a:r>
+            <a:endParaRPr lang="en-US" dirty="0"/>
           </a:p>
         </p:txBody>
       </p:sp>
     </p:spTree>
     <p:extLst>
       <p:ext uri="{BB962C8B-B14F-4D97-AF65-F5344CB8AC3E}">
-        <p14:creationId xmlns:p14="http://schemas.microsoft.com/office/powerpoint/2010/main" val="1464373256"/>
+        <p14:creationId xmlns:p14="http://schemas.microsoft.com/office/powerpoint/2010/main" val="3351079420"/>
       </p:ext>
     </p:extLst>
   </p:cSld>
   <p:clrMapOvr>
     <a:masterClrMapping/>
   </p:clrMapOvr>
+  <p:timing>
+    <p:tnLst>
+      <p:par>
+        <p:cTn id="1" dur="indefinite" restart="never" nodeType="tmRoot"/>
+      </p:par>
+    </p:tnLst>
+  </p:timing>
 </p:sld>
 </file>
 
@@ -6980,7 +7852,12 @@
             <p:ph idx="1"/>
           </p:nvPr>
         </p:nvSpPr>
-        <p:spPr/>
+        <p:spPr>
+          <a:xfrm>
+            <a:off x="1752600" y="2057400"/>
+            <a:ext cx="8229600" cy="4525963"/>
+          </a:xfrm>
+        </p:spPr>
         <p:txBody>
           <a:bodyPr/>
           <a:lstStyle/>
@@ -6999,21 +7876,30 @@
           <a:p>
             <a:r>
               <a:rPr lang="en-US" dirty="0" smtClean="0"/>
+              <a:t>FADC HCAL readout</a:t>
+            </a:r>
+          </a:p>
+          <a:p>
+            <a:r>
+              <a:rPr lang="en-US" dirty="0" smtClean="0"/>
               <a:t>GEM readout</a:t>
             </a:r>
           </a:p>
           <a:p>
             <a:r>
               <a:rPr lang="en-US" dirty="0" smtClean="0"/>
-              <a:t>FADC </a:t>
-            </a:r>
-            <a:r>
-              <a:rPr lang="en-US" smtClean="0"/>
-              <a:t>HCAL readout</a:t>
-            </a:r>
-          </a:p>
-          <a:p>
-            <a:endParaRPr lang="en-US"/>
+              <a:t>Timeline</a:t>
+            </a:r>
+          </a:p>
+          <a:p>
+            <a:r>
+              <a:rPr lang="en-US" dirty="0" smtClean="0"/>
+              <a:t>Manpower</a:t>
+            </a:r>
+            <a:endParaRPr lang="en-US" dirty="0" smtClean="0"/>
+          </a:p>
+          <a:p>
+            <a:endParaRPr lang="en-US" dirty="0"/>
           </a:p>
         </p:txBody>
       </p:sp>
@@ -7193,7 +8079,7 @@
         <p:spPr/>
         <p:txBody>
           <a:bodyPr>
-            <a:normAutofit lnSpcReduction="10000"/>
+            <a:normAutofit fontScale="92500" lnSpcReduction="10000"/>
           </a:bodyPr>
           <a:lstStyle/>
           <a:p>
@@ -7206,15 +8092,32 @@
             <a:pPr lvl="1"/>
             <a:r>
               <a:rPr lang="en-US" dirty="0" smtClean="0"/>
-              <a:t>200 KHz L1 Electromagnetic Calorimeter Fastbus</a:t>
+              <a:t>200 KHz </a:t>
+            </a:r>
+            <a:r>
+              <a:rPr lang="en-US" dirty="0" smtClean="0"/>
+              <a:t>L1, 3KHz of L2 </a:t>
+            </a:r>
+            <a:r>
+              <a:rPr lang="en-US" dirty="0" smtClean="0"/>
+              <a:t>Electromagnetic Calorimeter Fastbus</a:t>
             </a:r>
           </a:p>
           <a:p>
             <a:pPr lvl="1"/>
             <a:r>
               <a:rPr lang="en-US" dirty="0" smtClean="0"/>
-              <a:t>Coordinate detector readout</a:t>
-            </a:r>
+              <a:t>Coordinate detector </a:t>
+            </a:r>
+            <a:r>
+              <a:rPr lang="en-US" dirty="0" err="1" smtClean="0"/>
+              <a:t>Fastbus</a:t>
+            </a:r>
+            <a:r>
+              <a:rPr lang="en-US" dirty="0" smtClean="0"/>
+              <a:t> readout 1877S</a:t>
+            </a:r>
+            <a:endParaRPr lang="en-US" dirty="0" smtClean="0"/>
           </a:p>
           <a:p>
             <a:pPr lvl="1"/>
@@ -7260,8 +8163,16 @@
             <a:pPr lvl="1"/>
             <a:r>
               <a:rPr lang="en-US" dirty="0" smtClean="0"/>
-              <a:t>HCAL as neutron detector using FADC and high resolution TDC</a:t>
-            </a:r>
+              <a:t>HCAL as neutron detector using FADC and high resolution </a:t>
+            </a:r>
+            <a:r>
+              <a:rPr lang="en-US" dirty="0" smtClean="0"/>
+              <a:t>TDC</a:t>
+            </a:r>
+          </a:p>
+          <a:p>
+            <a:pPr lvl="1"/>
+            <a:endParaRPr lang="en-US" dirty="0" smtClean="0"/>
           </a:p>
           <a:p>
             <a:endParaRPr lang="en-US" dirty="0"/>

</xml_diff>

<commit_message>
A few more formatting changes.
</commit_message>
<xml_diff>
--- a/2015_DOE_Review/SuperBigBite DAQ update-Oct-20-2015.pptx
+++ b/2015_DOE_Review/SuperBigBite DAQ update-Oct-20-2015.pptx
@@ -14,7 +14,7 @@
     <p:sldId id="260" r:id="rId8"/>
     <p:sldId id="261" r:id="rId9"/>
     <p:sldId id="263" r:id="rId10"/>
-    <p:sldId id="264" r:id="rId11"/>
+    <p:sldId id="278" r:id="rId11"/>
     <p:sldId id="267" r:id="rId12"/>
     <p:sldId id="265" r:id="rId13"/>
     <p:sldId id="272" r:id="rId14"/>
@@ -126,7 +126,7 @@
   </p:defaultTextStyle>
   <p:extLst>
     <p:ext uri="{EFAFB233-063F-42B5-8137-9DF3F51BA10A}">
-      <p15:sldGuideLst xmlns:p15="http://schemas.microsoft.com/office/powerpoint/2012/main" xmlns="">
+      <p15:sldGuideLst xmlns="" xmlns:p15="http://schemas.microsoft.com/office/powerpoint/2012/main">
         <p15:guide id="1" orient="horz" pos="2160">
           <p15:clr>
             <a:srgbClr val="A4A3A4"/>
@@ -769,11 +769,11 @@
           <c:showPercent val="0"/>
           <c:showBubbleSize val="0"/>
         </c:dLbls>
-        <c:axId val="90291200"/>
-        <c:axId val="90301952"/>
+        <c:axId val="81698816"/>
+        <c:axId val="81701120"/>
       </c:scatterChart>
       <c:valAx>
-        <c:axId val="90291200"/>
+        <c:axId val="81698816"/>
         <c:scaling>
           <c:orientation val="minMax"/>
         </c:scaling>
@@ -819,12 +819,12 @@
         <c:majorTickMark val="out"/>
         <c:minorTickMark val="none"/>
         <c:tickLblPos val="nextTo"/>
-        <c:crossAx val="90301952"/>
+        <c:crossAx val="81701120"/>
         <c:crosses val="autoZero"/>
         <c:crossBetween val="midCat"/>
       </c:valAx>
       <c:valAx>
-        <c:axId val="90301952"/>
+        <c:axId val="81701120"/>
         <c:scaling>
           <c:orientation val="minMax"/>
         </c:scaling>
@@ -865,7 +865,7 @@
         <c:majorTickMark val="out"/>
         <c:minorTickMark val="none"/>
         <c:tickLblPos val="nextTo"/>
-        <c:crossAx val="90291200"/>
+        <c:crossAx val="81698816"/>
         <c:crosses val="autoZero"/>
         <c:crossBetween val="midCat"/>
       </c:valAx>
@@ -1598,11 +1598,11 @@
           <c:showPercent val="0"/>
           <c:showBubbleSize val="0"/>
         </c:dLbls>
-        <c:axId val="90345472"/>
-        <c:axId val="90347776"/>
+        <c:axId val="54724864"/>
+        <c:axId val="54789632"/>
       </c:scatterChart>
       <c:valAx>
-        <c:axId val="90345472"/>
+        <c:axId val="54724864"/>
         <c:scaling>
           <c:orientation val="minMax"/>
         </c:scaling>
@@ -1643,12 +1643,12 @@
         <c:majorTickMark val="out"/>
         <c:minorTickMark val="none"/>
         <c:tickLblPos val="nextTo"/>
-        <c:crossAx val="90347776"/>
+        <c:crossAx val="54789632"/>
         <c:crosses val="autoZero"/>
         <c:crossBetween val="midCat"/>
       </c:valAx>
       <c:valAx>
-        <c:axId val="90347776"/>
+        <c:axId val="54789632"/>
         <c:scaling>
           <c:orientation val="minMax"/>
         </c:scaling>
@@ -1689,7 +1689,7 @@
         <c:majorTickMark val="out"/>
         <c:minorTickMark val="none"/>
         <c:tickLblPos val="nextTo"/>
-        <c:crossAx val="90345472"/>
+        <c:crossAx val="54724864"/>
         <c:crosses val="autoZero"/>
         <c:crossBetween val="midCat"/>
       </c:valAx>
@@ -2054,11 +2054,11 @@
           <c:showPercent val="0"/>
           <c:showBubbleSize val="0"/>
         </c:dLbls>
-        <c:axId val="90912640"/>
-        <c:axId val="90923392"/>
+        <c:axId val="73779840"/>
+        <c:axId val="73790592"/>
       </c:scatterChart>
       <c:valAx>
-        <c:axId val="90912640"/>
+        <c:axId val="73779840"/>
         <c:scaling>
           <c:orientation val="minMax"/>
           <c:max val="200000"/>
@@ -2112,12 +2112,12 @@
             </a:solidFill>
           </a:ln>
         </c:spPr>
-        <c:crossAx val="90923392"/>
+        <c:crossAx val="73790592"/>
         <c:crossesAt val="0"/>
         <c:crossBetween val="midCat"/>
       </c:valAx>
       <c:valAx>
-        <c:axId val="90923392"/>
+        <c:axId val="73790592"/>
         <c:scaling>
           <c:orientation val="minMax"/>
         </c:scaling>
@@ -2165,7 +2165,7 @@
             </a:solidFill>
           </a:ln>
         </c:spPr>
-        <c:crossAx val="90912640"/>
+        <c:crossAx val="73779840"/>
         <c:crossesAt val="0"/>
         <c:crossBetween val="midCat"/>
       </c:valAx>
@@ -2387,7 +2387,7 @@
           <a:p>
             <a:fld id="{B41FAE2C-98F2-4AEB-9028-7681F5825C1E}" type="datetimeFigureOut">
               <a:rPr lang="en-US" smtClean="0"/>
-              <a:t>11/2/2015</a:t>
+              <a:t>11/3/2015</a:t>
             </a:fld>
             <a:endParaRPr lang="en-US"/>
           </a:p>
@@ -2560,7 +2560,7 @@
           <a:p>
             <a:fld id="{B41FAE2C-98F2-4AEB-9028-7681F5825C1E}" type="datetimeFigureOut">
               <a:rPr lang="en-US" smtClean="0"/>
-              <a:t>11/2/2015</a:t>
+              <a:t>11/3/2015</a:t>
             </a:fld>
             <a:endParaRPr lang="en-US"/>
           </a:p>
@@ -2743,7 +2743,7 @@
           <a:p>
             <a:fld id="{B41FAE2C-98F2-4AEB-9028-7681F5825C1E}" type="datetimeFigureOut">
               <a:rPr lang="en-US" smtClean="0"/>
-              <a:t>11/2/2015</a:t>
+              <a:t>11/3/2015</a:t>
             </a:fld>
             <a:endParaRPr lang="en-US"/>
           </a:p>
@@ -2993,7 +2993,7 @@
                 </a:solidFill>
               </a:rPr>
               <a:pPr/>
-              <a:t>11/2/2015</a:t>
+              <a:t>11/3/2015</a:t>
             </a:fld>
             <a:endParaRPr lang="en-US">
               <a:solidFill>
@@ -3194,7 +3194,7 @@
                 </a:solidFill>
               </a:rPr>
               <a:pPr/>
-              <a:t>11/2/2015</a:t>
+              <a:t>11/3/2015</a:t>
             </a:fld>
             <a:endParaRPr lang="en-US">
               <a:solidFill>
@@ -3471,7 +3471,7 @@
                 </a:solidFill>
               </a:rPr>
               <a:pPr/>
-              <a:t>11/2/2015</a:t>
+              <a:t>11/3/2015</a:t>
             </a:fld>
             <a:endParaRPr lang="en-US">
               <a:solidFill>
@@ -3790,7 +3790,7 @@
                 </a:solidFill>
               </a:rPr>
               <a:pPr/>
-              <a:t>11/2/2015</a:t>
+              <a:t>11/3/2015</a:t>
             </a:fld>
             <a:endParaRPr lang="en-US">
               <a:solidFill>
@@ -4243,7 +4243,7 @@
                 </a:solidFill>
               </a:rPr>
               <a:pPr/>
-              <a:t>11/2/2015</a:t>
+              <a:t>11/3/2015</a:t>
             </a:fld>
             <a:endParaRPr lang="en-US">
               <a:solidFill>
@@ -4392,7 +4392,7 @@
                 </a:solidFill>
               </a:rPr>
               <a:pPr/>
-              <a:t>11/2/2015</a:t>
+              <a:t>11/3/2015</a:t>
             </a:fld>
             <a:endParaRPr lang="en-US">
               <a:solidFill>
@@ -4518,7 +4518,7 @@
                 </a:solidFill>
               </a:rPr>
               <a:pPr/>
-              <a:t>11/2/2015</a:t>
+              <a:t>11/3/2015</a:t>
             </a:fld>
             <a:endParaRPr lang="en-US">
               <a:solidFill>
@@ -4826,7 +4826,7 @@
                 </a:solidFill>
               </a:rPr>
               <a:pPr/>
-              <a:t>11/2/2015</a:t>
+              <a:t>11/3/2015</a:t>
             </a:fld>
             <a:endParaRPr lang="en-US">
               <a:solidFill>
@@ -5022,7 +5022,7 @@
           <a:p>
             <a:fld id="{B41FAE2C-98F2-4AEB-9028-7681F5825C1E}" type="datetimeFigureOut">
               <a:rPr lang="en-US" smtClean="0"/>
-              <a:t>11/2/2015</a:t>
+              <a:t>11/3/2015</a:t>
             </a:fld>
             <a:endParaRPr lang="en-US"/>
           </a:p>
@@ -5287,7 +5287,7 @@
                 </a:solidFill>
               </a:rPr>
               <a:pPr/>
-              <a:t>11/2/2015</a:t>
+              <a:t>11/3/2015</a:t>
             </a:fld>
             <a:endParaRPr lang="en-US">
               <a:solidFill>
@@ -5488,7 +5488,7 @@
                 </a:solidFill>
               </a:rPr>
               <a:pPr/>
-              <a:t>11/2/2015</a:t>
+              <a:t>11/3/2015</a:t>
             </a:fld>
             <a:endParaRPr lang="en-US">
               <a:solidFill>
@@ -5699,7 +5699,7 @@
                 </a:solidFill>
               </a:rPr>
               <a:pPr/>
-              <a:t>11/2/2015</a:t>
+              <a:t>11/3/2015</a:t>
             </a:fld>
             <a:endParaRPr lang="en-US">
               <a:solidFill>
@@ -5971,7 +5971,7 @@
           <a:p>
             <a:fld id="{B41FAE2C-98F2-4AEB-9028-7681F5825C1E}" type="datetimeFigureOut">
               <a:rPr lang="en-US" smtClean="0"/>
-              <a:t>11/2/2015</a:t>
+              <a:t>11/3/2015</a:t>
             </a:fld>
             <a:endParaRPr lang="en-US"/>
           </a:p>
@@ -6262,7 +6262,7 @@
           <a:p>
             <a:fld id="{B41FAE2C-98F2-4AEB-9028-7681F5825C1E}" type="datetimeFigureOut">
               <a:rPr lang="en-US" smtClean="0"/>
-              <a:t>11/2/2015</a:t>
+              <a:t>11/3/2015</a:t>
             </a:fld>
             <a:endParaRPr lang="en-US"/>
           </a:p>
@@ -6687,7 +6687,7 @@
           <a:p>
             <a:fld id="{B41FAE2C-98F2-4AEB-9028-7681F5825C1E}" type="datetimeFigureOut">
               <a:rPr lang="en-US" smtClean="0"/>
-              <a:t>11/2/2015</a:t>
+              <a:t>11/3/2015</a:t>
             </a:fld>
             <a:endParaRPr lang="en-US"/>
           </a:p>
@@ -6808,7 +6808,7 @@
           <a:p>
             <a:fld id="{B41FAE2C-98F2-4AEB-9028-7681F5825C1E}" type="datetimeFigureOut">
               <a:rPr lang="en-US" smtClean="0"/>
-              <a:t>11/2/2015</a:t>
+              <a:t>11/3/2015</a:t>
             </a:fld>
             <a:endParaRPr lang="en-US"/>
           </a:p>
@@ -6906,7 +6906,7 @@
           <a:p>
             <a:fld id="{B41FAE2C-98F2-4AEB-9028-7681F5825C1E}" type="datetimeFigureOut">
               <a:rPr lang="en-US" smtClean="0"/>
-              <a:t>11/2/2015</a:t>
+              <a:t>11/3/2015</a:t>
             </a:fld>
             <a:endParaRPr lang="en-US"/>
           </a:p>
@@ -7186,7 +7186,7 @@
           <a:p>
             <a:fld id="{B41FAE2C-98F2-4AEB-9028-7681F5825C1E}" type="datetimeFigureOut">
               <a:rPr lang="en-US" smtClean="0"/>
-              <a:t>11/2/2015</a:t>
+              <a:t>11/3/2015</a:t>
             </a:fld>
             <a:endParaRPr lang="en-US"/>
           </a:p>
@@ -7446,7 +7446,7 @@
           <a:p>
             <a:fld id="{B41FAE2C-98F2-4AEB-9028-7681F5825C1E}" type="datetimeFigureOut">
               <a:rPr lang="en-US" smtClean="0"/>
-              <a:t>11/2/2015</a:t>
+              <a:t>11/3/2015</a:t>
             </a:fld>
             <a:endParaRPr lang="en-US"/>
           </a:p>
@@ -7667,7 +7667,7 @@
           <a:p>
             <a:fld id="{B41FAE2C-98F2-4AEB-9028-7681F5825C1E}" type="datetimeFigureOut">
               <a:rPr lang="en-US" smtClean="0"/>
-              <a:t>11/2/2015</a:t>
+              <a:t>11/3/2015</a:t>
             </a:fld>
             <a:endParaRPr lang="en-US"/>
           </a:p>
@@ -8145,7 +8145,7 @@
                 </a:solidFill>
               </a:rPr>
               <a:pPr defTabSz="457200"/>
-              <a:t>11/2/2015</a:t>
+              <a:t>11/3/2015</a:t>
             </a:fld>
             <a:endParaRPr lang="en-US" dirty="0">
               <a:solidFill>
@@ -8603,13 +8603,13 @@
           <p:nvPr>
             <p:extLst>
               <p:ext uri="{D42A27DB-BD31-4B8C-83A1-F6EECF244321}">
-                <p14:modId xmlns:p14="http://schemas.microsoft.com/office/powerpoint/2010/main" val="1954670967"/>
+                <p14:modId xmlns:p14="http://schemas.microsoft.com/office/powerpoint/2010/main" val="3355298516"/>
               </p:ext>
             </p:extLst>
           </p:nvPr>
         </p:nvGraphicFramePr>
         <p:xfrm>
-          <a:off x="1556481" y="1289786"/>
+          <a:off x="1295400" y="1326536"/>
           <a:ext cx="6341180" cy="5022860"/>
         </p:xfrm>
         <a:graphic>
@@ -8618,43 +8618,6 @@
           </a:graphicData>
         </a:graphic>
       </p:graphicFrame>
-      <p:sp>
-        <p:nvSpPr>
-          <p:cNvPr id="5" name="Title 1"/>
-          <p:cNvSpPr>
-            <a:spLocks noGrp="1"/>
-          </p:cNvSpPr>
-          <p:nvPr>
-            <p:ph type="title"/>
-          </p:nvPr>
-        </p:nvSpPr>
-        <p:spPr>
-          <a:xfrm>
-            <a:off x="219487" y="180558"/>
-            <a:ext cx="8701105" cy="1058154"/>
-          </a:xfrm>
-        </p:spPr>
-        <p:txBody>
-          <a:bodyPr>
-            <a:noAutofit/>
-          </a:bodyPr>
-          <a:lstStyle/>
-          <a:p>
-            <a:r>
-              <a:rPr lang="en-US" sz="3600" dirty="0" smtClean="0"/>
-              <a:t>Readout trigger rate ~ 5kHz, Buffer Level = 4,</a:t>
-            </a:r>
-            <a:br>
-              <a:rPr lang="en-US" sz="3600" dirty="0" smtClean="0"/>
-            </a:br>
-            <a:r>
-              <a:rPr lang="en-US" sz="3600" dirty="0" smtClean="0"/>
-              <a:t>No pedestal suppression (8ADC)</a:t>
-            </a:r>
-            <a:endParaRPr lang="en-US" sz="3600" dirty="0"/>
-          </a:p>
-        </p:txBody>
-      </p:sp>
       <p:sp>
         <p:nvSpPr>
           <p:cNvPr id="6" name="TextBox 5"/>
@@ -8766,6 +8729,84 @@
               <a:t>1 crates</a:t>
             </a:r>
             <a:endParaRPr lang="en-US" sz="2400" dirty="0"/>
+          </a:p>
+        </p:txBody>
+      </p:sp>
+      <p:sp>
+        <p:nvSpPr>
+          <p:cNvPr id="2" name="Rectangle 1"/>
+          <p:cNvSpPr/>
+          <p:nvPr/>
+        </p:nvSpPr>
+        <p:spPr>
+          <a:xfrm>
+            <a:off x="791230" y="989929"/>
+            <a:ext cx="3243837" cy="369332"/>
+          </a:xfrm>
+          <a:prstGeom prst="rect">
+            <a:avLst/>
+          </a:prstGeom>
+        </p:spPr>
+        <p:txBody>
+          <a:bodyPr wrap="none">
+            <a:spAutoFit/>
+          </a:bodyPr>
+          <a:lstStyle/>
+          <a:p>
+            <a:r>
+              <a:rPr lang="en-US" b="1" dirty="0"/>
+              <a:t>No pedestal suppression (8ADC)</a:t>
+            </a:r>
+          </a:p>
+        </p:txBody>
+      </p:sp>
+      <p:sp>
+        <p:nvSpPr>
+          <p:cNvPr id="11" name="Rectangle 10"/>
+          <p:cNvSpPr/>
+          <p:nvPr/>
+        </p:nvSpPr>
+        <p:spPr>
+          <a:xfrm>
+            <a:off x="5715000" y="1005984"/>
+            <a:ext cx="2796407" cy="369332"/>
+          </a:xfrm>
+          <a:prstGeom prst="rect">
+            <a:avLst/>
+          </a:prstGeom>
+        </p:spPr>
+        <p:txBody>
+          <a:bodyPr wrap="none">
+            <a:spAutoFit/>
+          </a:bodyPr>
+          <a:lstStyle/>
+          <a:p>
+            <a:r>
+              <a:rPr lang="en-US" b="1" dirty="0"/>
+              <a:t>Readout trigger rate ~ 5kHz</a:t>
+            </a:r>
+          </a:p>
+        </p:txBody>
+      </p:sp>
+      <p:sp>
+        <p:nvSpPr>
+          <p:cNvPr id="12" name="Title 11"/>
+          <p:cNvSpPr>
+            <a:spLocks noGrp="1"/>
+          </p:cNvSpPr>
+          <p:nvPr>
+            <p:ph type="title"/>
+          </p:nvPr>
+        </p:nvSpPr>
+        <p:spPr/>
+        <p:txBody>
+          <a:bodyPr/>
+          <a:lstStyle/>
+          <a:p>
+            <a:r>
+              <a:rPr lang="en-US" dirty="0"/>
+              <a:t>3 Crates, Buffer Level = 4</a:t>
+            </a:r>
           </a:p>
         </p:txBody>
       </p:sp>
@@ -10343,28 +10384,28 @@
                 <a:gridCol w="2190750">
                   <a:extLst>
                     <a:ext uri="{9D8B030D-6E8A-4147-A177-3AD203B41FA5}">
-                      <a16:colId xmlns:a16="http://schemas.microsoft.com/office/drawing/2014/main" xmlns="" val="2383147881"/>
+                      <a16:colId xmlns="" xmlns:a16="http://schemas.microsoft.com/office/drawing/2014/main" val="2383147881"/>
                     </a:ext>
                   </a:extLst>
                 </a:gridCol>
                 <a:gridCol w="2190750">
                   <a:extLst>
                     <a:ext uri="{9D8B030D-6E8A-4147-A177-3AD203B41FA5}">
-                      <a16:colId xmlns:a16="http://schemas.microsoft.com/office/drawing/2014/main" xmlns="" val="3539225061"/>
+                      <a16:colId xmlns="" xmlns:a16="http://schemas.microsoft.com/office/drawing/2014/main" val="3539225061"/>
                     </a:ext>
                   </a:extLst>
                 </a:gridCol>
                 <a:gridCol w="2190750">
                   <a:extLst>
                     <a:ext uri="{9D8B030D-6E8A-4147-A177-3AD203B41FA5}">
-                      <a16:colId xmlns:a16="http://schemas.microsoft.com/office/drawing/2014/main" xmlns="" val="449586720"/>
+                      <a16:colId xmlns="" xmlns:a16="http://schemas.microsoft.com/office/drawing/2014/main" val="449586720"/>
                     </a:ext>
                   </a:extLst>
                 </a:gridCol>
                 <a:gridCol w="2190750">
                   <a:extLst>
                     <a:ext uri="{9D8B030D-6E8A-4147-A177-3AD203B41FA5}">
-                      <a16:colId xmlns:a16="http://schemas.microsoft.com/office/drawing/2014/main" xmlns="" val="3861353694"/>
+                      <a16:colId xmlns="" xmlns:a16="http://schemas.microsoft.com/office/drawing/2014/main" val="3861353694"/>
                     </a:ext>
                   </a:extLst>
                 </a:gridCol>
@@ -10504,7 +10545,7 @@
                 </a:tc>
                 <a:extLst>
                   <a:ext uri="{0D108BD9-81ED-4DB2-BD59-A6C34878D82A}">
-                    <a16:rowId xmlns:a16="http://schemas.microsoft.com/office/drawing/2014/main" xmlns="" val="660863743"/>
+                    <a16:rowId xmlns="" xmlns:a16="http://schemas.microsoft.com/office/drawing/2014/main" val="660863743"/>
                   </a:ext>
                 </a:extLst>
               </a:tr>
@@ -10520,11 +10561,7 @@
                       </a:pPr>
                       <a:r>
                         <a:rPr lang="en-US" sz="1600" dirty="0" smtClean="0"/>
-                        <a:t>Finish MPD CODA </a:t>
-                      </a:r>
-                      <a:r>
-                        <a:rPr lang="en-US" sz="1600" dirty="0" smtClean="0"/>
-                        <a:t>readout</a:t>
+                        <a:t>Finish MPD CODA readout</a:t>
                       </a:r>
                       <a:r>
                         <a:rPr lang="en-US" sz="1600" baseline="0" dirty="0" smtClean="0"/>
@@ -10534,7 +10571,6 @@
                         <a:rPr lang="en-US" sz="1600" dirty="0" smtClean="0"/>
                         <a:t>debug</a:t>
                       </a:r>
-                      <a:endParaRPr lang="en-US" sz="1600" dirty="0" smtClean="0"/>
                     </a:p>
                     <a:p>
                       <a:pPr marL="285750" indent="-285750" algn="l">
@@ -10551,11 +10587,7 @@
                       </a:r>
                       <a:r>
                         <a:rPr lang="en-US" sz="1600" dirty="0" smtClean="0"/>
-                        <a:t> Readout </a:t>
-                      </a:r>
-                      <a:r>
-                        <a:rPr lang="en-US" sz="1600" dirty="0" smtClean="0"/>
-                        <a:t>– debug</a:t>
+                        <a:t> Readout – debug</a:t>
                       </a:r>
                     </a:p>
                     <a:p>
@@ -10565,11 +10597,7 @@
                       </a:pPr>
                       <a:r>
                         <a:rPr lang="en-US" sz="1600" dirty="0" smtClean="0"/>
-                        <a:t>Small </a:t>
-                      </a:r>
-                      <a:r>
-                        <a:rPr lang="en-US" sz="1600" dirty="0" smtClean="0"/>
-                        <a:t>scale setup</a:t>
+                        <a:t>Small scale setup</a:t>
                       </a:r>
                     </a:p>
                     <a:p>
@@ -10578,21 +10606,12 @@
                         <a:rPr lang="en-US" sz="1600" dirty="0" smtClean="0"/>
                         <a:t>Test </a:t>
                       </a:r>
-                      <a:endParaRPr lang="en-US" sz="1600" dirty="0" smtClean="0"/>
                     </a:p>
                     <a:p>
                       <a:pPr lvl="1" algn="l"/>
                       <a:r>
                         <a:rPr lang="en-US" sz="1600" dirty="0" smtClean="0"/>
-                        <a:t>200 </a:t>
-                      </a:r>
-                      <a:r>
-                        <a:rPr lang="en-US" sz="1600" dirty="0" smtClean="0"/>
-                        <a:t>KHz L1 and 5 </a:t>
-                      </a:r>
-                      <a:r>
-                        <a:rPr lang="en-US" sz="1600" dirty="0" smtClean="0"/>
-                        <a:t>kHz </a:t>
+                        <a:t>200 KHz L1 and 5 kHz </a:t>
                       </a:r>
                       <a:r>
                         <a:rPr lang="en-US" sz="1600" dirty="0" err="1" smtClean="0"/>
@@ -10608,15 +10627,7 @@
                       </a:r>
                       <a:r>
                         <a:rPr lang="en-US" sz="1600" dirty="0" smtClean="0"/>
-                        <a:t>, </a:t>
-                      </a:r>
-                      <a:r>
-                        <a:rPr lang="en-US" sz="1600" dirty="0" smtClean="0"/>
-                        <a:t>MPD, </a:t>
-                      </a:r>
-                      <a:r>
-                        <a:rPr lang="en-US" sz="1600" dirty="0" smtClean="0"/>
-                        <a:t>and HCAL FADC</a:t>
+                        <a:t>, MPD, and HCAL FADC</a:t>
                       </a:r>
                     </a:p>
                     <a:p>
@@ -10649,17 +10660,12 @@
                       </a:r>
                       <a:r>
                         <a:rPr lang="en-US" sz="1600" baseline="0" dirty="0" smtClean="0"/>
-                        <a:t> </a:t>
-                      </a:r>
-                      <a:r>
-                        <a:rPr lang="en-US" sz="1600" baseline="0" dirty="0" smtClean="0"/>
-                        <a:t>s</a:t>
+                        <a:t> s</a:t>
                       </a:r>
                       <a:r>
                         <a:rPr lang="en-US" sz="1600" dirty="0" smtClean="0"/>
                         <a:t>ynchronization</a:t>
                       </a:r>
-                      <a:endParaRPr lang="en-US" sz="1600" dirty="0" smtClean="0"/>
                     </a:p>
                     <a:p>
                       <a:pPr marL="285750" indent="-285750" algn="l">
@@ -10950,7 +10956,7 @@
                 </a:tc>
                 <a:extLst>
                   <a:ext uri="{0D108BD9-81ED-4DB2-BD59-A6C34878D82A}">
-                    <a16:rowId xmlns:a16="http://schemas.microsoft.com/office/drawing/2014/main" xmlns="" val="85563496"/>
+                    <a16:rowId xmlns="" xmlns:a16="http://schemas.microsoft.com/office/drawing/2014/main" val="85563496"/>
                   </a:ext>
                 </a:extLst>
               </a:tr>
@@ -11050,11 +11056,7 @@
             <a:pPr lvl="1"/>
             <a:r>
               <a:rPr lang="en-US" dirty="0" smtClean="0"/>
-              <a:t>JLAB </a:t>
-            </a:r>
-            <a:r>
-              <a:rPr lang="en-US" dirty="0" smtClean="0"/>
-              <a:t>: </a:t>
+              <a:t>JLAB : </a:t>
             </a:r>
             <a:r>
               <a:rPr lang="en-US" dirty="0" err="1" smtClean="0"/>
@@ -11071,21 +11073,13 @@
             <a:r>
               <a:rPr lang="en-US" dirty="0" smtClean="0"/>
               <a:t>, Mark Jones, </a:t>
-            </a:r>
-            <a:r>
-              <a:rPr lang="en-US" dirty="0" smtClean="0"/>
-              <a:t/>
             </a:r>
             <a:br>
               <a:rPr lang="en-US" dirty="0" smtClean="0"/>
             </a:br>
             <a:r>
               <a:rPr lang="en-US" dirty="0" smtClean="0"/>
-              <a:t>Robert Michaels</a:t>
-            </a:r>
-            <a:r>
-              <a:rPr lang="en-US" dirty="0" smtClean="0"/>
-              <a:t>, Bryan </a:t>
+              <a:t>Robert Michaels, Bryan </a:t>
             </a:r>
             <a:r>
               <a:rPr lang="en-US" dirty="0" err="1" smtClean="0"/>
@@ -11182,11 +11176,7 @@
             <a:pPr lvl="1"/>
             <a:r>
               <a:rPr lang="en-US" dirty="0" smtClean="0"/>
-              <a:t>JLAB </a:t>
-            </a:r>
-            <a:r>
-              <a:rPr lang="en-US" dirty="0" smtClean="0"/>
-              <a:t>: Ben </a:t>
+              <a:t>JLAB : Ben </a:t>
             </a:r>
             <a:r>
               <a:rPr lang="en-US" dirty="0" err="1" smtClean="0"/>
@@ -11206,11 +11196,7 @@
             <a:pPr lvl="1"/>
             <a:r>
               <a:rPr lang="en-US" dirty="0" smtClean="0"/>
-              <a:t>Stony Brook : Seamus </a:t>
-            </a:r>
-            <a:r>
-              <a:rPr lang="en-US" dirty="0" smtClean="0"/>
-              <a:t>Riordan</a:t>
+              <a:t>Stony Brook : Seamus Riordan</a:t>
             </a:r>
             <a:br>
               <a:rPr lang="en-US" dirty="0" smtClean="0"/>
@@ -11236,10 +11222,6 @@
             <a:r>
               <a:rPr lang="en-US" dirty="0" smtClean="0"/>
               <a:t>, </a:t>
-            </a:r>
-            <a:r>
-              <a:rPr lang="en-US" dirty="0" smtClean="0"/>
-              <a:t/>
             </a:r>
             <a:br>
               <a:rPr lang="en-US" dirty="0" smtClean="0"/>
@@ -11328,8 +11310,8 @@
         </p:nvSpPr>
         <p:spPr>
           <a:xfrm>
-            <a:off x="1752600" y="2057400"/>
-            <a:ext cx="8229600" cy="4525963"/>
+            <a:off x="2209800" y="1295400"/>
+            <a:ext cx="4724400" cy="4038600"/>
           </a:xfrm>
         </p:spPr>
         <p:txBody>
@@ -11553,8 +11535,8 @@
           </a:p>
         </p:txBody>
       </p:sp>
-      <mc:AlternateContent xmlns:mc="http://schemas.openxmlformats.org/markup-compatibility/2006">
-        <mc:Choice xmlns:a14="http://schemas.microsoft.com/office/drawing/2010/main" Requires="a14">
+      <mc:AlternateContent xmlns:mc="http://schemas.openxmlformats.org/markup-compatibility/2006" xmlns:a14="http://schemas.microsoft.com/office/drawing/2010/main">
+        <mc:Choice Requires="a14">
           <p:sp>
             <p:nvSpPr>
               <p:cNvPr id="3" name="Content Placeholder 2"/>
@@ -11626,23 +11608,7 @@
                 <a:pPr lvl="1"/>
                 <a:r>
                   <a:rPr lang="en-US" dirty="0" smtClean="0"/>
-                  <a:t>200 </a:t>
-                </a:r>
-                <a:r>
-                  <a:rPr lang="en-US" dirty="0" smtClean="0"/>
-                  <a:t>kHz </a:t>
-                </a:r>
-                <a:r>
-                  <a:rPr lang="en-US" dirty="0" smtClean="0"/>
-                  <a:t>L1, </a:t>
-                </a:r>
-                <a:r>
-                  <a:rPr lang="en-US" dirty="0" smtClean="0"/>
-                  <a:t>3 kHz </a:t>
-                </a:r>
-                <a:r>
-                  <a:rPr lang="en-US" dirty="0" smtClean="0"/>
-                  <a:t>of L2 Electromagnetic Calorimeter Fastbus</a:t>
+                  <a:t>200 kHz L1, 3 kHz of L2 Electromagnetic Calorimeter Fastbus</a:t>
                 </a:r>
               </a:p>
               <a:p>
@@ -11671,11 +11637,7 @@
                 <a:pPr lvl="1"/>
                 <a:r>
                   <a:rPr lang="en-US" dirty="0" smtClean="0"/>
-                  <a:t>HCAL trigger pipeline FADC and L2 </a:t>
-                </a:r>
-                <a:r>
-                  <a:rPr lang="en-US" dirty="0" smtClean="0"/>
-                  <a:t>trigger</a:t>
+                  <a:t>HCAL trigger pipeline FADC and L2 trigger</a:t>
                 </a:r>
                 <a:br>
                   <a:rPr lang="en-US" dirty="0" smtClean="0"/>
@@ -11803,7 +11765,7 @@
             </p:txBody>
           </p:sp>
         </mc:Choice>
-        <mc:Fallback>
+        <mc:Fallback xmlns="">
           <p:sp>
             <p:nvSpPr>
               <p:cNvPr id="3" name="Content Placeholder 2"/>
@@ -11953,11 +11915,7 @@
             <a:pPr lvl="1"/>
             <a:r>
               <a:rPr lang="en-US" dirty="0" smtClean="0"/>
-              <a:t>Trigger partitioning capability only use a subset of </a:t>
-            </a:r>
-            <a:r>
-              <a:rPr lang="en-US" dirty="0" smtClean="0"/>
-              <a:t>modules</a:t>
+              <a:t>Trigger partitioning capability only use a subset of modules</a:t>
             </a:r>
             <a:br>
               <a:rPr lang="en-US" dirty="0" smtClean="0"/>
@@ -11983,11 +11941,7 @@
             </a:r>
             <a:r>
               <a:rPr lang="en-US" dirty="0" smtClean="0"/>
-              <a:t> </a:t>
-            </a:r>
-            <a:r>
-              <a:rPr lang="en-US" dirty="0" smtClean="0"/>
-              <a:t>)</a:t>
+              <a:t> )</a:t>
             </a:r>
             <a:br>
               <a:rPr lang="en-US" dirty="0" smtClean="0"/>
@@ -11997,15 +11951,7 @@
           <a:p>
             <a:r>
               <a:rPr lang="en-US" dirty="0" smtClean="0"/>
-              <a:t>Firmware being </a:t>
-            </a:r>
-            <a:r>
-              <a:rPr lang="en-US" dirty="0" smtClean="0"/>
-              <a:t>developed </a:t>
-            </a:r>
-            <a:r>
-              <a:rPr lang="en-US" dirty="0" smtClean="0"/>
-              <a:t>and tested</a:t>
+              <a:t>Firmware being developed and tested</a:t>
             </a:r>
           </a:p>
           <a:p>
@@ -12067,11 +12013,7 @@
           <a:p>
             <a:r>
               <a:rPr lang="it-IT" dirty="0" smtClean="0"/>
-              <a:t>Fastbus </a:t>
-            </a:r>
-            <a:r>
-              <a:rPr lang="it-IT" dirty="0" smtClean="0"/>
-              <a:t>update</a:t>
+              <a:t>Fastbus update</a:t>
             </a:r>
             <a:endParaRPr lang="it-IT" dirty="0"/>
           </a:p>
@@ -12140,7 +12082,47 @@
                 <a:latin typeface="Minion Pro"/>
                 <a:cs typeface="Times New Roman" pitchFamily="18" charset="0"/>
               </a:rPr>
-              <a:t>  Have  sufficient   TDCs,    ADCs,   crates,    aux. cards</a:t>
+              <a:t>  </a:t>
+            </a:r>
+            <a:r>
+              <a:rPr lang="en-US" sz="2000" dirty="0" smtClean="0">
+                <a:solidFill>
+                  <a:srgbClr val="0070C0"/>
+                </a:solidFill>
+                <a:latin typeface="Minion Pro"/>
+                <a:cs typeface="Times New Roman" pitchFamily="18" charset="0"/>
+              </a:rPr>
+              <a:t>Have sufficient   TDCs</a:t>
+            </a:r>
+            <a:r>
+              <a:rPr lang="en-US" sz="2000" dirty="0">
+                <a:solidFill>
+                  <a:srgbClr val="0070C0"/>
+                </a:solidFill>
+                <a:latin typeface="Minion Pro"/>
+                <a:cs typeface="Times New Roman" pitchFamily="18" charset="0"/>
+              </a:rPr>
+              <a:t>,    ADCs,   crates</a:t>
+            </a:r>
+            <a:r>
+              <a:rPr lang="en-US" sz="2000" dirty="0" smtClean="0">
+                <a:solidFill>
+                  <a:srgbClr val="0070C0"/>
+                </a:solidFill>
+                <a:latin typeface="Minion Pro"/>
+                <a:cs typeface="Times New Roman" pitchFamily="18" charset="0"/>
+              </a:rPr>
+              <a:t>,  </a:t>
+            </a:r>
+            <a:r>
+              <a:rPr lang="en-US" sz="2000" dirty="0">
+                <a:solidFill>
+                  <a:srgbClr val="0070C0"/>
+                </a:solidFill>
+                <a:latin typeface="Minion Pro"/>
+                <a:cs typeface="Times New Roman" pitchFamily="18" charset="0"/>
+              </a:rPr>
+              <a:t>aux. cards</a:t>
             </a:r>
           </a:p>
           <a:p>
@@ -12182,7 +12164,27 @@
                 <a:latin typeface="Minion Pro"/>
                 <a:cs typeface="Times New Roman" pitchFamily="18" charset="0"/>
               </a:rPr>
-              <a:t>  Like  to  scrounge  ~3 more SFI </a:t>
+              <a:t>  </a:t>
+            </a:r>
+            <a:r>
+              <a:rPr lang="en-US" sz="2000" dirty="0" smtClean="0">
+                <a:solidFill>
+                  <a:srgbClr val="C00000"/>
+                </a:solidFill>
+                <a:latin typeface="Minion Pro"/>
+                <a:cs typeface="Times New Roman" pitchFamily="18" charset="0"/>
+              </a:rPr>
+              <a:t>Like to scrounge ~3 </a:t>
+            </a:r>
+            <a:r>
+              <a:rPr lang="en-US" sz="2000" dirty="0">
+                <a:solidFill>
+                  <a:srgbClr val="C00000"/>
+                </a:solidFill>
+                <a:latin typeface="Minion Pro"/>
+                <a:cs typeface="Times New Roman" pitchFamily="18" charset="0"/>
+              </a:rPr>
+              <a:t>more SFI </a:t>
             </a:r>
             <a:r>
               <a:rPr lang="en-US" sz="1200" dirty="0">
@@ -12439,30 +12441,86 @@
                 <a:latin typeface="Minion Pro"/>
                 <a:cs typeface="Times New Roman" pitchFamily="18" charset="0"/>
               </a:rPr>
-              <a:t>Three  </a:t>
-            </a:r>
-            <a:r>
-              <a:rPr lang="en-US" sz="2000" dirty="0">
+              <a:t>Three large </a:t>
+            </a:r>
+            <a:r>
+              <a:rPr lang="en-US" sz="2000" dirty="0" err="1" smtClean="0">
                 <a:solidFill>
                   <a:srgbClr val="7030A0"/>
                 </a:solidFill>
                 <a:latin typeface="Minion Pro"/>
                 <a:cs typeface="Times New Roman" pitchFamily="18" charset="0"/>
               </a:rPr>
-              <a:t>large  Fastbus systems are being </a:t>
-            </a:r>
-          </a:p>
-          <a:p>
-            <a:pPr eaLnBrk="1" hangingPunct="1"/>
-            <a:r>
-              <a:rPr lang="en-US" sz="2000" dirty="0">
+              <a:t>Fastbus</a:t>
+            </a:r>
+            <a:r>
+              <a:rPr lang="en-US" sz="2000" dirty="0" smtClean="0">
                 <a:solidFill>
                   <a:srgbClr val="7030A0"/>
                 </a:solidFill>
                 <a:latin typeface="Minion Pro"/>
                 <a:cs typeface="Times New Roman" pitchFamily="18" charset="0"/>
               </a:rPr>
-              <a:t>    assembled  for  test in the  test  lab.</a:t>
+              <a:t> </a:t>
+            </a:r>
+            <a:r>
+              <a:rPr lang="en-US" sz="2000" dirty="0">
+                <a:solidFill>
+                  <a:srgbClr val="7030A0"/>
+                </a:solidFill>
+                <a:latin typeface="Minion Pro"/>
+                <a:cs typeface="Times New Roman" pitchFamily="18" charset="0"/>
+              </a:rPr>
+              <a:t>systems </a:t>
+            </a:r>
+            <a:r>
+              <a:rPr lang="en-US" sz="2000" dirty="0" smtClean="0">
+                <a:solidFill>
+                  <a:srgbClr val="7030A0"/>
+                </a:solidFill>
+                <a:latin typeface="Minion Pro"/>
+                <a:cs typeface="Times New Roman" pitchFamily="18" charset="0"/>
+              </a:rPr>
+              <a:t>assembled </a:t>
+            </a:r>
+            <a:br>
+              <a:rPr lang="en-US" sz="2000" dirty="0" smtClean="0">
+                <a:solidFill>
+                  <a:srgbClr val="7030A0"/>
+                </a:solidFill>
+                <a:latin typeface="Minion Pro"/>
+                <a:cs typeface="Times New Roman" pitchFamily="18" charset="0"/>
+              </a:rPr>
+            </a:br>
+            <a:r>
+              <a:rPr lang="en-US" sz="2000" dirty="0" smtClean="0">
+                <a:solidFill>
+                  <a:srgbClr val="7030A0"/>
+                </a:solidFill>
+                <a:latin typeface="Minion Pro"/>
+                <a:cs typeface="Times New Roman" pitchFamily="18" charset="0"/>
+              </a:rPr>
+              <a:t>in </a:t>
+            </a:r>
+            <a:r>
+              <a:rPr lang="en-US" sz="2000" dirty="0" smtClean="0">
+                <a:solidFill>
+                  <a:srgbClr val="7030A0"/>
+                </a:solidFill>
+                <a:latin typeface="Minion Pro"/>
+                <a:cs typeface="Times New Roman" pitchFamily="18" charset="0"/>
+              </a:rPr>
+              <a:t>the test lab</a:t>
+            </a:r>
+            <a:r>
+              <a:rPr lang="en-US" sz="2000" dirty="0">
+                <a:solidFill>
+                  <a:srgbClr val="7030A0"/>
+                </a:solidFill>
+                <a:latin typeface="Minion Pro"/>
+                <a:cs typeface="Times New Roman" pitchFamily="18" charset="0"/>
+              </a:rPr>
+              <a:t>.</a:t>
             </a:r>
             <a:endParaRPr lang="en-US" dirty="0" smtClean="0">
               <a:solidFill>
@@ -12564,7 +12622,7 @@
         </p:nvSpPr>
         <p:spPr>
           <a:xfrm>
-            <a:off x="3476291" y="1684280"/>
+            <a:off x="3657600" y="1684280"/>
             <a:ext cx="889647" cy="461665"/>
           </a:xfrm>
           <a:prstGeom prst="rect">
@@ -12581,7 +12639,7 @@
             <a:pPr eaLnBrk="1" hangingPunct="1"/>
             <a:r>
               <a:rPr lang="en-US" sz="1200" dirty="0">
-                <a:latin typeface="Georgia" panose="02040502050405020303" pitchFamily="18" charset="0"/>
+                <a:latin typeface="Minion Pro"/>
                 <a:cs typeface="Times New Roman" pitchFamily="18" charset="0"/>
               </a:rPr>
               <a:t>have  113</a:t>
@@ -12591,7 +12649,7 @@
             <a:pPr eaLnBrk="1" hangingPunct="1"/>
             <a:r>
               <a:rPr lang="en-US" sz="1200" dirty="0">
-                <a:latin typeface="Georgia" panose="02040502050405020303" pitchFamily="18" charset="0"/>
+                <a:latin typeface="Minion Pro"/>
                 <a:cs typeface="Times New Roman" pitchFamily="18" charset="0"/>
               </a:rPr>
               <a:t>need  94</a:t>
@@ -12607,7 +12665,7 @@
         </p:nvSpPr>
         <p:spPr>
           <a:xfrm>
-            <a:off x="2544604" y="1690978"/>
+            <a:off x="2667000" y="1695141"/>
             <a:ext cx="889647" cy="461665"/>
           </a:xfrm>
           <a:prstGeom prst="rect">
@@ -12624,7 +12682,7 @@
             <a:pPr eaLnBrk="1" hangingPunct="1"/>
             <a:r>
               <a:rPr lang="en-US" sz="1200" dirty="0">
-                <a:latin typeface="Georgia" panose="02040502050405020303" pitchFamily="18" charset="0"/>
+                <a:latin typeface="Minion Pro"/>
                 <a:cs typeface="Times New Roman" pitchFamily="18" charset="0"/>
               </a:rPr>
               <a:t>have  236</a:t>
@@ -12634,7 +12692,7 @@
             <a:pPr eaLnBrk="1" hangingPunct="1"/>
             <a:r>
               <a:rPr lang="en-US" sz="1200" dirty="0">
-                <a:latin typeface="Georgia" panose="02040502050405020303" pitchFamily="18" charset="0"/>
+                <a:latin typeface="Minion Pro"/>
                 <a:cs typeface="Times New Roman" pitchFamily="18" charset="0"/>
               </a:rPr>
               <a:t>need  124</a:t>
@@ -12650,7 +12708,7 @@
         </p:nvSpPr>
         <p:spPr>
           <a:xfrm>
-            <a:off x="4425963" y="1688749"/>
+            <a:off x="4571408" y="1681164"/>
             <a:ext cx="889647" cy="461665"/>
           </a:xfrm>
           <a:prstGeom prst="rect">
@@ -12667,7 +12725,7 @@
             <a:pPr eaLnBrk="1" hangingPunct="1"/>
             <a:r>
               <a:rPr lang="en-US" sz="1200" dirty="0">
-                <a:latin typeface="Georgia" panose="02040502050405020303" pitchFamily="18" charset="0"/>
+                <a:latin typeface="Minion Pro"/>
                 <a:cs typeface="Times New Roman" pitchFamily="18" charset="0"/>
               </a:rPr>
               <a:t>have  30</a:t>
@@ -12677,7 +12735,7 @@
             <a:pPr eaLnBrk="1" hangingPunct="1"/>
             <a:r>
               <a:rPr lang="en-US" sz="1200" dirty="0">
-                <a:latin typeface="Georgia" panose="02040502050405020303" pitchFamily="18" charset="0"/>
+                <a:latin typeface="Minion Pro"/>
                 <a:cs typeface="Times New Roman" pitchFamily="18" charset="0"/>
               </a:rPr>
               <a:t>need  21</a:t>
@@ -12722,8 +12780,61 @@
           <a:chExt cx="0" cy="0"/>
         </a:xfrm>
       </p:grpSpPr>
-      <mc:AlternateContent xmlns:mc="http://schemas.openxmlformats.org/markup-compatibility/2006">
-        <mc:Choice xmlns:a14="http://schemas.microsoft.com/office/drawing/2010/main" Requires="a14">
+      <p:pic>
+        <p:nvPicPr>
+          <p:cNvPr id="1026" name="Picture 2"/>
+          <p:cNvPicPr>
+            <a:picLocks noChangeAspect="1" noChangeArrowheads="1"/>
+          </p:cNvPicPr>
+          <p:nvPr/>
+        </p:nvPicPr>
+        <p:blipFill>
+          <a:blip r:embed="rId2">
+            <a:extLst>
+              <a:ext uri="{28A0092B-C50C-407E-A947-70E740481C1C}">
+                <a14:useLocalDpi xmlns:a14="http://schemas.microsoft.com/office/drawing/2010/main" val="0"/>
+              </a:ext>
+            </a:extLst>
+          </a:blip>
+          <a:stretch>
+            <a:fillRect/>
+          </a:stretch>
+        </p:blipFill>
+        <p:spPr bwMode="auto">
+          <a:xfrm>
+            <a:off x="97200" y="840058"/>
+            <a:ext cx="8948160" cy="5406179"/>
+          </a:xfrm>
+          <a:prstGeom prst="rect">
+            <a:avLst/>
+          </a:prstGeom>
+          <a:noFill/>
+          <a:ln>
+            <a:noFill/>
+          </a:ln>
+          <a:extLst>
+            <a:ext uri="{909E8E84-426E-40DD-AFC4-6F175D3DCCD1}">
+              <a14:hiddenFill xmlns:a14="http://schemas.microsoft.com/office/drawing/2010/main">
+                <a:solidFill>
+                  <a:schemeClr val="accent1"/>
+                </a:solidFill>
+              </a14:hiddenFill>
+            </a:ext>
+            <a:ext uri="{91240B29-F687-4F45-9708-019B960494DF}">
+              <a14:hiddenLine xmlns:a14="http://schemas.microsoft.com/office/drawing/2010/main" w="9525">
+                <a:solidFill>
+                  <a:schemeClr val="tx1"/>
+                </a:solidFill>
+                <a:miter lim="800000"/>
+                <a:headEnd/>
+                <a:tailEnd/>
+              </a14:hiddenLine>
+            </a:ext>
+          </a:extLst>
+        </p:spPr>
+      </p:pic>
+      <mc:AlternateContent xmlns:mc="http://schemas.openxmlformats.org/markup-compatibility/2006" xmlns:a14="http://schemas.microsoft.com/office/drawing/2010/main">
+        <mc:Choice Requires="a14">
           <p:sp>
             <p:nvSpPr>
               <p:cNvPr id="6" name="Title 5"/>
@@ -12786,18 +12897,14 @@
                 </a14:m>
                 <a:r>
                   <a:rPr lang="it-IT" dirty="0" smtClean="0"/>
-                  <a:t> DAQ </a:t>
-                </a:r>
-                <a:r>
-                  <a:rPr lang="it-IT" dirty="0" smtClean="0"/>
-                  <a:t>Configuration / both arms</a:t>
+                  <a:t> DAQ Configuration / both arms</a:t>
                 </a:r>
                 <a:endParaRPr lang="it-IT" dirty="0"/>
               </a:p>
             </p:txBody>
           </p:sp>
         </mc:Choice>
-        <mc:Fallback>
+        <mc:Fallback xmlns="">
           <p:sp>
             <p:nvSpPr>
               <p:cNvPr id="6" name="Title 5"/>
@@ -12810,7 +12917,7 @@
             </p:nvSpPr>
             <p:spPr>
               <a:blipFill rotWithShape="1">
-                <a:blip r:embed="rId2"/>
+                <a:blip r:embed="rId3"/>
                 <a:stretch>
                   <a:fillRect t="-60000" b="-95385"/>
                 </a:stretch>
@@ -12851,34 +12958,8 @@
             </a:pPr>
             <a:fld id="{D71A591E-0AAE-49BD-BAFD-8583FDD55043}" type="datetime1">
               <a:rPr lang="en-US" smtClean="0"/>
-              <a:t>11/2/2015</a:t>
+              <a:t>11/3/2015</a:t>
             </a:fld>
-            <a:endParaRPr lang="en-US"/>
-          </a:p>
-        </p:txBody>
-      </p:sp>
-      <p:sp>
-        <p:nvSpPr>
-          <p:cNvPr id="3" name="Footer Placeholder 2"/>
-          <p:cNvSpPr>
-            <a:spLocks noGrp="1"/>
-          </p:cNvSpPr>
-          <p:nvPr>
-            <p:ph type="ftr" sz="quarter" idx="11"/>
-          </p:nvPr>
-        </p:nvSpPr>
-        <p:spPr/>
-        <p:txBody>
-          <a:bodyPr/>
-          <a:lstStyle/>
-          <a:p>
-            <a:pPr>
-              <a:defRPr/>
-            </a:pPr>
-            <a:r>
-              <a:rPr lang="en-US" smtClean="0"/>
-              <a:t>SBS Collaboration Meeting</a:t>
-            </a:r>
             <a:endParaRPr lang="en-US"/>
           </a:p>
         </p:txBody>
@@ -12920,7 +13001,7 @@
         </p:nvSpPr>
         <p:spPr>
           <a:xfrm>
-            <a:off x="402653" y="6047816"/>
+            <a:off x="244345" y="5410062"/>
             <a:ext cx="4376272" cy="637754"/>
           </a:xfrm>
           <a:prstGeom prst="rect">
@@ -13146,53 +13227,13 @@
       </p:sp>
       <p:sp>
         <p:nvSpPr>
-          <p:cNvPr id="28" name="Isosceles Triangle 27"/>
-          <p:cNvSpPr/>
-          <p:nvPr/>
-        </p:nvSpPr>
-        <p:spPr>
-          <a:xfrm rot="5400000">
-            <a:off x="6615076" y="4717252"/>
-            <a:ext cx="221766" cy="258235"/>
-          </a:xfrm>
-          <a:prstGeom prst="triangle">
-            <a:avLst/>
-          </a:prstGeom>
-        </p:spPr>
-        <p:style>
-          <a:lnRef idx="2">
-            <a:schemeClr val="accent1">
-              <a:shade val="50000"/>
-            </a:schemeClr>
-          </a:lnRef>
-          <a:fillRef idx="1">
-            <a:schemeClr val="accent1"/>
-          </a:fillRef>
-          <a:effectRef idx="0">
-            <a:schemeClr val="accent1"/>
-          </a:effectRef>
-          <a:fontRef idx="minor">
-            <a:schemeClr val="lt1"/>
-          </a:fontRef>
-        </p:style>
-        <p:txBody>
-          <a:bodyPr lIns="82945" tIns="41473" rIns="82945" bIns="41473" rtlCol="0" anchor="ctr"/>
-          <a:lstStyle/>
-          <a:p>
-            <a:pPr algn="ctr"/>
-            <a:endParaRPr lang="en-US"/>
-          </a:p>
-        </p:txBody>
-      </p:sp>
-      <p:sp>
-        <p:nvSpPr>
           <p:cNvPr id="24" name="TextBox 23"/>
           <p:cNvSpPr txBox="1"/>
           <p:nvPr/>
         </p:nvSpPr>
         <p:spPr>
           <a:xfrm>
-            <a:off x="1959300" y="1137346"/>
+            <a:off x="1905000" y="838200"/>
             <a:ext cx="875268" cy="360755"/>
           </a:xfrm>
           <a:prstGeom prst="rect">
@@ -13214,60 +13255,6 @@
           </a:p>
         </p:txBody>
       </p:sp>
-      <p:pic>
-        <p:nvPicPr>
-          <p:cNvPr id="1026" name="Picture 2"/>
-          <p:cNvPicPr>
-            <a:picLocks noChangeAspect="1" noChangeArrowheads="1"/>
-          </p:cNvPicPr>
-          <p:nvPr/>
-        </p:nvPicPr>
-        <p:blipFill>
-          <a:blip r:embed="rId3">
-            <a:extLst>
-              <a:ext uri="{28A0092B-C50C-407E-A947-70E740481C1C}">
-                <a14:useLocalDpi xmlns:a14="http://schemas.microsoft.com/office/drawing/2010/main" val="0"/>
-              </a:ext>
-            </a:extLst>
-          </a:blip>
-          <a:srcRect/>
-          <a:stretch>
-            <a:fillRect/>
-          </a:stretch>
-        </p:blipFill>
-        <p:spPr bwMode="auto">
-          <a:xfrm>
-            <a:off x="195840" y="1492213"/>
-            <a:ext cx="9046765" cy="6398092"/>
-          </a:xfrm>
-          <a:prstGeom prst="rect">
-            <a:avLst/>
-          </a:prstGeom>
-          <a:noFill/>
-          <a:ln>
-            <a:noFill/>
-          </a:ln>
-          <a:extLst>
-            <a:ext uri="{909E8E84-426E-40DD-AFC4-6F175D3DCCD1}">
-              <a14:hiddenFill xmlns:a14="http://schemas.microsoft.com/office/drawing/2010/main">
-                <a:solidFill>
-                  <a:schemeClr val="accent1"/>
-                </a:solidFill>
-              </a14:hiddenFill>
-            </a:ext>
-            <a:ext uri="{91240B29-F687-4F45-9708-019B960494DF}">
-              <a14:hiddenLine xmlns:a14="http://schemas.microsoft.com/office/drawing/2010/main" w="9525">
-                <a:solidFill>
-                  <a:schemeClr val="tx1"/>
-                </a:solidFill>
-                <a:miter lim="800000"/>
-                <a:headEnd/>
-                <a:tailEnd/>
-              </a14:hiddenLine>
-            </a:ext>
-          </a:extLst>
-        </p:spPr>
-      </p:pic>
     </p:spTree>
     <p:extLst>
       <p:ext uri="{BB962C8B-B14F-4D97-AF65-F5344CB8AC3E}">
@@ -13472,14 +13459,14 @@
           <p:nvPr>
             <p:extLst>
               <p:ext uri="{D42A27DB-BD31-4B8C-83A1-F6EECF244321}">
-                <p14:modId xmlns:p14="http://schemas.microsoft.com/office/powerpoint/2010/main" val="2733529193"/>
+                <p14:modId xmlns:p14="http://schemas.microsoft.com/office/powerpoint/2010/main" val="1544091857"/>
               </p:ext>
             </p:extLst>
           </p:nvPr>
         </p:nvGraphicFramePr>
         <p:xfrm>
-          <a:off x="457200" y="967812"/>
-          <a:ext cx="6376892" cy="5403850"/>
+          <a:off x="609600" y="814702"/>
+          <a:ext cx="6084764" cy="5433698"/>
         </p:xfrm>
         <a:graphic>
           <a:graphicData uri="http://schemas.openxmlformats.org/drawingml/2006/chart">
@@ -13563,13 +13550,63 @@
       </p:sp>
       <p:sp>
         <p:nvSpPr>
-          <p:cNvPr id="7" name="TextBox 6"/>
+          <p:cNvPr id="19" name="TextBox 18"/>
           <p:cNvSpPr txBox="1"/>
           <p:nvPr/>
         </p:nvSpPr>
         <p:spPr>
           <a:xfrm>
-            <a:off x="6459199" y="1630710"/>
+            <a:off x="6694364" y="2916463"/>
+            <a:ext cx="2304618" cy="1200329"/>
+          </a:xfrm>
+          <a:prstGeom prst="rect">
+            <a:avLst/>
+          </a:prstGeom>
+          <a:noFill/>
+        </p:spPr>
+        <p:txBody>
+          <a:bodyPr wrap="square" rtlCol="0">
+            <a:spAutoFit/>
+          </a:bodyPr>
+          <a:lstStyle/>
+          <a:p>
+            <a:r>
+              <a:rPr lang="en-US" dirty="0" smtClean="0"/>
+              <a:t>Dead time at</a:t>
+            </a:r>
+          </a:p>
+          <a:p>
+            <a:r>
+              <a:rPr lang="en-US" dirty="0" smtClean="0"/>
+              <a:t>Local ~ 200 kHz and Readout ~5kHz</a:t>
+            </a:r>
+          </a:p>
+          <a:p>
+            <a:r>
+              <a:rPr lang="en-US" dirty="0" smtClean="0"/>
+              <a:t>D</a:t>
+            </a:r>
+            <a:r>
+              <a:rPr lang="en-US" baseline="-25000" dirty="0" smtClean="0"/>
+              <a:t>1</a:t>
+            </a:r>
+            <a:r>
+              <a:rPr lang="en-US" dirty="0" smtClean="0"/>
+              <a:t> ~40%</a:t>
+            </a:r>
+            <a:endParaRPr lang="en-US" dirty="0"/>
+          </a:p>
+        </p:txBody>
+      </p:sp>
+      <p:sp>
+        <p:nvSpPr>
+          <p:cNvPr id="13" name="TextBox 12"/>
+          <p:cNvSpPr txBox="1"/>
+          <p:nvPr/>
+        </p:nvSpPr>
+        <p:spPr>
+          <a:xfrm>
+            <a:off x="6459199" y="1005103"/>
             <a:ext cx="2539783" cy="470398"/>
           </a:xfrm>
           <a:prstGeom prst="rect">
@@ -13647,28 +13684,342 @@
             <a:r>
               <a:rPr lang="en-US" sz="2000" dirty="0" smtClean="0">
                 <a:solidFill>
+                  <a:srgbClr val="0000FF"/>
+                </a:solidFill>
+              </a:rPr>
+              <a:t>Local trigger ~ 50 </a:t>
+            </a:r>
+            <a:r>
+              <a:rPr lang="en-US" sz="2000" dirty="0" smtClean="0">
+                <a:solidFill>
+                  <a:srgbClr val="0000FF"/>
+                </a:solidFill>
+              </a:rPr>
+              <a:t>kHz</a:t>
+            </a:r>
+          </a:p>
+          <a:p>
+            <a:r>
+              <a:rPr lang="en-US" sz="2000" dirty="0">
+                <a:solidFill>
                   <a:srgbClr val="FF0000"/>
                 </a:solidFill>
               </a:rPr>
               <a:t>Local trigger ~ 100 kHz</a:t>
             </a:r>
+          </a:p>
+          <a:p>
+            <a:r>
+              <a:rPr lang="en-US" sz="2000" dirty="0">
+                <a:solidFill>
+                  <a:srgbClr val="008000"/>
+                </a:solidFill>
+              </a:rPr>
+              <a:t>Local trigger ~ 200 kHz</a:t>
+            </a:r>
+          </a:p>
+          <a:p>
             <a:endParaRPr lang="en-US" sz="2000" dirty="0">
               <a:solidFill>
-                <a:srgbClr val="FF0000"/>
+                <a:srgbClr val="0000FF"/>
               </a:solidFill>
             </a:endParaRPr>
           </a:p>
         </p:txBody>
       </p:sp>
-      <p:sp>
-        <p:nvSpPr>
-          <p:cNvPr id="8" name="TextBox 7"/>
+      <p:cxnSp>
+        <p:nvCxnSpPr>
+          <p:cNvPr id="16" name="Elbow Connector 15"/>
+          <p:cNvCxnSpPr/>
+          <p:nvPr/>
+        </p:nvCxnSpPr>
+        <p:spPr>
+          <a:xfrm rot="5400000" flipH="1" flipV="1">
+            <a:off x="1947620" y="5824782"/>
+            <a:ext cx="420127" cy="200566"/>
+          </a:xfrm>
+          <a:prstGeom prst="bentConnector3">
+            <a:avLst>
+              <a:gd name="adj1" fmla="val 2223"/>
+            </a:avLst>
+          </a:prstGeom>
+          <a:ln>
+            <a:solidFill>
+              <a:srgbClr val="800000"/>
+            </a:solidFill>
+            <a:tailEnd type="arrow"/>
+          </a:ln>
+          <a:effectLst/>
+        </p:spPr>
+        <p:style>
+          <a:lnRef idx="2">
+            <a:schemeClr val="accent1"/>
+          </a:lnRef>
+          <a:fillRef idx="0">
+            <a:schemeClr val="accent1"/>
+          </a:fillRef>
+          <a:effectRef idx="1">
+            <a:schemeClr val="accent1"/>
+          </a:effectRef>
+          <a:fontRef idx="minor">
+            <a:schemeClr val="tx1"/>
+          </a:fontRef>
+        </p:style>
+      </p:cxnSp>
+      <p:sp>
+        <p:nvSpPr>
+          <p:cNvPr id="17" name="TextBox 16"/>
           <p:cNvSpPr txBox="1"/>
           <p:nvPr/>
         </p:nvSpPr>
         <p:spPr>
           <a:xfrm>
-            <a:off x="6459199" y="1160312"/>
+            <a:off x="76200" y="5925065"/>
+            <a:ext cx="2273262" cy="369332"/>
+          </a:xfrm>
+          <a:prstGeom prst="rect">
+            <a:avLst/>
+          </a:prstGeom>
+          <a:noFill/>
+        </p:spPr>
+        <p:txBody>
+          <a:bodyPr wrap="square" rtlCol="0">
+            <a:spAutoFit/>
+          </a:bodyPr>
+          <a:lstStyle/>
+          <a:p>
+            <a:r>
+              <a:rPr lang="en-US" dirty="0" smtClean="0">
+                <a:solidFill>
+                  <a:srgbClr val="800000"/>
+                </a:solidFill>
+              </a:rPr>
+              <a:t>Expected ~ 5000 Hz</a:t>
+            </a:r>
+            <a:endParaRPr lang="en-US" dirty="0">
+              <a:solidFill>
+                <a:srgbClr val="800000"/>
+              </a:solidFill>
+            </a:endParaRPr>
+          </a:p>
+        </p:txBody>
+      </p:sp>
+    </p:spTree>
+    <p:extLst>
+      <p:ext uri="{BB962C8B-B14F-4D97-AF65-F5344CB8AC3E}">
+        <p14:creationId xmlns:p14="http://schemas.microsoft.com/office/powerpoint/2010/main" val="718382872"/>
+      </p:ext>
+    </p:extLst>
+  </p:cSld>
+  <p:clrMapOvr>
+    <a:masterClrMapping/>
+  </p:clrMapOvr>
+  <p:timing>
+    <p:tnLst>
+      <p:par>
+        <p:cTn id="1" dur="indefinite" restart="never" nodeType="tmRoot"/>
+      </p:par>
+    </p:tnLst>
+  </p:timing>
+</p:sld>
+</file>
+
+<file path=ppt/slides/slide9.xml><?xml version="1.0" encoding="utf-8"?>
+<p:sld xmlns:a="http://schemas.openxmlformats.org/drawingml/2006/main" xmlns:r="http://schemas.openxmlformats.org/officeDocument/2006/relationships" xmlns:p="http://schemas.openxmlformats.org/presentationml/2006/main">
+  <p:cSld>
+    <p:spTree>
+      <p:nvGrpSpPr>
+        <p:cNvPr id="1" name=""/>
+        <p:cNvGrpSpPr/>
+        <p:nvPr/>
+      </p:nvGrpSpPr>
+      <p:grpSpPr>
+        <a:xfrm>
+          <a:off x="0" y="0"/>
+          <a:ext cx="0" cy="0"/>
+          <a:chOff x="0" y="0"/>
+          <a:chExt cx="0" cy="0"/>
+        </a:xfrm>
+      </p:grpSpPr>
+      <p:sp>
+        <p:nvSpPr>
+          <p:cNvPr id="2" name="Title 1"/>
+          <p:cNvSpPr>
+            <a:spLocks noGrp="1"/>
+          </p:cNvSpPr>
+          <p:nvPr>
+            <p:ph type="title"/>
+          </p:nvPr>
+        </p:nvSpPr>
+        <p:spPr/>
+        <p:txBody>
+          <a:bodyPr/>
+          <a:lstStyle/>
+          <a:p>
+            <a:r>
+              <a:rPr lang="en-US" dirty="0"/>
+              <a:t>3 Crates, Buffer Level = </a:t>
+            </a:r>
+            <a:r>
+              <a:rPr lang="en-US" dirty="0" smtClean="0"/>
+              <a:t>4</a:t>
+            </a:r>
+            <a:endParaRPr lang="en-US" dirty="0"/>
+          </a:p>
+        </p:txBody>
+      </p:sp>
+      <p:sp>
+        <p:nvSpPr>
+          <p:cNvPr id="4" name="Rounded Rectangle 3"/>
+          <p:cNvSpPr/>
+          <p:nvPr/>
+        </p:nvSpPr>
+        <p:spPr>
+          <a:xfrm>
+            <a:off x="6873381" y="4459585"/>
+            <a:ext cx="1592560" cy="595836"/>
+          </a:xfrm>
+          <a:prstGeom prst="roundRect">
+            <a:avLst/>
+          </a:prstGeom>
+          <a:noFill/>
+          <a:ln w="38100" cmpd="sng">
+            <a:solidFill>
+              <a:srgbClr val="800000"/>
+            </a:solidFill>
+          </a:ln>
+          <a:effectLst/>
+        </p:spPr>
+        <p:style>
+          <a:lnRef idx="1">
+            <a:schemeClr val="accent1"/>
+          </a:lnRef>
+          <a:fillRef idx="3">
+            <a:schemeClr val="accent1"/>
+          </a:fillRef>
+          <a:effectRef idx="2">
+            <a:schemeClr val="accent1"/>
+          </a:effectRef>
+          <a:fontRef idx="minor">
+            <a:schemeClr val="lt1"/>
+          </a:fontRef>
+        </p:style>
+        <p:txBody>
+          <a:bodyPr rtlCol="0" anchor="ctr"/>
+          <a:lstStyle/>
+          <a:p>
+            <a:pPr algn="ctr"/>
+            <a:endParaRPr lang="en-US"/>
+          </a:p>
+        </p:txBody>
+      </p:sp>
+      <p:graphicFrame>
+        <p:nvGraphicFramePr>
+          <p:cNvPr id="5" name="Chart 4"/>
+          <p:cNvGraphicFramePr>
+            <a:graphicFrameLocks/>
+          </p:cNvGraphicFramePr>
+          <p:nvPr>
+            <p:extLst>
+              <p:ext uri="{D42A27DB-BD31-4B8C-83A1-F6EECF244321}">
+                <p14:modId xmlns:p14="http://schemas.microsoft.com/office/powerpoint/2010/main" val="3134079830"/>
+              </p:ext>
+            </p:extLst>
+          </p:nvPr>
+        </p:nvGraphicFramePr>
+        <p:xfrm>
+          <a:off x="457201" y="809012"/>
+          <a:ext cx="6237164" cy="5363188"/>
+        </p:xfrm>
+        <a:graphic>
+          <a:graphicData uri="http://schemas.openxmlformats.org/drawingml/2006/chart">
+            <c:chart xmlns:c="http://schemas.openxmlformats.org/drawingml/2006/chart" xmlns:r="http://schemas.openxmlformats.org/officeDocument/2006/relationships" r:id="rId2"/>
+          </a:graphicData>
+        </a:graphic>
+      </p:graphicFrame>
+      <p:sp>
+        <p:nvSpPr>
+          <p:cNvPr id="6" name="TextBox 5"/>
+          <p:cNvSpPr txBox="1"/>
+          <p:nvPr/>
+        </p:nvSpPr>
+        <p:spPr>
+          <a:xfrm>
+            <a:off x="1614798" y="1010003"/>
+            <a:ext cx="2508426" cy="707886"/>
+          </a:xfrm>
+          <a:prstGeom prst="rect">
+            <a:avLst/>
+          </a:prstGeom>
+          <a:noFill/>
+        </p:spPr>
+        <p:txBody>
+          <a:bodyPr wrap="square" rtlCol="0">
+            <a:spAutoFit/>
+          </a:bodyPr>
+          <a:lstStyle/>
+          <a:p>
+            <a:r>
+              <a:rPr lang="en-US" sz="2000" b="1" dirty="0" smtClean="0"/>
+              <a:t>No Pedestal </a:t>
+            </a:r>
+          </a:p>
+          <a:p>
+            <a:r>
+              <a:rPr lang="en-US" sz="2000" b="1" dirty="0" smtClean="0"/>
+              <a:t>Suppression (8ADCs) </a:t>
+            </a:r>
+            <a:endParaRPr lang="en-US" sz="2000" b="1" dirty="0"/>
+          </a:p>
+        </p:txBody>
+      </p:sp>
+      <p:sp>
+        <p:nvSpPr>
+          <p:cNvPr id="7" name="TextBox 6"/>
+          <p:cNvSpPr txBox="1"/>
+          <p:nvPr/>
+        </p:nvSpPr>
+        <p:spPr>
+          <a:xfrm>
+            <a:off x="4636211" y="4580623"/>
+            <a:ext cx="1822988" cy="707886"/>
+          </a:xfrm>
+          <a:prstGeom prst="rect">
+            <a:avLst/>
+          </a:prstGeom>
+          <a:noFill/>
+        </p:spPr>
+        <p:txBody>
+          <a:bodyPr wrap="square" rtlCol="0">
+            <a:spAutoFit/>
+          </a:bodyPr>
+          <a:lstStyle/>
+          <a:p>
+            <a:pPr algn="r"/>
+            <a:r>
+              <a:rPr lang="en-US" sz="2000" b="1" dirty="0" smtClean="0"/>
+              <a:t>Pedestal </a:t>
+            </a:r>
+          </a:p>
+          <a:p>
+            <a:pPr algn="r"/>
+            <a:r>
+              <a:rPr lang="en-US" sz="2000" b="1" dirty="0" smtClean="0"/>
+              <a:t>Suppressed </a:t>
+            </a:r>
+            <a:endParaRPr lang="en-US" sz="2000" b="1" dirty="0"/>
+          </a:p>
+        </p:txBody>
+      </p:sp>
+      <p:sp>
+        <p:nvSpPr>
+          <p:cNvPr id="9" name="TextBox 8"/>
+          <p:cNvSpPr txBox="1"/>
+          <p:nvPr/>
+        </p:nvSpPr>
+        <p:spPr>
+          <a:xfrm>
+            <a:off x="6459199" y="1005103"/>
             <a:ext cx="2539783" cy="470398"/>
           </a:xfrm>
           <a:prstGeom prst="rect">
@@ -13749,126 +14100,41 @@
                   <a:srgbClr val="0000FF"/>
                 </a:solidFill>
               </a:rPr>
-              <a:t>Local trigger ~ 50 kHz</a:t>
-            </a:r>
+              <a:t>Local trigger ~ 50 </a:t>
+            </a:r>
+            <a:r>
+              <a:rPr lang="en-US" sz="2000" dirty="0" smtClean="0">
+                <a:solidFill>
+                  <a:srgbClr val="0000FF"/>
+                </a:solidFill>
+              </a:rPr>
+              <a:t>kHz</a:t>
+            </a:r>
+          </a:p>
+          <a:p>
+            <a:r>
+              <a:rPr lang="en-US" sz="2000" dirty="0">
+                <a:solidFill>
+                  <a:srgbClr val="FF0000"/>
+                </a:solidFill>
+              </a:rPr>
+              <a:t>Local trigger ~ 100 kHz</a:t>
+            </a:r>
+          </a:p>
+          <a:p>
+            <a:r>
+              <a:rPr lang="en-US" sz="2000" dirty="0">
+                <a:solidFill>
+                  <a:srgbClr val="008000"/>
+                </a:solidFill>
+              </a:rPr>
+              <a:t>Local trigger ~ 200 kHz</a:t>
+            </a:r>
+          </a:p>
+          <a:p>
             <a:endParaRPr lang="en-US" sz="2000" dirty="0">
               <a:solidFill>
                 <a:srgbClr val="0000FF"/>
-              </a:solidFill>
-            </a:endParaRPr>
-          </a:p>
-        </p:txBody>
-      </p:sp>
-      <p:sp>
-        <p:nvSpPr>
-          <p:cNvPr id="9" name="TextBox 8"/>
-          <p:cNvSpPr txBox="1"/>
-          <p:nvPr/>
-        </p:nvSpPr>
-        <p:spPr>
-          <a:xfrm>
-            <a:off x="6459199" y="2045268"/>
-            <a:ext cx="2539783" cy="470398"/>
-          </a:xfrm>
-          <a:prstGeom prst="rect">
-            <a:avLst/>
-          </a:prstGeom>
-        </p:spPr>
-        <p:txBody>
-          <a:bodyPr wrap="square" rtlCol="0"/>
-          <a:lstStyle>
-            <a:lvl1pPr marL="0" indent="0">
-              <a:defRPr sz="1100">
-                <a:latin typeface="+mn-lt"/>
-                <a:ea typeface="+mn-ea"/>
-                <a:cs typeface="+mn-cs"/>
-              </a:defRPr>
-            </a:lvl1pPr>
-            <a:lvl2pPr marL="457200" indent="0">
-              <a:defRPr sz="1100">
-                <a:latin typeface="+mn-lt"/>
-                <a:ea typeface="+mn-ea"/>
-                <a:cs typeface="+mn-cs"/>
-              </a:defRPr>
-            </a:lvl2pPr>
-            <a:lvl3pPr marL="914400" indent="0">
-              <a:defRPr sz="1100">
-                <a:latin typeface="+mn-lt"/>
-                <a:ea typeface="+mn-ea"/>
-                <a:cs typeface="+mn-cs"/>
-              </a:defRPr>
-            </a:lvl3pPr>
-            <a:lvl4pPr marL="1371600" indent="0">
-              <a:defRPr sz="1100">
-                <a:latin typeface="+mn-lt"/>
-                <a:ea typeface="+mn-ea"/>
-                <a:cs typeface="+mn-cs"/>
-              </a:defRPr>
-            </a:lvl4pPr>
-            <a:lvl5pPr marL="1828800" indent="0">
-              <a:defRPr sz="1100">
-                <a:latin typeface="+mn-lt"/>
-                <a:ea typeface="+mn-ea"/>
-                <a:cs typeface="+mn-cs"/>
-              </a:defRPr>
-            </a:lvl5pPr>
-            <a:lvl6pPr marL="2286000" indent="0">
-              <a:defRPr sz="1100">
-                <a:latin typeface="+mn-lt"/>
-                <a:ea typeface="+mn-ea"/>
-                <a:cs typeface="+mn-cs"/>
-              </a:defRPr>
-            </a:lvl6pPr>
-            <a:lvl7pPr marL="2743200" indent="0">
-              <a:defRPr sz="1100">
-                <a:latin typeface="+mn-lt"/>
-                <a:ea typeface="+mn-ea"/>
-                <a:cs typeface="+mn-cs"/>
-              </a:defRPr>
-            </a:lvl7pPr>
-            <a:lvl8pPr marL="3200400" indent="0">
-              <a:defRPr sz="1100">
-                <a:latin typeface="+mn-lt"/>
-                <a:ea typeface="+mn-ea"/>
-                <a:cs typeface="+mn-cs"/>
-              </a:defRPr>
-            </a:lvl8pPr>
-            <a:lvl9pPr marL="3657600" indent="0">
-              <a:defRPr sz="1100">
-                <a:latin typeface="+mn-lt"/>
-                <a:ea typeface="+mn-ea"/>
-                <a:cs typeface="+mn-cs"/>
-              </a:defRPr>
-            </a:lvl9pPr>
-          </a:lstStyle>
-          <a:p>
-            <a:r>
-              <a:rPr lang="en-US" sz="2000" dirty="0" smtClean="0">
-                <a:solidFill>
-                  <a:srgbClr val="008000"/>
-                </a:solidFill>
-              </a:rPr>
-              <a:t>Local trigger </a:t>
-            </a:r>
-            <a:r>
-              <a:rPr lang="en-US" sz="2000" dirty="0">
-                <a:solidFill>
-                  <a:srgbClr val="008000"/>
-                </a:solidFill>
-              </a:rPr>
-              <a:t>~</a:t>
-            </a:r>
-            <a:r>
-              <a:rPr lang="en-US" sz="2000" dirty="0" smtClean="0">
-                <a:solidFill>
-                  <a:srgbClr val="008000"/>
-                </a:solidFill>
-              </a:rPr>
-              <a:t> 200 kHz</a:t>
-            </a:r>
-            <a:endParaRPr lang="en-US" sz="2000" dirty="0">
-              <a:solidFill>
-                <a:srgbClr val="008000"/>
               </a:solidFill>
             </a:endParaRPr>
           </a:p>
@@ -13881,13 +14147,13 @@
           <p:nvPr/>
         </p:nvCxnSpPr>
         <p:spPr>
-          <a:xfrm rot="16200000" flipV="1">
-            <a:off x="2152212" y="6034938"/>
-            <a:ext cx="370074" cy="279649"/>
+          <a:xfrm rot="5400000" flipH="1" flipV="1">
+            <a:off x="1947620" y="5824782"/>
+            <a:ext cx="420127" cy="200566"/>
           </a:xfrm>
           <a:prstGeom prst="bentConnector3">
             <a:avLst>
-              <a:gd name="adj1" fmla="val -844"/>
+              <a:gd name="adj1" fmla="val 2223"/>
             </a:avLst>
           </a:prstGeom>
           <a:ln>
@@ -13915,13 +14181,13 @@
       </p:cxnSp>
       <p:sp>
         <p:nvSpPr>
-          <p:cNvPr id="18" name="TextBox 17"/>
+          <p:cNvPr id="12" name="TextBox 11"/>
           <p:cNvSpPr txBox="1"/>
           <p:nvPr/>
         </p:nvSpPr>
         <p:spPr>
           <a:xfrm>
-            <a:off x="2602493" y="6359800"/>
+            <a:off x="76200" y="5925065"/>
             <a:ext cx="2273262" cy="369332"/>
           </a:xfrm>
           <a:prstGeom prst="rect">
@@ -13953,13 +14219,13 @@
       </p:sp>
       <p:sp>
         <p:nvSpPr>
-          <p:cNvPr id="19" name="TextBox 18"/>
+          <p:cNvPr id="13" name="TextBox 12"/>
           <p:cNvSpPr txBox="1"/>
           <p:nvPr/>
         </p:nvSpPr>
         <p:spPr>
           <a:xfrm>
-            <a:off x="6694364" y="2916463"/>
+            <a:off x="6694364" y="2734795"/>
             <a:ext cx="2304618" cy="1200329"/>
           </a:xfrm>
           <a:prstGeom prst="rect">
@@ -13990,614 +14256,14 @@
               <a:t>D</a:t>
             </a:r>
             <a:r>
-              <a:rPr lang="en-US" baseline="-25000" dirty="0" smtClean="0"/>
-              <a:t>1</a:t>
+              <a:rPr lang="en-US" baseline="-25000" dirty="0"/>
+              <a:t>3</a:t>
             </a:r>
             <a:r>
               <a:rPr lang="en-US" dirty="0" smtClean="0"/>
-              <a:t> ~40%</a:t>
+              <a:t> ~6%</a:t>
             </a:r>
             <a:endParaRPr lang="en-US" dirty="0"/>
-          </a:p>
-        </p:txBody>
-      </p:sp>
-    </p:spTree>
-    <p:extLst>
-      <p:ext uri="{BB962C8B-B14F-4D97-AF65-F5344CB8AC3E}">
-        <p14:creationId xmlns:p14="http://schemas.microsoft.com/office/powerpoint/2010/main" val="718382872"/>
-      </p:ext>
-    </p:extLst>
-  </p:cSld>
-  <p:clrMapOvr>
-    <a:masterClrMapping/>
-  </p:clrMapOvr>
-  <p:timing>
-    <p:tnLst>
-      <p:par>
-        <p:cTn id="1" dur="indefinite" restart="never" nodeType="tmRoot"/>
-      </p:par>
-    </p:tnLst>
-  </p:timing>
-</p:sld>
-</file>
-
-<file path=ppt/slides/slide9.xml><?xml version="1.0" encoding="utf-8"?>
-<p:sld xmlns:a="http://schemas.openxmlformats.org/drawingml/2006/main" xmlns:r="http://schemas.openxmlformats.org/officeDocument/2006/relationships" xmlns:p="http://schemas.openxmlformats.org/presentationml/2006/main">
-  <p:cSld>
-    <p:spTree>
-      <p:nvGrpSpPr>
-        <p:cNvPr id="1" name=""/>
-        <p:cNvGrpSpPr/>
-        <p:nvPr/>
-      </p:nvGrpSpPr>
-      <p:grpSpPr>
-        <a:xfrm>
-          <a:off x="0" y="0"/>
-          <a:ext cx="0" cy="0"/>
-          <a:chOff x="0" y="0"/>
-          <a:chExt cx="0" cy="0"/>
-        </a:xfrm>
-      </p:grpSpPr>
-      <p:sp>
-        <p:nvSpPr>
-          <p:cNvPr id="16" name="Rounded Rectangle 15"/>
-          <p:cNvSpPr/>
-          <p:nvPr/>
-        </p:nvSpPr>
-        <p:spPr>
-          <a:xfrm>
-            <a:off x="6873381" y="4641253"/>
-            <a:ext cx="1592560" cy="595836"/>
-          </a:xfrm>
-          <a:prstGeom prst="roundRect">
-            <a:avLst/>
-          </a:prstGeom>
-          <a:noFill/>
-          <a:ln w="38100" cmpd="sng">
-            <a:solidFill>
-              <a:srgbClr val="800000"/>
-            </a:solidFill>
-          </a:ln>
-          <a:effectLst/>
-        </p:spPr>
-        <p:style>
-          <a:lnRef idx="1">
-            <a:schemeClr val="accent1"/>
-          </a:lnRef>
-          <a:fillRef idx="3">
-            <a:schemeClr val="accent1"/>
-          </a:fillRef>
-          <a:effectRef idx="2">
-            <a:schemeClr val="accent1"/>
-          </a:effectRef>
-          <a:fontRef idx="minor">
-            <a:schemeClr val="lt1"/>
-          </a:fontRef>
-        </p:style>
-        <p:txBody>
-          <a:bodyPr rtlCol="0" anchor="ctr"/>
-          <a:lstStyle/>
-          <a:p>
-            <a:pPr algn="ctr"/>
-            <a:endParaRPr lang="en-US"/>
-          </a:p>
-        </p:txBody>
-      </p:sp>
-      <p:sp>
-        <p:nvSpPr>
-          <p:cNvPr id="4" name="Title 1"/>
-          <p:cNvSpPr txBox="1">
-            <a:spLocks/>
-          </p:cNvSpPr>
-          <p:nvPr/>
-        </p:nvSpPr>
-        <p:spPr>
-          <a:xfrm>
-            <a:off x="457200" y="274638"/>
-            <a:ext cx="8229600" cy="628473"/>
-          </a:xfrm>
-          <a:prstGeom prst="rect">
-            <a:avLst/>
-          </a:prstGeom>
-        </p:spPr>
-        <p:txBody>
-          <a:bodyPr vert="horz" lIns="91440" tIns="45720" rIns="91440" bIns="45720" rtlCol="0" anchor="ctr">
-            <a:normAutofit/>
-          </a:bodyPr>
-          <a:lstStyle>
-            <a:lvl1pPr algn="l" defTabSz="457200" rtl="0" eaLnBrk="1" latinLnBrk="0" hangingPunct="1">
-              <a:spcBef>
-                <a:spcPct val="0"/>
-              </a:spcBef>
-              <a:buNone/>
-              <a:defRPr sz="3200" kern="1200">
-                <a:solidFill>
-                  <a:srgbClr val="800000"/>
-                </a:solidFill>
-                <a:latin typeface="+mj-lt"/>
-                <a:ea typeface="+mj-ea"/>
-                <a:cs typeface="+mj-cs"/>
-              </a:defRPr>
-            </a:lvl1pPr>
-          </a:lstStyle>
-          <a:p>
-            <a:r>
-              <a:rPr lang="en-US" dirty="0" smtClean="0"/>
-              <a:t>3 Crates, Buffer Level = 4</a:t>
-            </a:r>
-            <a:endParaRPr lang="en-US" dirty="0"/>
-          </a:p>
-        </p:txBody>
-      </p:sp>
-      <p:graphicFrame>
-        <p:nvGraphicFramePr>
-          <p:cNvPr id="5" name="Chart 4"/>
-          <p:cNvGraphicFramePr>
-            <a:graphicFrameLocks/>
-          </p:cNvGraphicFramePr>
-          <p:nvPr>
-            <p:extLst>
-              <p:ext uri="{D42A27DB-BD31-4B8C-83A1-F6EECF244321}">
-                <p14:modId xmlns:p14="http://schemas.microsoft.com/office/powerpoint/2010/main" val="2835160746"/>
-              </p:ext>
-            </p:extLst>
-          </p:nvPr>
-        </p:nvGraphicFramePr>
-        <p:xfrm>
-          <a:off x="457200" y="990680"/>
-          <a:ext cx="6416181" cy="5365750"/>
-        </p:xfrm>
-        <a:graphic>
-          <a:graphicData uri="http://schemas.openxmlformats.org/drawingml/2006/chart">
-            <c:chart xmlns:c="http://schemas.openxmlformats.org/drawingml/2006/chart" xmlns:r="http://schemas.openxmlformats.org/officeDocument/2006/relationships" r:id="rId2"/>
-          </a:graphicData>
-        </a:graphic>
-      </p:graphicFrame>
-      <p:sp>
-        <p:nvSpPr>
-          <p:cNvPr id="7" name="TextBox 6"/>
-          <p:cNvSpPr txBox="1"/>
-          <p:nvPr/>
-        </p:nvSpPr>
-        <p:spPr>
-          <a:xfrm>
-            <a:off x="1614798" y="1191671"/>
-            <a:ext cx="2508426" cy="707886"/>
-          </a:xfrm>
-          <a:prstGeom prst="rect">
-            <a:avLst/>
-          </a:prstGeom>
-          <a:noFill/>
-        </p:spPr>
-        <p:txBody>
-          <a:bodyPr wrap="square" rtlCol="0">
-            <a:spAutoFit/>
-          </a:bodyPr>
-          <a:lstStyle/>
-          <a:p>
-            <a:r>
-              <a:rPr lang="en-US" sz="2000" b="1" dirty="0" smtClean="0"/>
-              <a:t>No Pedestal </a:t>
-            </a:r>
-          </a:p>
-          <a:p>
-            <a:r>
-              <a:rPr lang="en-US" sz="2000" b="1" dirty="0" smtClean="0"/>
-              <a:t>Suppression (8ADCs) </a:t>
-            </a:r>
-            <a:endParaRPr lang="en-US" sz="2000" b="1" dirty="0"/>
-          </a:p>
-        </p:txBody>
-      </p:sp>
-      <p:sp>
-        <p:nvSpPr>
-          <p:cNvPr id="8" name="TextBox 7"/>
-          <p:cNvSpPr txBox="1"/>
-          <p:nvPr/>
-        </p:nvSpPr>
-        <p:spPr>
-          <a:xfrm>
-            <a:off x="4636211" y="4762291"/>
-            <a:ext cx="1822988" cy="707886"/>
-          </a:xfrm>
-          <a:prstGeom prst="rect">
-            <a:avLst/>
-          </a:prstGeom>
-          <a:noFill/>
-        </p:spPr>
-        <p:txBody>
-          <a:bodyPr wrap="square" rtlCol="0">
-            <a:spAutoFit/>
-          </a:bodyPr>
-          <a:lstStyle/>
-          <a:p>
-            <a:pPr algn="r"/>
-            <a:r>
-              <a:rPr lang="en-US" sz="2000" b="1" dirty="0" smtClean="0"/>
-              <a:t>Pedestal </a:t>
-            </a:r>
-          </a:p>
-          <a:p>
-            <a:pPr algn="r"/>
-            <a:r>
-              <a:rPr lang="en-US" sz="2000" b="1" dirty="0" smtClean="0"/>
-              <a:t>Suppressed </a:t>
-            </a:r>
-            <a:endParaRPr lang="en-US" sz="2000" b="1" dirty="0"/>
-          </a:p>
-        </p:txBody>
-      </p:sp>
-      <p:sp>
-        <p:nvSpPr>
-          <p:cNvPr id="9" name="TextBox 8"/>
-          <p:cNvSpPr txBox="1"/>
-          <p:nvPr/>
-        </p:nvSpPr>
-        <p:spPr>
-          <a:xfrm>
-            <a:off x="6459199" y="1657169"/>
-            <a:ext cx="2539783" cy="470398"/>
-          </a:xfrm>
-          <a:prstGeom prst="rect">
-            <a:avLst/>
-          </a:prstGeom>
-        </p:spPr>
-        <p:txBody>
-          <a:bodyPr wrap="square" rtlCol="0"/>
-          <a:lstStyle>
-            <a:lvl1pPr marL="0" indent="0">
-              <a:defRPr sz="1100">
-                <a:latin typeface="+mn-lt"/>
-                <a:ea typeface="+mn-ea"/>
-                <a:cs typeface="+mn-cs"/>
-              </a:defRPr>
-            </a:lvl1pPr>
-            <a:lvl2pPr marL="457200" indent="0">
-              <a:defRPr sz="1100">
-                <a:latin typeface="+mn-lt"/>
-                <a:ea typeface="+mn-ea"/>
-                <a:cs typeface="+mn-cs"/>
-              </a:defRPr>
-            </a:lvl2pPr>
-            <a:lvl3pPr marL="914400" indent="0">
-              <a:defRPr sz="1100">
-                <a:latin typeface="+mn-lt"/>
-                <a:ea typeface="+mn-ea"/>
-                <a:cs typeface="+mn-cs"/>
-              </a:defRPr>
-            </a:lvl3pPr>
-            <a:lvl4pPr marL="1371600" indent="0">
-              <a:defRPr sz="1100">
-                <a:latin typeface="+mn-lt"/>
-                <a:ea typeface="+mn-ea"/>
-                <a:cs typeface="+mn-cs"/>
-              </a:defRPr>
-            </a:lvl4pPr>
-            <a:lvl5pPr marL="1828800" indent="0">
-              <a:defRPr sz="1100">
-                <a:latin typeface="+mn-lt"/>
-                <a:ea typeface="+mn-ea"/>
-                <a:cs typeface="+mn-cs"/>
-              </a:defRPr>
-            </a:lvl5pPr>
-            <a:lvl6pPr marL="2286000" indent="0">
-              <a:defRPr sz="1100">
-                <a:latin typeface="+mn-lt"/>
-                <a:ea typeface="+mn-ea"/>
-                <a:cs typeface="+mn-cs"/>
-              </a:defRPr>
-            </a:lvl6pPr>
-            <a:lvl7pPr marL="2743200" indent="0">
-              <a:defRPr sz="1100">
-                <a:latin typeface="+mn-lt"/>
-                <a:ea typeface="+mn-ea"/>
-                <a:cs typeface="+mn-cs"/>
-              </a:defRPr>
-            </a:lvl7pPr>
-            <a:lvl8pPr marL="3200400" indent="0">
-              <a:defRPr sz="1100">
-                <a:latin typeface="+mn-lt"/>
-                <a:ea typeface="+mn-ea"/>
-                <a:cs typeface="+mn-cs"/>
-              </a:defRPr>
-            </a:lvl8pPr>
-            <a:lvl9pPr marL="3657600" indent="0">
-              <a:defRPr sz="1100">
-                <a:latin typeface="+mn-lt"/>
-                <a:ea typeface="+mn-ea"/>
-                <a:cs typeface="+mn-cs"/>
-              </a:defRPr>
-            </a:lvl9pPr>
-          </a:lstStyle>
-          <a:p>
-            <a:r>
-              <a:rPr lang="en-US" sz="2000" dirty="0" smtClean="0">
-                <a:solidFill>
-                  <a:srgbClr val="FF0000"/>
-                </a:solidFill>
-              </a:rPr>
-              <a:t>Local trigger ~ 100 kHz</a:t>
-            </a:r>
-            <a:endParaRPr lang="en-US" sz="2000" dirty="0">
-              <a:solidFill>
-                <a:srgbClr val="FF0000"/>
-              </a:solidFill>
-            </a:endParaRPr>
-          </a:p>
-        </p:txBody>
-      </p:sp>
-      <p:sp>
-        <p:nvSpPr>
-          <p:cNvPr id="10" name="TextBox 9"/>
-          <p:cNvSpPr txBox="1"/>
-          <p:nvPr/>
-        </p:nvSpPr>
-        <p:spPr>
-          <a:xfrm>
-            <a:off x="6459199" y="1186771"/>
-            <a:ext cx="2539783" cy="470398"/>
-          </a:xfrm>
-          <a:prstGeom prst="rect">
-            <a:avLst/>
-          </a:prstGeom>
-        </p:spPr>
-        <p:txBody>
-          <a:bodyPr wrap="square" rtlCol="0"/>
-          <a:lstStyle>
-            <a:lvl1pPr marL="0" indent="0">
-              <a:defRPr sz="1100">
-                <a:latin typeface="+mn-lt"/>
-                <a:ea typeface="+mn-ea"/>
-                <a:cs typeface="+mn-cs"/>
-              </a:defRPr>
-            </a:lvl1pPr>
-            <a:lvl2pPr marL="457200" indent="0">
-              <a:defRPr sz="1100">
-                <a:latin typeface="+mn-lt"/>
-                <a:ea typeface="+mn-ea"/>
-                <a:cs typeface="+mn-cs"/>
-              </a:defRPr>
-            </a:lvl2pPr>
-            <a:lvl3pPr marL="914400" indent="0">
-              <a:defRPr sz="1100">
-                <a:latin typeface="+mn-lt"/>
-                <a:ea typeface="+mn-ea"/>
-                <a:cs typeface="+mn-cs"/>
-              </a:defRPr>
-            </a:lvl3pPr>
-            <a:lvl4pPr marL="1371600" indent="0">
-              <a:defRPr sz="1100">
-                <a:latin typeface="+mn-lt"/>
-                <a:ea typeface="+mn-ea"/>
-                <a:cs typeface="+mn-cs"/>
-              </a:defRPr>
-            </a:lvl4pPr>
-            <a:lvl5pPr marL="1828800" indent="0">
-              <a:defRPr sz="1100">
-                <a:latin typeface="+mn-lt"/>
-                <a:ea typeface="+mn-ea"/>
-                <a:cs typeface="+mn-cs"/>
-              </a:defRPr>
-            </a:lvl5pPr>
-            <a:lvl6pPr marL="2286000" indent="0">
-              <a:defRPr sz="1100">
-                <a:latin typeface="+mn-lt"/>
-                <a:ea typeface="+mn-ea"/>
-                <a:cs typeface="+mn-cs"/>
-              </a:defRPr>
-            </a:lvl6pPr>
-            <a:lvl7pPr marL="2743200" indent="0">
-              <a:defRPr sz="1100">
-                <a:latin typeface="+mn-lt"/>
-                <a:ea typeface="+mn-ea"/>
-                <a:cs typeface="+mn-cs"/>
-              </a:defRPr>
-            </a:lvl7pPr>
-            <a:lvl8pPr marL="3200400" indent="0">
-              <a:defRPr sz="1100">
-                <a:latin typeface="+mn-lt"/>
-                <a:ea typeface="+mn-ea"/>
-                <a:cs typeface="+mn-cs"/>
-              </a:defRPr>
-            </a:lvl8pPr>
-            <a:lvl9pPr marL="3657600" indent="0">
-              <a:defRPr sz="1100">
-                <a:latin typeface="+mn-lt"/>
-                <a:ea typeface="+mn-ea"/>
-                <a:cs typeface="+mn-cs"/>
-              </a:defRPr>
-            </a:lvl9pPr>
-          </a:lstStyle>
-          <a:p>
-            <a:r>
-              <a:rPr lang="en-US" sz="2000" dirty="0" smtClean="0">
-                <a:solidFill>
-                  <a:srgbClr val="0000FF"/>
-                </a:solidFill>
-              </a:rPr>
-              <a:t>Local trigger ~ 50 kHz</a:t>
-            </a:r>
-            <a:endParaRPr lang="en-US" sz="2000" dirty="0">
-              <a:solidFill>
-                <a:srgbClr val="0000FF"/>
-              </a:solidFill>
-            </a:endParaRPr>
-          </a:p>
-        </p:txBody>
-      </p:sp>
-      <p:sp>
-        <p:nvSpPr>
-          <p:cNvPr id="11" name="TextBox 10"/>
-          <p:cNvSpPr txBox="1"/>
-          <p:nvPr/>
-        </p:nvSpPr>
-        <p:spPr>
-          <a:xfrm>
-            <a:off x="6459199" y="2071727"/>
-            <a:ext cx="2539783" cy="470398"/>
-          </a:xfrm>
-          <a:prstGeom prst="rect">
-            <a:avLst/>
-          </a:prstGeom>
-        </p:spPr>
-        <p:txBody>
-          <a:bodyPr wrap="square" rtlCol="0"/>
-          <a:lstStyle>
-            <a:lvl1pPr marL="0" indent="0">
-              <a:defRPr sz="1100">
-                <a:latin typeface="+mn-lt"/>
-                <a:ea typeface="+mn-ea"/>
-                <a:cs typeface="+mn-cs"/>
-              </a:defRPr>
-            </a:lvl1pPr>
-            <a:lvl2pPr marL="457200" indent="0">
-              <a:defRPr sz="1100">
-                <a:latin typeface="+mn-lt"/>
-                <a:ea typeface="+mn-ea"/>
-                <a:cs typeface="+mn-cs"/>
-              </a:defRPr>
-            </a:lvl2pPr>
-            <a:lvl3pPr marL="914400" indent="0">
-              <a:defRPr sz="1100">
-                <a:latin typeface="+mn-lt"/>
-                <a:ea typeface="+mn-ea"/>
-                <a:cs typeface="+mn-cs"/>
-              </a:defRPr>
-            </a:lvl3pPr>
-            <a:lvl4pPr marL="1371600" indent="0">
-              <a:defRPr sz="1100">
-                <a:latin typeface="+mn-lt"/>
-                <a:ea typeface="+mn-ea"/>
-                <a:cs typeface="+mn-cs"/>
-              </a:defRPr>
-            </a:lvl4pPr>
-            <a:lvl5pPr marL="1828800" indent="0">
-              <a:defRPr sz="1100">
-                <a:latin typeface="+mn-lt"/>
-                <a:ea typeface="+mn-ea"/>
-                <a:cs typeface="+mn-cs"/>
-              </a:defRPr>
-            </a:lvl5pPr>
-            <a:lvl6pPr marL="2286000" indent="0">
-              <a:defRPr sz="1100">
-                <a:latin typeface="+mn-lt"/>
-                <a:ea typeface="+mn-ea"/>
-                <a:cs typeface="+mn-cs"/>
-              </a:defRPr>
-            </a:lvl6pPr>
-            <a:lvl7pPr marL="2743200" indent="0">
-              <a:defRPr sz="1100">
-                <a:latin typeface="+mn-lt"/>
-                <a:ea typeface="+mn-ea"/>
-                <a:cs typeface="+mn-cs"/>
-              </a:defRPr>
-            </a:lvl7pPr>
-            <a:lvl8pPr marL="3200400" indent="0">
-              <a:defRPr sz="1100">
-                <a:latin typeface="+mn-lt"/>
-                <a:ea typeface="+mn-ea"/>
-                <a:cs typeface="+mn-cs"/>
-              </a:defRPr>
-            </a:lvl8pPr>
-            <a:lvl9pPr marL="3657600" indent="0">
-              <a:defRPr sz="1100">
-                <a:latin typeface="+mn-lt"/>
-                <a:ea typeface="+mn-ea"/>
-                <a:cs typeface="+mn-cs"/>
-              </a:defRPr>
-            </a:lvl9pPr>
-          </a:lstStyle>
-          <a:p>
-            <a:r>
-              <a:rPr lang="en-US" sz="2000" dirty="0" smtClean="0">
-                <a:solidFill>
-                  <a:srgbClr val="008000"/>
-                </a:solidFill>
-              </a:rPr>
-              <a:t>Local trigger ~ 200 kHz</a:t>
-            </a:r>
-            <a:endParaRPr lang="en-US" sz="2000" dirty="0">
-              <a:solidFill>
-                <a:srgbClr val="008000"/>
-              </a:solidFill>
-            </a:endParaRPr>
-          </a:p>
-        </p:txBody>
-      </p:sp>
-      <p:cxnSp>
-        <p:nvCxnSpPr>
-          <p:cNvPr id="12" name="Elbow Connector 11"/>
-          <p:cNvCxnSpPr/>
-          <p:nvPr/>
-        </p:nvCxnSpPr>
-        <p:spPr>
-          <a:xfrm rot="16200000" flipV="1">
-            <a:off x="2152212" y="6034938"/>
-            <a:ext cx="370074" cy="279649"/>
-          </a:xfrm>
-          <a:prstGeom prst="bentConnector3">
-            <a:avLst>
-              <a:gd name="adj1" fmla="val -844"/>
-            </a:avLst>
-          </a:prstGeom>
-          <a:ln>
-            <a:solidFill>
-              <a:srgbClr val="800000"/>
-            </a:solidFill>
-            <a:tailEnd type="arrow"/>
-          </a:ln>
-          <a:effectLst/>
-        </p:spPr>
-        <p:style>
-          <a:lnRef idx="2">
-            <a:schemeClr val="accent1"/>
-          </a:lnRef>
-          <a:fillRef idx="0">
-            <a:schemeClr val="accent1"/>
-          </a:fillRef>
-          <a:effectRef idx="1">
-            <a:schemeClr val="accent1"/>
-          </a:effectRef>
-          <a:fontRef idx="minor">
-            <a:schemeClr val="tx1"/>
-          </a:fontRef>
-        </p:style>
-      </p:cxnSp>
-      <p:sp>
-        <p:nvSpPr>
-          <p:cNvPr id="13" name="TextBox 12"/>
-          <p:cNvSpPr txBox="1"/>
-          <p:nvPr/>
-        </p:nvSpPr>
-        <p:spPr>
-          <a:xfrm>
-            <a:off x="2602493" y="6359800"/>
-            <a:ext cx="2273262" cy="369332"/>
-          </a:xfrm>
-          <a:prstGeom prst="rect">
-            <a:avLst/>
-          </a:prstGeom>
-          <a:noFill/>
-        </p:spPr>
-        <p:txBody>
-          <a:bodyPr wrap="square" rtlCol="0">
-            <a:spAutoFit/>
-          </a:bodyPr>
-          <a:lstStyle/>
-          <a:p>
-            <a:r>
-              <a:rPr lang="en-US" dirty="0" smtClean="0">
-                <a:solidFill>
-                  <a:srgbClr val="800000"/>
-                </a:solidFill>
-              </a:rPr>
-              <a:t>Expected ~ 5000 Hz</a:t>
-            </a:r>
-            <a:endParaRPr lang="en-US" dirty="0">
-              <a:solidFill>
-                <a:srgbClr val="800000"/>
-              </a:solidFill>
-            </a:endParaRPr>
           </a:p>
         </p:txBody>
       </p:sp>
@@ -14609,57 +14275,7 @@
         </p:nvSpPr>
         <p:spPr>
           <a:xfrm>
-            <a:off x="6694364" y="2916463"/>
-            <a:ext cx="2304618" cy="1200329"/>
-          </a:xfrm>
-          <a:prstGeom prst="rect">
-            <a:avLst/>
-          </a:prstGeom>
-          <a:noFill/>
-        </p:spPr>
-        <p:txBody>
-          <a:bodyPr wrap="square" rtlCol="0">
-            <a:spAutoFit/>
-          </a:bodyPr>
-          <a:lstStyle/>
-          <a:p>
-            <a:r>
-              <a:rPr lang="en-US" dirty="0" smtClean="0"/>
-              <a:t>Dead time at</a:t>
-            </a:r>
-          </a:p>
-          <a:p>
-            <a:r>
-              <a:rPr lang="en-US" dirty="0" smtClean="0"/>
-              <a:t>Local ~ 200 kHz and Readout ~5kHz</a:t>
-            </a:r>
-          </a:p>
-          <a:p>
-            <a:r>
-              <a:rPr lang="en-US" dirty="0" smtClean="0"/>
-              <a:t>D</a:t>
-            </a:r>
-            <a:r>
-              <a:rPr lang="en-US" baseline="-25000" dirty="0"/>
-              <a:t>3</a:t>
-            </a:r>
-            <a:r>
-              <a:rPr lang="en-US" dirty="0" smtClean="0"/>
-              <a:t> ~6%</a:t>
-            </a:r>
-            <a:endParaRPr lang="en-US" dirty="0"/>
-          </a:p>
-        </p:txBody>
-      </p:sp>
-      <p:sp>
-        <p:nvSpPr>
-          <p:cNvPr id="15" name="TextBox 14"/>
-          <p:cNvSpPr txBox="1"/>
-          <p:nvPr/>
-        </p:nvSpPr>
-        <p:spPr>
-          <a:xfrm>
-            <a:off x="6694364" y="4688293"/>
+            <a:off x="6694364" y="4506625"/>
             <a:ext cx="1992436" cy="461665"/>
           </a:xfrm>
           <a:prstGeom prst="rect">
@@ -14706,46 +14322,16 @@
           </a:p>
         </p:txBody>
       </p:sp>
-      <p:sp>
-        <p:nvSpPr>
-          <p:cNvPr id="2" name="Slide Number Placeholder 1"/>
-          <p:cNvSpPr>
-            <a:spLocks noGrp="1"/>
-          </p:cNvSpPr>
-          <p:nvPr>
-            <p:ph type="sldNum" sz="quarter" idx="12"/>
-          </p:nvPr>
-        </p:nvSpPr>
-        <p:spPr/>
-        <p:txBody>
-          <a:bodyPr/>
-          <a:lstStyle/>
-          <a:p>
-            <a:fld id="{49BD95FD-4C1D-B042-AB02-9F82D4A375A6}" type="slidenum">
-              <a:rPr lang="en-US" smtClean="0"/>
-              <a:t>9</a:t>
-            </a:fld>
-            <a:endParaRPr lang="en-US"/>
-          </a:p>
-        </p:txBody>
-      </p:sp>
     </p:spTree>
     <p:extLst>
       <p:ext uri="{BB962C8B-B14F-4D97-AF65-F5344CB8AC3E}">
-        <p14:creationId xmlns:p14="http://schemas.microsoft.com/office/powerpoint/2010/main" val="203805563"/>
+        <p14:creationId xmlns:p14="http://schemas.microsoft.com/office/powerpoint/2010/main" val="86548187"/>
       </p:ext>
     </p:extLst>
   </p:cSld>
   <p:clrMapOvr>
     <a:masterClrMapping/>
   </p:clrMapOvr>
-  <p:timing>
-    <p:tnLst>
-      <p:par>
-        <p:cTn id="1" dur="indefinite" restart="never" nodeType="tmRoot"/>
-      </p:par>
-    </p:tnLst>
-  </p:timing>
 </p:sld>
 </file>
 

</xml_diff>

<commit_message>
New slides from Dasuni.
</commit_message>
<xml_diff>
--- a/2015_DOE_Review/SuperBigBite DAQ update-Oct-20-2015.pptx
+++ b/2015_DOE_Review/SuperBigBite DAQ update-Oct-20-2015.pptx
@@ -13,7 +13,7 @@
     <p:sldId id="268" r:id="rId7"/>
     <p:sldId id="260" r:id="rId8"/>
     <p:sldId id="279" r:id="rId9"/>
-    <p:sldId id="278" r:id="rId10"/>
+    <p:sldId id="280" r:id="rId10"/>
     <p:sldId id="265" r:id="rId11"/>
     <p:sldId id="272" r:id="rId12"/>
     <p:sldId id="274" r:id="rId13"/>
@@ -124,7 +124,7 @@
   </p:defaultTextStyle>
   <p:extLst>
     <p:ext uri="{EFAFB233-063F-42B5-8137-9DF3F51BA10A}">
-      <p15:sldGuideLst xmlns:p15="http://schemas.microsoft.com/office/powerpoint/2012/main" xmlns="">
+      <p15:sldGuideLst xmlns="" xmlns:p15="http://schemas.microsoft.com/office/powerpoint/2012/main">
         <p15:guide id="1" orient="horz" pos="2160">
           <p15:clr>
             <a:srgbClr val="A4A3A4"/>
@@ -139,698 +139,6 @@
     </p:ext>
   </p:extLst>
 </p:presentation>
-</file>
-
-<file path=ppt/charts/chart1.xml><?xml version="1.0" encoding="utf-8"?>
-<c:chartSpace xmlns:c="http://schemas.openxmlformats.org/drawingml/2006/chart" xmlns:a="http://schemas.openxmlformats.org/drawingml/2006/main" xmlns:r="http://schemas.openxmlformats.org/officeDocument/2006/relationships">
-  <c:date1904 val="0"/>
-  <c:lang val="en-US"/>
-  <c:roundedCorners val="0"/>
-  <mc:AlternateContent xmlns:mc="http://schemas.openxmlformats.org/markup-compatibility/2006">
-    <mc:Choice xmlns:c14="http://schemas.microsoft.com/office/drawing/2007/8/2/chart" Requires="c14">
-      <c14:style val="118"/>
-    </mc:Choice>
-    <mc:Fallback>
-      <c:style val="18"/>
-    </mc:Fallback>
-  </mc:AlternateContent>
-  <c:chart>
-    <c:autoTitleDeleted val="1"/>
-    <c:plotArea>
-      <c:layout>
-        <c:manualLayout>
-          <c:layoutTarget val="inner"/>
-          <c:xMode val="edge"/>
-          <c:yMode val="edge"/>
-          <c:x val="0.14115506365296501"/>
-          <c:y val="3.7450256013763401E-2"/>
-          <c:w val="0.80521349959002098"/>
-          <c:h val="0.74104628445269005"/>
-        </c:manualLayout>
-      </c:layout>
-      <c:scatterChart>
-        <c:scatterStyle val="lineMarker"/>
-        <c:varyColors val="0"/>
-        <c:ser>
-          <c:idx val="0"/>
-          <c:order val="0"/>
-          <c:tx>
-            <c:v>Single</c:v>
-          </c:tx>
-          <c:spPr>
-            <a:ln w="47625">
-              <a:noFill/>
-            </a:ln>
-            <a:effectLst/>
-          </c:spPr>
-          <c:marker>
-            <c:symbol val="circle"/>
-            <c:size val="6"/>
-            <c:spPr>
-              <a:solidFill>
-                <a:srgbClr val="0000FF"/>
-              </a:solidFill>
-              <a:ln>
-                <a:noFill/>
-              </a:ln>
-              <a:effectLst/>
-            </c:spPr>
-          </c:marker>
-          <c:xVal>
-            <c:numRef>
-              <c:f>'FixedLocal-1DAQ'!$B$57:$I$57</c:f>
-              <c:numCache>
-                <c:formatCode>General</c:formatCode>
-                <c:ptCount val="8"/>
-                <c:pt idx="0">
-                  <c:v>1320.7</c:v>
-                </c:pt>
-                <c:pt idx="1">
-                  <c:v>2386.5</c:v>
-                </c:pt>
-                <c:pt idx="2">
-                  <c:v>4041.6</c:v>
-                </c:pt>
-                <c:pt idx="3">
-                  <c:v>5123.1000000000004</c:v>
-                </c:pt>
-                <c:pt idx="4">
-                  <c:v>7289.6</c:v>
-                </c:pt>
-                <c:pt idx="5">
-                  <c:v>10800.7</c:v>
-                </c:pt>
-                <c:pt idx="6">
-                  <c:v>16088.4</c:v>
-                </c:pt>
-                <c:pt idx="7">
-                  <c:v>22848.400000000001</c:v>
-                </c:pt>
-              </c:numCache>
-            </c:numRef>
-          </c:xVal>
-          <c:yVal>
-            <c:numRef>
-              <c:f>'FixedLocal-1DAQ'!$B$59:$I$59</c:f>
-              <c:numCache>
-                <c:formatCode>0.00</c:formatCode>
-                <c:ptCount val="8"/>
-                <c:pt idx="0">
-                  <c:v>19.747103808586349</c:v>
-                </c:pt>
-                <c:pt idx="1">
-                  <c:v>20.611774565262941</c:v>
-                </c:pt>
-                <c:pt idx="2">
-                  <c:v>22.090261282660329</c:v>
-                </c:pt>
-                <c:pt idx="3">
-                  <c:v>37.770100134684071</c:v>
-                </c:pt>
-                <c:pt idx="4">
-                  <c:v>53.832857769973657</c:v>
-                </c:pt>
-                <c:pt idx="5">
-                  <c:v>67.574323886414774</c:v>
-                </c:pt>
-                <c:pt idx="6">
-                  <c:v>78.129584048134063</c:v>
-                </c:pt>
-                <c:pt idx="7">
-                  <c:v>84.567847201554585</c:v>
-                </c:pt>
-              </c:numCache>
-            </c:numRef>
-          </c:yVal>
-          <c:smooth val="0"/>
-        </c:ser>
-        <c:ser>
-          <c:idx val="1"/>
-          <c:order val="1"/>
-          <c:tx>
-            <c:v>3Crates</c:v>
-          </c:tx>
-          <c:spPr>
-            <a:ln w="47625">
-              <a:noFill/>
-            </a:ln>
-            <a:effectLst/>
-          </c:spPr>
-          <c:marker>
-            <c:symbol val="circle"/>
-            <c:size val="6"/>
-            <c:spPr>
-              <a:solidFill>
-                <a:srgbClr val="FF0000"/>
-              </a:solidFill>
-              <a:effectLst/>
-            </c:spPr>
-          </c:marker>
-          <c:xVal>
-            <c:numRef>
-              <c:f>'FixedLocal-3DAQ'!$B$58:$N$58</c:f>
-              <c:numCache>
-                <c:formatCode>General</c:formatCode>
-                <c:ptCount val="13"/>
-                <c:pt idx="0">
-                  <c:v>3105.2</c:v>
-                </c:pt>
-                <c:pt idx="1">
-                  <c:v>2350.3000000000002</c:v>
-                </c:pt>
-                <c:pt idx="2">
-                  <c:v>10192.799999999999</c:v>
-                </c:pt>
-                <c:pt idx="3">
-                  <c:v>7891.5</c:v>
-                </c:pt>
-                <c:pt idx="4">
-                  <c:v>12836.8</c:v>
-                </c:pt>
-                <c:pt idx="5">
-                  <c:v>14673.5</c:v>
-                </c:pt>
-                <c:pt idx="6">
-                  <c:v>12476.9</c:v>
-                </c:pt>
-                <c:pt idx="7">
-                  <c:v>11580.3</c:v>
-                </c:pt>
-                <c:pt idx="8">
-                  <c:v>7791.3</c:v>
-                </c:pt>
-                <c:pt idx="9">
-                  <c:v>6887</c:v>
-                </c:pt>
-                <c:pt idx="10">
-                  <c:v>5330.5</c:v>
-                </c:pt>
-                <c:pt idx="11">
-                  <c:v>4292.8</c:v>
-                </c:pt>
-                <c:pt idx="12">
-                  <c:v>1191.9000000000001</c:v>
-                </c:pt>
-              </c:numCache>
-            </c:numRef>
-          </c:xVal>
-          <c:yVal>
-            <c:numRef>
-              <c:f>'FixedLocal-3DAQ'!$B$60:$N$60</c:f>
-              <c:numCache>
-                <c:formatCode>0.00</c:formatCode>
-                <c:ptCount val="13"/>
-                <c:pt idx="0">
-                  <c:v>2.3380136545150032</c:v>
-                </c:pt>
-                <c:pt idx="1">
-                  <c:v>2.2167382887291032</c:v>
-                </c:pt>
-                <c:pt idx="2">
-                  <c:v>23.815830782513149</c:v>
-                </c:pt>
-                <c:pt idx="3">
-                  <c:v>9.2238484445289259</c:v>
-                </c:pt>
-                <c:pt idx="4">
-                  <c:v>37.886389131247668</c:v>
-                </c:pt>
-                <c:pt idx="5">
-                  <c:v>44.016764916345799</c:v>
-                </c:pt>
-                <c:pt idx="6">
-                  <c:v>34.480520000961768</c:v>
-                </c:pt>
-                <c:pt idx="7">
-                  <c:v>31.835099263404231</c:v>
-                </c:pt>
-                <c:pt idx="8">
-                  <c:v>8.8881187991734389</c:v>
-                </c:pt>
-                <c:pt idx="9">
-                  <c:v>6.7968636561637874</c:v>
-                </c:pt>
-                <c:pt idx="10">
-                  <c:v>4.15720851702467</c:v>
-                </c:pt>
-                <c:pt idx="11">
-                  <c:v>2.8745806932538249</c:v>
-                </c:pt>
-                <c:pt idx="12">
-                  <c:v>1.426294152193974</c:v>
-                </c:pt>
-              </c:numCache>
-            </c:numRef>
-          </c:yVal>
-          <c:smooth val="0"/>
-        </c:ser>
-        <c:dLbls>
-          <c:showLegendKey val="0"/>
-          <c:showVal val="0"/>
-          <c:showCatName val="0"/>
-          <c:showSerName val="0"/>
-          <c:showPercent val="0"/>
-          <c:showBubbleSize val="0"/>
-        </c:dLbls>
-        <c:axId val="91233664"/>
-        <c:axId val="91256704"/>
-      </c:scatterChart>
-      <c:valAx>
-        <c:axId val="91233664"/>
-        <c:scaling>
-          <c:orientation val="minMax"/>
-          <c:max val="17000"/>
-          <c:min val="0"/>
-        </c:scaling>
-        <c:delete val="0"/>
-        <c:axPos val="b"/>
-        <c:majorGridlines>
-          <c:spPr>
-            <a:ln>
-              <a:solidFill>
-                <a:schemeClr val="bg1">
-                  <a:lumMod val="75000"/>
-                </a:schemeClr>
-              </a:solidFill>
-            </a:ln>
-          </c:spPr>
-        </c:majorGridlines>
-        <c:minorGridlines>
-          <c:spPr>
-            <a:ln>
-              <a:solidFill>
-                <a:schemeClr val="bg1">
-                  <a:lumMod val="85000"/>
-                </a:schemeClr>
-              </a:solidFill>
-            </a:ln>
-          </c:spPr>
-        </c:minorGridlines>
-        <c:title>
-          <c:tx>
-            <c:rich>
-              <a:bodyPr/>
-              <a:lstStyle/>
-              <a:p>
-                <a:pPr>
-                  <a:defRPr/>
-                </a:pPr>
-                <a:r>
-                  <a:rPr lang="en-US"/>
-                  <a:t>Readout trigger rate (Hz)</a:t>
-                </a:r>
-              </a:p>
-            </c:rich>
-          </c:tx>
-          <c:layout>
-            <c:manualLayout>
-              <c:xMode val="edge"/>
-              <c:yMode val="edge"/>
-              <c:x val="0.40036261119259903"/>
-              <c:y val="0.88713621475304205"/>
-            </c:manualLayout>
-          </c:layout>
-          <c:overlay val="0"/>
-        </c:title>
-        <c:numFmt formatCode="General" sourceLinked="1"/>
-        <c:majorTickMark val="out"/>
-        <c:minorTickMark val="none"/>
-        <c:tickLblPos val="nextTo"/>
-        <c:crossAx val="91256704"/>
-        <c:crosses val="autoZero"/>
-        <c:crossBetween val="midCat"/>
-      </c:valAx>
-      <c:valAx>
-        <c:axId val="91256704"/>
-        <c:scaling>
-          <c:orientation val="minMax"/>
-        </c:scaling>
-        <c:delete val="0"/>
-        <c:axPos val="l"/>
-        <c:majorGridlines>
-          <c:spPr>
-            <a:ln>
-              <a:solidFill>
-                <a:schemeClr val="bg1">
-                  <a:lumMod val="75000"/>
-                </a:schemeClr>
-              </a:solidFill>
-            </a:ln>
-          </c:spPr>
-        </c:majorGridlines>
-        <c:minorGridlines>
-          <c:spPr>
-            <a:ln>
-              <a:solidFill>
-                <a:schemeClr val="bg1">
-                  <a:lumMod val="85000"/>
-                </a:schemeClr>
-              </a:solidFill>
-            </a:ln>
-          </c:spPr>
-        </c:minorGridlines>
-        <c:title>
-          <c:tx>
-            <c:rich>
-              <a:bodyPr/>
-              <a:lstStyle/>
-              <a:p>
-                <a:pPr>
-                  <a:defRPr/>
-                </a:pPr>
-                <a:r>
-                  <a:rPr lang="en-US" dirty="0"/>
-                  <a:t>Dead time (%)</a:t>
-                </a:r>
-              </a:p>
-            </c:rich>
-          </c:tx>
-          <c:layout>
-            <c:manualLayout>
-              <c:xMode val="edge"/>
-              <c:yMode val="edge"/>
-              <c:x val="4.9785536713566501E-3"/>
-              <c:y val="0.28418769885728401"/>
-            </c:manualLayout>
-          </c:layout>
-          <c:overlay val="0"/>
-        </c:title>
-        <c:numFmt formatCode="0" sourceLinked="0"/>
-        <c:majorTickMark val="out"/>
-        <c:minorTickMark val="none"/>
-        <c:tickLblPos val="nextTo"/>
-        <c:crossAx val="91233664"/>
-        <c:crosses val="autoZero"/>
-        <c:crossBetween val="midCat"/>
-      </c:valAx>
-    </c:plotArea>
-    <c:plotVisOnly val="1"/>
-    <c:dispBlanksAs val="gap"/>
-    <c:showDLblsOverMax val="0"/>
-  </c:chart>
-  <c:txPr>
-    <a:bodyPr/>
-    <a:lstStyle/>
-    <a:p>
-      <a:pPr>
-        <a:defRPr sz="1600" b="1"/>
-      </a:pPr>
-      <a:endParaRPr lang="en-US"/>
-    </a:p>
-  </c:txPr>
-  <c:externalData r:id="rId1">
-    <c:autoUpdate val="0"/>
-  </c:externalData>
-  <c:userShapes r:id="rId2"/>
-</c:chartSpace>
-</file>
-
-<file path=ppt/drawings/drawing1.xml><?xml version="1.0" encoding="utf-8"?>
-<c:userShapes xmlns:c="http://schemas.openxmlformats.org/drawingml/2006/chart">
-  <cdr:relSizeAnchor xmlns:cdr="http://schemas.openxmlformats.org/drawingml/2006/chartDrawing">
-    <cdr:from>
-      <cdr:x>0.23835</cdr:x>
-      <cdr:y>0.38438</cdr:y>
-    </cdr:from>
-    <cdr:to>
-      <cdr:x>0.3707</cdr:x>
-      <cdr:y>0.55222</cdr:y>
-    </cdr:to>
-    <cdr:sp macro="" textlink="">
-      <cdr:nvSpPr>
-        <cdr:cNvPr id="4" name="TextBox 4"/>
-        <cdr:cNvSpPr txBox="1"/>
-      </cdr:nvSpPr>
-      <cdr:spPr>
-        <a:xfrm xmlns:a="http://schemas.openxmlformats.org/drawingml/2006/main">
-          <a:off x="1824056" y="1903101"/>
-          <a:ext cx="1012874" cy="830997"/>
-        </a:xfrm>
-        <a:prstGeom xmlns:a="http://schemas.openxmlformats.org/drawingml/2006/main" prst="rect">
-          <a:avLst/>
-        </a:prstGeom>
-        <a:noFill xmlns:a="http://schemas.openxmlformats.org/drawingml/2006/main"/>
-      </cdr:spPr>
-      <cdr:txBody>
-        <a:bodyPr xmlns:a="http://schemas.openxmlformats.org/drawingml/2006/main" wrap="square" rtlCol="0">
-          <a:spAutoFit/>
-        </a:bodyPr>
-        <a:lstStyle xmlns:a="http://schemas.openxmlformats.org/drawingml/2006/main">
-          <a:defPPr>
-            <a:defRPr lang="en-US"/>
-          </a:defPPr>
-          <a:lvl1pPr marL="0" algn="l" defTabSz="457200" rtl="0" eaLnBrk="1" latinLnBrk="0" hangingPunct="1">
-            <a:defRPr sz="1800" kern="1200">
-              <a:solidFill>
-                <a:schemeClr val="tx1"/>
-              </a:solidFill>
-              <a:latin typeface="+mn-lt"/>
-              <a:ea typeface="+mn-ea"/>
-              <a:cs typeface="+mn-cs"/>
-            </a:defRPr>
-          </a:lvl1pPr>
-          <a:lvl2pPr marL="457200" algn="l" defTabSz="457200" rtl="0" eaLnBrk="1" latinLnBrk="0" hangingPunct="1">
-            <a:defRPr sz="1800" kern="1200">
-              <a:solidFill>
-                <a:schemeClr val="tx1"/>
-              </a:solidFill>
-              <a:latin typeface="+mn-lt"/>
-              <a:ea typeface="+mn-ea"/>
-              <a:cs typeface="+mn-cs"/>
-            </a:defRPr>
-          </a:lvl2pPr>
-          <a:lvl3pPr marL="914400" algn="l" defTabSz="457200" rtl="0" eaLnBrk="1" latinLnBrk="0" hangingPunct="1">
-            <a:defRPr sz="1800" kern="1200">
-              <a:solidFill>
-                <a:schemeClr val="tx1"/>
-              </a:solidFill>
-              <a:latin typeface="+mn-lt"/>
-              <a:ea typeface="+mn-ea"/>
-              <a:cs typeface="+mn-cs"/>
-            </a:defRPr>
-          </a:lvl3pPr>
-          <a:lvl4pPr marL="1371600" algn="l" defTabSz="457200" rtl="0" eaLnBrk="1" latinLnBrk="0" hangingPunct="1">
-            <a:defRPr sz="1800" kern="1200">
-              <a:solidFill>
-                <a:schemeClr val="tx1"/>
-              </a:solidFill>
-              <a:latin typeface="+mn-lt"/>
-              <a:ea typeface="+mn-ea"/>
-              <a:cs typeface="+mn-cs"/>
-            </a:defRPr>
-          </a:lvl4pPr>
-          <a:lvl5pPr marL="1828800" algn="l" defTabSz="457200" rtl="0" eaLnBrk="1" latinLnBrk="0" hangingPunct="1">
-            <a:defRPr sz="1800" kern="1200">
-              <a:solidFill>
-                <a:schemeClr val="tx1"/>
-              </a:solidFill>
-              <a:latin typeface="+mn-lt"/>
-              <a:ea typeface="+mn-ea"/>
-              <a:cs typeface="+mn-cs"/>
-            </a:defRPr>
-          </a:lvl5pPr>
-          <a:lvl6pPr marL="2286000" algn="l" defTabSz="457200" rtl="0" eaLnBrk="1" latinLnBrk="0" hangingPunct="1">
-            <a:defRPr sz="1800" kern="1200">
-              <a:solidFill>
-                <a:schemeClr val="tx1"/>
-              </a:solidFill>
-              <a:latin typeface="+mn-lt"/>
-              <a:ea typeface="+mn-ea"/>
-              <a:cs typeface="+mn-cs"/>
-            </a:defRPr>
-          </a:lvl6pPr>
-          <a:lvl7pPr marL="2743200" algn="l" defTabSz="457200" rtl="0" eaLnBrk="1" latinLnBrk="0" hangingPunct="1">
-            <a:defRPr sz="1800" kern="1200">
-              <a:solidFill>
-                <a:schemeClr val="tx1"/>
-              </a:solidFill>
-              <a:latin typeface="+mn-lt"/>
-              <a:ea typeface="+mn-ea"/>
-              <a:cs typeface="+mn-cs"/>
-            </a:defRPr>
-          </a:lvl7pPr>
-          <a:lvl8pPr marL="3200400" algn="l" defTabSz="457200" rtl="0" eaLnBrk="1" latinLnBrk="0" hangingPunct="1">
-            <a:defRPr sz="1800" kern="1200">
-              <a:solidFill>
-                <a:schemeClr val="tx1"/>
-              </a:solidFill>
-              <a:latin typeface="+mn-lt"/>
-              <a:ea typeface="+mn-ea"/>
-              <a:cs typeface="+mn-cs"/>
-            </a:defRPr>
-          </a:lvl8pPr>
-          <a:lvl9pPr marL="3657600" algn="l" defTabSz="457200" rtl="0" eaLnBrk="1" latinLnBrk="0" hangingPunct="1">
-            <a:defRPr sz="1800" kern="1200">
-              <a:solidFill>
-                <a:schemeClr val="tx1"/>
-              </a:solidFill>
-              <a:latin typeface="+mn-lt"/>
-              <a:ea typeface="+mn-ea"/>
-              <a:cs typeface="+mn-cs"/>
-            </a:defRPr>
-          </a:lvl9pPr>
-        </a:lstStyle>
-        <a:p xmlns:a="http://schemas.openxmlformats.org/drawingml/2006/main">
-          <a:pPr algn="ctr"/>
-          <a:r>
-            <a:rPr lang="en-US" sz="2400" dirty="0" smtClean="0">
-              <a:solidFill>
-                <a:srgbClr val="0000FF"/>
-              </a:solidFill>
-            </a:rPr>
-            <a:t>Single Crate</a:t>
-          </a:r>
-          <a:endParaRPr lang="en-US" sz="2400" dirty="0">
-            <a:solidFill>
-              <a:srgbClr val="0000FF"/>
-            </a:solidFill>
-          </a:endParaRPr>
-        </a:p>
-      </cdr:txBody>
-    </cdr:sp>
-  </cdr:relSizeAnchor>
-  <cdr:relSizeAnchor xmlns:cdr="http://schemas.openxmlformats.org/drawingml/2006/chartDrawing">
-    <cdr:from>
-      <cdr:x>0.67639</cdr:x>
-      <cdr:y>0.53828</cdr:y>
-    </cdr:from>
-    <cdr:to>
-      <cdr:x>0.84026</cdr:x>
-      <cdr:y>0.63153</cdr:y>
-    </cdr:to>
-    <cdr:sp macro="" textlink="">
-      <cdr:nvSpPr>
-        <cdr:cNvPr id="5" name="TextBox 5"/>
-        <cdr:cNvSpPr txBox="1"/>
-      </cdr:nvSpPr>
-      <cdr:spPr>
-        <a:xfrm xmlns:a="http://schemas.openxmlformats.org/drawingml/2006/main">
-          <a:off x="5176325" y="2665101"/>
-          <a:ext cx="1254034" cy="461665"/>
-        </a:xfrm>
-        <a:prstGeom xmlns:a="http://schemas.openxmlformats.org/drawingml/2006/main" prst="rect">
-          <a:avLst/>
-        </a:prstGeom>
-        <a:noFill xmlns:a="http://schemas.openxmlformats.org/drawingml/2006/main"/>
-      </cdr:spPr>
-      <cdr:txBody>
-        <a:bodyPr xmlns:a="http://schemas.openxmlformats.org/drawingml/2006/main" wrap="square" rtlCol="0">
-          <a:spAutoFit/>
-        </a:bodyPr>
-        <a:lstStyle xmlns:a="http://schemas.openxmlformats.org/drawingml/2006/main">
-          <a:defPPr>
-            <a:defRPr lang="en-US"/>
-          </a:defPPr>
-          <a:lvl1pPr marL="0" algn="l" defTabSz="457200" rtl="0" eaLnBrk="1" latinLnBrk="0" hangingPunct="1">
-            <a:defRPr sz="1800" kern="1200">
-              <a:solidFill>
-                <a:schemeClr val="tx1"/>
-              </a:solidFill>
-              <a:latin typeface="+mn-lt"/>
-              <a:ea typeface="+mn-ea"/>
-              <a:cs typeface="+mn-cs"/>
-            </a:defRPr>
-          </a:lvl1pPr>
-          <a:lvl2pPr marL="457200" algn="l" defTabSz="457200" rtl="0" eaLnBrk="1" latinLnBrk="0" hangingPunct="1">
-            <a:defRPr sz="1800" kern="1200">
-              <a:solidFill>
-                <a:schemeClr val="tx1"/>
-              </a:solidFill>
-              <a:latin typeface="+mn-lt"/>
-              <a:ea typeface="+mn-ea"/>
-              <a:cs typeface="+mn-cs"/>
-            </a:defRPr>
-          </a:lvl2pPr>
-          <a:lvl3pPr marL="914400" algn="l" defTabSz="457200" rtl="0" eaLnBrk="1" latinLnBrk="0" hangingPunct="1">
-            <a:defRPr sz="1800" kern="1200">
-              <a:solidFill>
-                <a:schemeClr val="tx1"/>
-              </a:solidFill>
-              <a:latin typeface="+mn-lt"/>
-              <a:ea typeface="+mn-ea"/>
-              <a:cs typeface="+mn-cs"/>
-            </a:defRPr>
-          </a:lvl3pPr>
-          <a:lvl4pPr marL="1371600" algn="l" defTabSz="457200" rtl="0" eaLnBrk="1" latinLnBrk="0" hangingPunct="1">
-            <a:defRPr sz="1800" kern="1200">
-              <a:solidFill>
-                <a:schemeClr val="tx1"/>
-              </a:solidFill>
-              <a:latin typeface="+mn-lt"/>
-              <a:ea typeface="+mn-ea"/>
-              <a:cs typeface="+mn-cs"/>
-            </a:defRPr>
-          </a:lvl4pPr>
-          <a:lvl5pPr marL="1828800" algn="l" defTabSz="457200" rtl="0" eaLnBrk="1" latinLnBrk="0" hangingPunct="1">
-            <a:defRPr sz="1800" kern="1200">
-              <a:solidFill>
-                <a:schemeClr val="tx1"/>
-              </a:solidFill>
-              <a:latin typeface="+mn-lt"/>
-              <a:ea typeface="+mn-ea"/>
-              <a:cs typeface="+mn-cs"/>
-            </a:defRPr>
-          </a:lvl5pPr>
-          <a:lvl6pPr marL="2286000" algn="l" defTabSz="457200" rtl="0" eaLnBrk="1" latinLnBrk="0" hangingPunct="1">
-            <a:defRPr sz="1800" kern="1200">
-              <a:solidFill>
-                <a:schemeClr val="tx1"/>
-              </a:solidFill>
-              <a:latin typeface="+mn-lt"/>
-              <a:ea typeface="+mn-ea"/>
-              <a:cs typeface="+mn-cs"/>
-            </a:defRPr>
-          </a:lvl6pPr>
-          <a:lvl7pPr marL="2743200" algn="l" defTabSz="457200" rtl="0" eaLnBrk="1" latinLnBrk="0" hangingPunct="1">
-            <a:defRPr sz="1800" kern="1200">
-              <a:solidFill>
-                <a:schemeClr val="tx1"/>
-              </a:solidFill>
-              <a:latin typeface="+mn-lt"/>
-              <a:ea typeface="+mn-ea"/>
-              <a:cs typeface="+mn-cs"/>
-            </a:defRPr>
-          </a:lvl7pPr>
-          <a:lvl8pPr marL="3200400" algn="l" defTabSz="457200" rtl="0" eaLnBrk="1" latinLnBrk="0" hangingPunct="1">
-            <a:defRPr sz="1800" kern="1200">
-              <a:solidFill>
-                <a:schemeClr val="tx1"/>
-              </a:solidFill>
-              <a:latin typeface="+mn-lt"/>
-              <a:ea typeface="+mn-ea"/>
-              <a:cs typeface="+mn-cs"/>
-            </a:defRPr>
-          </a:lvl8pPr>
-          <a:lvl9pPr marL="3657600" algn="l" defTabSz="457200" rtl="0" eaLnBrk="1" latinLnBrk="0" hangingPunct="1">
-            <a:defRPr sz="1800" kern="1200">
-              <a:solidFill>
-                <a:schemeClr val="tx1"/>
-              </a:solidFill>
-              <a:latin typeface="+mn-lt"/>
-              <a:ea typeface="+mn-ea"/>
-              <a:cs typeface="+mn-cs"/>
-            </a:defRPr>
-          </a:lvl9pPr>
-        </a:lstStyle>
-        <a:p xmlns:a="http://schemas.openxmlformats.org/drawingml/2006/main">
-          <a:r>
-            <a:rPr lang="en-US" sz="2400" dirty="0" smtClean="0">
-              <a:solidFill>
-                <a:srgbClr val="FF0000"/>
-              </a:solidFill>
-            </a:rPr>
-            <a:t>3 Crates</a:t>
-          </a:r>
-          <a:endParaRPr lang="en-US" sz="2400" dirty="0">
-            <a:solidFill>
-              <a:srgbClr val="FF0000"/>
-            </a:solidFill>
-          </a:endParaRPr>
-        </a:p>
-      </cdr:txBody>
-    </cdr:sp>
-  </cdr:relSizeAnchor>
-</c:userShapes>
 </file>
 
 <file path=ppt/slideLayouts/slideLayout1.xml><?xml version="1.0" encoding="utf-8"?>
@@ -1014,7 +322,7 @@
           <a:p>
             <a:fld id="{B41FAE2C-98F2-4AEB-9028-7681F5825C1E}" type="datetimeFigureOut">
               <a:rPr lang="en-US" smtClean="0"/>
-              <a:t>11/10/2015</a:t>
+              <a:t>11/11/2015</a:t>
             </a:fld>
             <a:endParaRPr lang="en-US"/>
           </a:p>
@@ -1187,7 +495,7 @@
           <a:p>
             <a:fld id="{B41FAE2C-98F2-4AEB-9028-7681F5825C1E}" type="datetimeFigureOut">
               <a:rPr lang="en-US" smtClean="0"/>
-              <a:t>11/10/2015</a:t>
+              <a:t>11/11/2015</a:t>
             </a:fld>
             <a:endParaRPr lang="en-US"/>
           </a:p>
@@ -1377,7 +685,7 @@
           <a:p>
             <a:fld id="{B41FAE2C-98F2-4AEB-9028-7681F5825C1E}" type="datetimeFigureOut">
               <a:rPr lang="en-US" smtClean="0"/>
-              <a:t>11/10/2015</a:t>
+              <a:t>11/11/2015</a:t>
             </a:fld>
             <a:endParaRPr lang="en-US"/>
           </a:p>
@@ -1634,7 +942,7 @@
                 </a:solidFill>
               </a:rPr>
               <a:pPr/>
-              <a:t>11/10/2015</a:t>
+              <a:t>11/11/2015</a:t>
             </a:fld>
             <a:endParaRPr lang="en-US">
               <a:solidFill>
@@ -1842,7 +1150,7 @@
                 </a:solidFill>
               </a:rPr>
               <a:pPr/>
-              <a:t>11/10/2015</a:t>
+              <a:t>11/11/2015</a:t>
             </a:fld>
             <a:endParaRPr lang="en-US">
               <a:solidFill>
@@ -2126,7 +1434,7 @@
                 </a:solidFill>
               </a:rPr>
               <a:pPr/>
-              <a:t>11/10/2015</a:t>
+              <a:t>11/11/2015</a:t>
             </a:fld>
             <a:endParaRPr lang="en-US">
               <a:solidFill>
@@ -2452,7 +1760,7 @@
                 </a:solidFill>
               </a:rPr>
               <a:pPr/>
-              <a:t>11/10/2015</a:t>
+              <a:t>11/11/2015</a:t>
             </a:fld>
             <a:endParaRPr lang="en-US">
               <a:solidFill>
@@ -2912,7 +2220,7 @@
                 </a:solidFill>
               </a:rPr>
               <a:pPr/>
-              <a:t>11/10/2015</a:t>
+              <a:t>11/11/2015</a:t>
             </a:fld>
             <a:endParaRPr lang="en-US">
               <a:solidFill>
@@ -3068,7 +2376,7 @@
                 </a:solidFill>
               </a:rPr>
               <a:pPr/>
-              <a:t>11/10/2015</a:t>
+              <a:t>11/11/2015</a:t>
             </a:fld>
             <a:endParaRPr lang="en-US">
               <a:solidFill>
@@ -3201,7 +2509,7 @@
                 </a:solidFill>
               </a:rPr>
               <a:pPr/>
-              <a:t>11/10/2015</a:t>
+              <a:t>11/11/2015</a:t>
             </a:fld>
             <a:endParaRPr lang="en-US">
               <a:solidFill>
@@ -3516,7 +2824,7 @@
                 </a:solidFill>
               </a:rPr>
               <a:pPr/>
-              <a:t>11/10/2015</a:t>
+              <a:t>11/11/2015</a:t>
             </a:fld>
             <a:endParaRPr lang="en-US">
               <a:solidFill>
@@ -3719,7 +3027,7 @@
           <a:p>
             <a:fld id="{B41FAE2C-98F2-4AEB-9028-7681F5825C1E}" type="datetimeFigureOut">
               <a:rPr lang="en-US" smtClean="0"/>
-              <a:t>11/10/2015</a:t>
+              <a:t>11/11/2015</a:t>
             </a:fld>
             <a:endParaRPr lang="en-US"/>
           </a:p>
@@ -3984,7 +3292,7 @@
                 </a:solidFill>
               </a:rPr>
               <a:pPr/>
-              <a:t>11/10/2015</a:t>
+              <a:t>11/11/2015</a:t>
             </a:fld>
             <a:endParaRPr lang="en-US">
               <a:solidFill>
@@ -4192,7 +3500,7 @@
                 </a:solidFill>
               </a:rPr>
               <a:pPr/>
-              <a:t>11/10/2015</a:t>
+              <a:t>11/11/2015</a:t>
             </a:fld>
             <a:endParaRPr lang="en-US">
               <a:solidFill>
@@ -4410,7 +3718,7 @@
                 </a:solidFill>
               </a:rPr>
               <a:pPr/>
-              <a:t>11/10/2015</a:t>
+              <a:t>11/11/2015</a:t>
             </a:fld>
             <a:endParaRPr lang="en-US">
               <a:solidFill>
@@ -4689,7 +3997,7 @@
           <a:p>
             <a:fld id="{B41FAE2C-98F2-4AEB-9028-7681F5825C1E}" type="datetimeFigureOut">
               <a:rPr lang="en-US" smtClean="0"/>
-              <a:t>11/10/2015</a:t>
+              <a:t>11/11/2015</a:t>
             </a:fld>
             <a:endParaRPr lang="en-US"/>
           </a:p>
@@ -4980,7 +4288,7 @@
           <a:p>
             <a:fld id="{B41FAE2C-98F2-4AEB-9028-7681F5825C1E}" type="datetimeFigureOut">
               <a:rPr lang="en-US" smtClean="0"/>
-              <a:t>11/10/2015</a:t>
+              <a:t>11/11/2015</a:t>
             </a:fld>
             <a:endParaRPr lang="en-US"/>
           </a:p>
@@ -5405,7 +4713,7 @@
           <a:p>
             <a:fld id="{B41FAE2C-98F2-4AEB-9028-7681F5825C1E}" type="datetimeFigureOut">
               <a:rPr lang="en-US" smtClean="0"/>
-              <a:t>11/10/2015</a:t>
+              <a:t>11/11/2015</a:t>
             </a:fld>
             <a:endParaRPr lang="en-US"/>
           </a:p>
@@ -5533,7 +4841,7 @@
           <a:p>
             <a:fld id="{B41FAE2C-98F2-4AEB-9028-7681F5825C1E}" type="datetimeFigureOut">
               <a:rPr lang="en-US" smtClean="0"/>
-              <a:t>11/10/2015</a:t>
+              <a:t>11/11/2015</a:t>
             </a:fld>
             <a:endParaRPr lang="en-US"/>
           </a:p>
@@ -5638,7 +4946,7 @@
           <a:p>
             <a:fld id="{B41FAE2C-98F2-4AEB-9028-7681F5825C1E}" type="datetimeFigureOut">
               <a:rPr lang="en-US" smtClean="0"/>
-              <a:t>11/10/2015</a:t>
+              <a:t>11/11/2015</a:t>
             </a:fld>
             <a:endParaRPr lang="en-US"/>
           </a:p>
@@ -5925,7 +5233,7 @@
           <a:p>
             <a:fld id="{B41FAE2C-98F2-4AEB-9028-7681F5825C1E}" type="datetimeFigureOut">
               <a:rPr lang="en-US" smtClean="0"/>
-              <a:t>11/10/2015</a:t>
+              <a:t>11/11/2015</a:t>
             </a:fld>
             <a:endParaRPr lang="en-US"/>
           </a:p>
@@ -6192,7 +5500,7 @@
           <a:p>
             <a:fld id="{B41FAE2C-98F2-4AEB-9028-7681F5825C1E}" type="datetimeFigureOut">
               <a:rPr lang="en-US" smtClean="0"/>
-              <a:t>11/10/2015</a:t>
+              <a:t>11/11/2015</a:t>
             </a:fld>
             <a:endParaRPr lang="en-US"/>
           </a:p>
@@ -6420,7 +5728,7 @@
           <a:p>
             <a:fld id="{B41FAE2C-98F2-4AEB-9028-7681F5825C1E}" type="datetimeFigureOut">
               <a:rPr lang="en-US" smtClean="0"/>
-              <a:t>11/10/2015</a:t>
+              <a:t>11/11/2015</a:t>
             </a:fld>
             <a:endParaRPr lang="en-US"/>
           </a:p>
@@ -6898,7 +6206,7 @@
                 </a:solidFill>
               </a:rPr>
               <a:pPr defTabSz="457200"/>
-              <a:t>11/10/2015</a:t>
+              <a:t>11/11/2015</a:t>
             </a:fld>
             <a:endParaRPr lang="en-US" dirty="0">
               <a:solidFill>
@@ -7573,7 +6881,7 @@
           <a:p>
             <a:fld id="{B41FAE2C-98F2-4AEB-9028-7681F5825C1E}" type="datetimeFigureOut">
               <a:rPr lang="en-US" smtClean="0"/>
-              <a:t>11/10/2015</a:t>
+              <a:t>11/11/2015</a:t>
             </a:fld>
             <a:endParaRPr lang="en-US"/>
           </a:p>
@@ -8173,7 +7481,7 @@
           <a:p>
             <a:fld id="{B41FAE2C-98F2-4AEB-9028-7681F5825C1E}" type="datetimeFigureOut">
               <a:rPr lang="en-US" smtClean="0"/>
-              <a:t>11/10/2015</a:t>
+              <a:t>11/11/2015</a:t>
             </a:fld>
             <a:endParaRPr lang="en-US"/>
           </a:p>
@@ -8362,7 +7670,7 @@
           <a:p>
             <a:fld id="{B41FAE2C-98F2-4AEB-9028-7681F5825C1E}" type="datetimeFigureOut">
               <a:rPr lang="en-US" smtClean="0"/>
-              <a:t>11/10/2015</a:t>
+              <a:t>11/11/2015</a:t>
             </a:fld>
             <a:endParaRPr lang="en-US"/>
           </a:p>
@@ -8589,7 +7897,7 @@
           <a:p>
             <a:fld id="{B41FAE2C-98F2-4AEB-9028-7681F5825C1E}" type="datetimeFigureOut">
               <a:rPr lang="en-US" smtClean="0"/>
-              <a:t>11/10/2015</a:t>
+              <a:t>11/11/2015</a:t>
             </a:fld>
             <a:endParaRPr lang="en-US"/>
           </a:p>
@@ -8729,7 +8037,7 @@
           <a:p>
             <a:fld id="{B41FAE2C-98F2-4AEB-9028-7681F5825C1E}" type="datetimeFigureOut">
               <a:rPr lang="en-US" smtClean="0"/>
-              <a:t>11/10/2015</a:t>
+              <a:t>11/11/2015</a:t>
             </a:fld>
             <a:endParaRPr lang="en-US"/>
           </a:p>
@@ -9063,7 +8371,7 @@
           <a:p>
             <a:fld id="{B41FAE2C-98F2-4AEB-9028-7681F5825C1E}" type="datetimeFigureOut">
               <a:rPr lang="en-US" smtClean="0"/>
-              <a:t>11/10/2015</a:t>
+              <a:t>11/11/2015</a:t>
             </a:fld>
             <a:endParaRPr lang="en-US"/>
           </a:p>
@@ -9163,28 +8471,28 @@
                 <a:gridCol w="2286000">
                   <a:extLst>
                     <a:ext uri="{9D8B030D-6E8A-4147-A177-3AD203B41FA5}">
-                      <a16:colId xmlns:a16="http://schemas.microsoft.com/office/drawing/2014/main" xmlns="" val="2383147881"/>
+                      <a16:colId xmlns="" xmlns:a16="http://schemas.microsoft.com/office/drawing/2014/main" val="2383147881"/>
                     </a:ext>
                   </a:extLst>
                 </a:gridCol>
                 <a:gridCol w="2209800">
                   <a:extLst>
                     <a:ext uri="{9D8B030D-6E8A-4147-A177-3AD203B41FA5}">
-                      <a16:colId xmlns:a16="http://schemas.microsoft.com/office/drawing/2014/main" xmlns="" val="3539225061"/>
+                      <a16:colId xmlns="" xmlns:a16="http://schemas.microsoft.com/office/drawing/2014/main" val="3539225061"/>
                     </a:ext>
                   </a:extLst>
                 </a:gridCol>
                 <a:gridCol w="2209800">
                   <a:extLst>
                     <a:ext uri="{9D8B030D-6E8A-4147-A177-3AD203B41FA5}">
-                      <a16:colId xmlns:a16="http://schemas.microsoft.com/office/drawing/2014/main" xmlns="" val="449586720"/>
+                      <a16:colId xmlns="" xmlns:a16="http://schemas.microsoft.com/office/drawing/2014/main" val="449586720"/>
                     </a:ext>
                   </a:extLst>
                 </a:gridCol>
                 <a:gridCol w="2057400">
                   <a:extLst>
                     <a:ext uri="{9D8B030D-6E8A-4147-A177-3AD203B41FA5}">
-                      <a16:colId xmlns:a16="http://schemas.microsoft.com/office/drawing/2014/main" xmlns="" val="3861353694"/>
+                      <a16:colId xmlns="" xmlns:a16="http://schemas.microsoft.com/office/drawing/2014/main" val="3861353694"/>
                     </a:ext>
                   </a:extLst>
                 </a:gridCol>
@@ -9296,7 +8604,7 @@
                 </a:tc>
                 <a:extLst>
                   <a:ext uri="{0D108BD9-81ED-4DB2-BD59-A6C34878D82A}">
-                    <a16:rowId xmlns:a16="http://schemas.microsoft.com/office/drawing/2014/main" xmlns="" val="660863743"/>
+                    <a16:rowId xmlns="" xmlns:a16="http://schemas.microsoft.com/office/drawing/2014/main" val="660863743"/>
                   </a:ext>
                 </a:extLst>
               </a:tr>
@@ -9453,15 +8761,7 @@
                       </a:pPr>
                       <a:r>
                         <a:rPr lang="en-US" sz="1600" dirty="0" smtClean="0"/>
-                        <a:t>Test MPD optical </a:t>
-                      </a:r>
-                      <a:r>
-                        <a:rPr lang="en-US" sz="1600" dirty="0" smtClean="0"/>
-                        <a:t>readout (SSP)</a:t>
-                      </a:r>
-                      <a:r>
-                        <a:rPr lang="en-US" sz="1600" dirty="0" smtClean="0"/>
-                        <a:t/>
+                        <a:t>Test MPD optical readout (SSP)</a:t>
                       </a:r>
                       <a:br>
                         <a:rPr lang="en-US" sz="1600" dirty="0" smtClean="0"/>
@@ -9703,11 +9003,7 @@
                       </a:r>
                       <a:r>
                         <a:rPr lang="en-US" dirty="0" smtClean="0"/>
-                        <a:t> </a:t>
-                      </a:r>
-                      <a:r>
-                        <a:rPr lang="en-US" dirty="0" smtClean="0"/>
-                        <a:t>and FADC setup</a:t>
+                        <a:t> and FADC setup</a:t>
                       </a:r>
                     </a:p>
                     <a:p>
@@ -9731,11 +9027,7 @@
                       </a:pPr>
                       <a:r>
                         <a:rPr lang="en-US" dirty="0" smtClean="0"/>
-                        <a:t>Tritium </a:t>
-                      </a:r>
-                      <a:r>
-                        <a:rPr lang="en-US" dirty="0" smtClean="0"/>
-                        <a:t>experiment</a:t>
+                        <a:t>Tritium experiment</a:t>
                       </a:r>
                     </a:p>
                     <a:p>
@@ -9757,11 +9049,7 @@
                       </a:r>
                       <a:r>
                         <a:rPr lang="en-US" dirty="0" smtClean="0"/>
-                        <a:t> </a:t>
-                      </a:r>
-                      <a:r>
-                        <a:rPr lang="en-US" dirty="0" smtClean="0"/>
-                        <a:t>and FADC setup</a:t>
+                        <a:t> and FADC setup</a:t>
                       </a:r>
                     </a:p>
                     <a:p>
@@ -9776,7 +9064,7 @@
                 </a:tc>
                 <a:extLst>
                   <a:ext uri="{0D108BD9-81ED-4DB2-BD59-A6C34878D82A}">
-                    <a16:rowId xmlns:a16="http://schemas.microsoft.com/office/drawing/2014/main" xmlns="" val="85563496"/>
+                    <a16:rowId xmlns="" xmlns:a16="http://schemas.microsoft.com/office/drawing/2014/main" val="85563496"/>
                   </a:ext>
                 </a:extLst>
               </a:tr>
@@ -9829,7 +9117,7 @@
           <a:p>
             <a:fld id="{B41FAE2C-98F2-4AEB-9028-7681F5825C1E}" type="datetimeFigureOut">
               <a:rPr lang="en-US" smtClean="0"/>
-              <a:t>11/10/2015</a:t>
+              <a:t>11/11/2015</a:t>
             </a:fld>
             <a:endParaRPr lang="en-US"/>
           </a:p>
@@ -10159,7 +9447,7 @@
           <a:p>
             <a:fld id="{B41FAE2C-98F2-4AEB-9028-7681F5825C1E}" type="datetimeFigureOut">
               <a:rPr lang="en-US" smtClean="0"/>
-              <a:t>11/10/2015</a:t>
+              <a:t>11/11/2015</a:t>
             </a:fld>
             <a:endParaRPr lang="en-US"/>
           </a:p>
@@ -10384,7 +9672,7 @@
           <a:p>
             <a:fld id="{B41FAE2C-98F2-4AEB-9028-7681F5825C1E}" type="datetimeFigureOut">
               <a:rPr lang="en-US" smtClean="0"/>
-              <a:t>11/10/2015</a:t>
+              <a:t>11/11/2015</a:t>
             </a:fld>
             <a:endParaRPr lang="en-US"/>
           </a:p>
@@ -10560,7 +9848,7 @@
           <a:p>
             <a:fld id="{B41FAE2C-98F2-4AEB-9028-7681F5825C1E}" type="datetimeFigureOut">
               <a:rPr lang="en-US" smtClean="0"/>
-              <a:t>11/10/2015</a:t>
+              <a:t>11/11/2015</a:t>
             </a:fld>
             <a:endParaRPr lang="en-US"/>
           </a:p>
@@ -10654,8 +9942,8 @@
           </a:p>
         </p:txBody>
       </p:sp>
-      <mc:AlternateContent xmlns:mc="http://schemas.openxmlformats.org/markup-compatibility/2006">
-        <mc:Choice xmlns:a14="http://schemas.microsoft.com/office/drawing/2010/main" Requires="a14">
+      <mc:AlternateContent xmlns:mc="http://schemas.openxmlformats.org/markup-compatibility/2006" xmlns:a14="http://schemas.microsoft.com/office/drawing/2010/main">
+        <mc:Choice Requires="a14">
           <p:sp>
             <p:nvSpPr>
               <p:cNvPr id="3" name="Content Placeholder 2"/>
@@ -10882,17 +10170,12 @@
                   <a:rPr lang="en-US" dirty="0" smtClean="0"/>
                   <a:t>VME</a:t>
                 </a:r>
-                <a:endParaRPr lang="en-US" dirty="0" smtClean="0"/>
               </a:p>
               <a:p>
                 <a:pPr lvl="1"/>
                 <a:r>
                   <a:rPr lang="en-US" dirty="0" smtClean="0"/>
-                  <a:t>HCAL as neutron detector using FADC and high resolution </a:t>
-                </a:r>
-                <a:r>
-                  <a:rPr lang="en-US" dirty="0" smtClean="0"/>
-                  <a:t>TDC</a:t>
+                  <a:t>HCAL as neutron detector using FADC and high resolution TDC</a:t>
                 </a:r>
               </a:p>
               <a:p>
@@ -10905,7 +10188,7 @@
             </p:txBody>
           </p:sp>
         </mc:Choice>
-        <mc:Fallback>
+        <mc:Fallback xmlns="">
           <p:sp>
             <p:nvSpPr>
               <p:cNvPr id="3" name="Content Placeholder 2"/>
@@ -10965,7 +10248,7 @@
           <a:p>
             <a:fld id="{B41FAE2C-98F2-4AEB-9028-7681F5825C1E}" type="datetimeFigureOut">
               <a:rPr lang="en-US" smtClean="0"/>
-              <a:t>11/10/2015</a:t>
+              <a:t>11/11/2015</a:t>
             </a:fld>
             <a:endParaRPr lang="en-US"/>
           </a:p>
@@ -11177,7 +10460,7 @@
           <a:p>
             <a:fld id="{B41FAE2C-98F2-4AEB-9028-7681F5825C1E}" type="datetimeFigureOut">
               <a:rPr lang="en-US" smtClean="0"/>
-              <a:t>11/10/2015</a:t>
+              <a:t>11/11/2015</a:t>
             </a:fld>
             <a:endParaRPr lang="en-US"/>
           </a:p>
@@ -11941,7 +11224,7 @@
           <a:p>
             <a:fld id="{B41FAE2C-98F2-4AEB-9028-7681F5825C1E}" type="datetimeFigureOut">
               <a:rPr lang="en-US" smtClean="0"/>
-              <a:t>11/10/2015</a:t>
+              <a:t>11/11/2015</a:t>
             </a:fld>
             <a:endParaRPr lang="en-US"/>
           </a:p>
@@ -12566,7 +11849,7 @@
           <a:p>
             <a:fld id="{B41FAE2C-98F2-4AEB-9028-7681F5825C1E}" type="datetimeFigureOut">
               <a:rPr lang="en-US" smtClean="0"/>
-              <a:t>11/10/2015</a:t>
+              <a:t>11/11/2015</a:t>
             </a:fld>
             <a:endParaRPr lang="en-US" dirty="0"/>
           </a:p>
@@ -17046,7 +16329,7 @@
           <a:p>
             <a:fld id="{B41FAE2C-98F2-4AEB-9028-7681F5825C1E}" type="datetimeFigureOut">
               <a:rPr lang="en-US" smtClean="0"/>
-              <a:t>11/10/2015</a:t>
+              <a:t>11/11/2015</a:t>
             </a:fld>
             <a:endParaRPr lang="en-US" dirty="0"/>
           </a:p>
@@ -17374,179 +16657,52 @@
           <a:p>
             <a:r>
               <a:rPr lang="en-US" dirty="0" smtClean="0"/>
-              <a:t>Trigger Switching</a:t>
+              <a:t>Single Crate vs. Trigger Switching</a:t>
             </a:r>
             <a:endParaRPr lang="en-US" dirty="0"/>
           </a:p>
         </p:txBody>
       </p:sp>
-      <p:cxnSp>
-        <p:nvCxnSpPr>
-          <p:cNvPr id="11" name="Elbow Connector 10"/>
-          <p:cNvCxnSpPr/>
+      <p:pic>
+        <p:nvPicPr>
+          <p:cNvPr id="4" name="Picture 3" descr="Switching_FixedReadout_v2_nomodel.pdf"/>
+          <p:cNvPicPr>
+            <a:picLocks noChangeAspect="1"/>
+          </p:cNvPicPr>
           <p:nvPr/>
-        </p:nvCxnSpPr>
-        <p:spPr>
-          <a:xfrm rot="5400000" flipH="1" flipV="1">
-            <a:off x="3027158" y="5607076"/>
-            <a:ext cx="420127" cy="200566"/>
-          </a:xfrm>
-          <a:prstGeom prst="bentConnector3">
-            <a:avLst>
-              <a:gd name="adj1" fmla="val 2223"/>
-            </a:avLst>
-          </a:prstGeom>
-          <a:ln>
-            <a:solidFill>
-              <a:srgbClr val="800000"/>
-            </a:solidFill>
-            <a:tailEnd type="arrow"/>
-          </a:ln>
-          <a:effectLst/>
-        </p:spPr>
-        <p:style>
-          <a:lnRef idx="2">
-            <a:schemeClr val="accent1"/>
-          </a:lnRef>
-          <a:fillRef idx="0">
-            <a:schemeClr val="accent1"/>
-          </a:fillRef>
-          <a:effectRef idx="1">
-            <a:schemeClr val="accent1"/>
-          </a:effectRef>
-          <a:fontRef idx="minor">
-            <a:schemeClr val="tx1"/>
-          </a:fontRef>
-        </p:style>
-      </p:cxnSp>
-      <p:sp>
-        <p:nvSpPr>
-          <p:cNvPr id="12" name="TextBox 11"/>
-          <p:cNvSpPr txBox="1"/>
+        </p:nvPicPr>
+        <p:blipFill>
+          <a:blip r:embed="rId2">
+            <a:extLst>
+              <a:ext uri="{28A0092B-C50C-407E-A947-70E740481C1C}">
+                <a14:useLocalDpi xmlns:a14="http://schemas.microsoft.com/office/drawing/2010/main" val="0"/>
+              </a:ext>
+            </a:extLst>
+          </a:blip>
+          <a:stretch>
+            <a:fillRect/>
+          </a:stretch>
+        </p:blipFill>
+        <p:spPr>
+          <a:xfrm>
+            <a:off x="888366" y="1643884"/>
+            <a:ext cx="7195429" cy="4388572"/>
+          </a:xfrm>
+          <a:prstGeom prst="rect">
+            <a:avLst/>
+          </a:prstGeom>
+        </p:spPr>
+      </p:pic>
+      <p:sp>
+        <p:nvSpPr>
+          <p:cNvPr id="5" name="Rectangle 4"/>
+          <p:cNvSpPr/>
           <p:nvPr/>
         </p:nvSpPr>
         <p:spPr>
           <a:xfrm>
-            <a:off x="1155738" y="5707359"/>
-            <a:ext cx="2273262" cy="369332"/>
-          </a:xfrm>
-          <a:prstGeom prst="rect">
-            <a:avLst/>
-          </a:prstGeom>
-          <a:noFill/>
-        </p:spPr>
-        <p:txBody>
-          <a:bodyPr wrap="square" rtlCol="0">
-            <a:spAutoFit/>
-          </a:bodyPr>
-          <a:lstStyle/>
-          <a:p>
-            <a:r>
-              <a:rPr lang="en-US" dirty="0" smtClean="0">
-                <a:solidFill>
-                  <a:srgbClr val="800000"/>
-                </a:solidFill>
-              </a:rPr>
-              <a:t>Expected ~ 5000 Hz</a:t>
-            </a:r>
-            <a:endParaRPr lang="en-US" dirty="0">
-              <a:solidFill>
-                <a:srgbClr val="800000"/>
-              </a:solidFill>
-            </a:endParaRPr>
-          </a:p>
-        </p:txBody>
-      </p:sp>
-      <p:sp>
-        <p:nvSpPr>
-          <p:cNvPr id="15" name="Date Placeholder 6"/>
-          <p:cNvSpPr>
-            <a:spLocks noGrp="1"/>
-          </p:cNvSpPr>
-          <p:nvPr>
-            <p:ph type="dt" sz="half" idx="10"/>
-          </p:nvPr>
-        </p:nvSpPr>
-        <p:spPr>
-          <a:xfrm>
-            <a:off x="3505200" y="6394375"/>
-            <a:ext cx="2133600" cy="365125"/>
-          </a:xfrm>
-        </p:spPr>
-        <p:txBody>
-          <a:bodyPr/>
-          <a:lstStyle/>
-          <a:p>
-            <a:fld id="{B41FAE2C-98F2-4AEB-9028-7681F5825C1E}" type="datetimeFigureOut">
-              <a:rPr lang="en-US" smtClean="0"/>
-              <a:t>11/10/2015</a:t>
-            </a:fld>
-            <a:endParaRPr lang="en-US"/>
-          </a:p>
-        </p:txBody>
-      </p:sp>
-      <p:sp>
-        <p:nvSpPr>
-          <p:cNvPr id="17" name="Slide Number Placeholder 8"/>
-          <p:cNvSpPr>
-            <a:spLocks noGrp="1"/>
-          </p:cNvSpPr>
-          <p:nvPr>
-            <p:ph type="sldNum" sz="quarter" idx="12"/>
-          </p:nvPr>
-        </p:nvSpPr>
-        <p:spPr>
-          <a:xfrm>
-            <a:off x="3505200" y="6645425"/>
-            <a:ext cx="2133600" cy="190125"/>
-          </a:xfrm>
-        </p:spPr>
-        <p:txBody>
-          <a:bodyPr/>
-          <a:lstStyle/>
-          <a:p>
-            <a:fld id="{123908D8-EB8A-4839-B5DA-E27DEBBAC624}" type="slidenum">
-              <a:rPr lang="en-US" smtClean="0"/>
-              <a:t>8</a:t>
-            </a:fld>
-            <a:endParaRPr lang="en-US"/>
-          </a:p>
-        </p:txBody>
-      </p:sp>
-      <p:graphicFrame>
-        <p:nvGraphicFramePr>
-          <p:cNvPr id="16" name="Chart 15"/>
-          <p:cNvGraphicFramePr>
-            <a:graphicFrameLocks/>
-          </p:cNvGraphicFramePr>
-          <p:nvPr>
-            <p:extLst>
-              <p:ext uri="{D42A27DB-BD31-4B8C-83A1-F6EECF244321}">
-                <p14:modId xmlns:p14="http://schemas.microsoft.com/office/powerpoint/2010/main" val="3926317630"/>
-              </p:ext>
-            </p:extLst>
-          </p:nvPr>
-        </p:nvGraphicFramePr>
-        <p:xfrm>
-          <a:off x="500575" y="1297299"/>
-          <a:ext cx="7652825" cy="4951101"/>
-        </p:xfrm>
-        <a:graphic>
-          <a:graphicData uri="http://schemas.openxmlformats.org/drawingml/2006/chart">
-            <c:chart xmlns:c="http://schemas.openxmlformats.org/drawingml/2006/chart" xmlns:r="http://schemas.openxmlformats.org/officeDocument/2006/relationships" r:id="rId2"/>
-          </a:graphicData>
-        </a:graphic>
-      </p:graphicFrame>
-      <p:sp>
-        <p:nvSpPr>
-          <p:cNvPr id="13" name="TextBox 12"/>
-          <p:cNvSpPr txBox="1"/>
-          <p:nvPr/>
-        </p:nvSpPr>
-        <p:spPr>
-          <a:xfrm>
-            <a:off x="1676400" y="1524000"/>
-            <a:ext cx="2304618" cy="923330"/>
+            <a:off x="758703" y="990600"/>
+            <a:ext cx="7626595" cy="923330"/>
           </a:xfrm>
           <a:prstGeom prst="rect">
             <a:avLst/>
@@ -17556,240 +16712,55 @@
           </a:solidFill>
         </p:spPr>
         <p:txBody>
-          <a:bodyPr wrap="square" rtlCol="0">
+          <a:bodyPr wrap="square">
             <a:spAutoFit/>
           </a:bodyPr>
           <a:lstStyle/>
           <a:p>
+            <a:pPr algn="ctr"/>
             <a:r>
               <a:rPr lang="en-US" dirty="0" smtClean="0"/>
-              <a:t>Dead time at</a:t>
-            </a:r>
-          </a:p>
-          <a:p>
+              <a:t>Readout trigger rate ~ 5 kHz</a:t>
+            </a:r>
+          </a:p>
+          <a:p>
+            <a:pPr algn="ctr"/>
             <a:r>
               <a:rPr lang="en-US" dirty="0" smtClean="0"/>
-              <a:t>Readout ~5kHz</a:t>
-            </a:r>
-          </a:p>
-          <a:p>
+              <a:t>Buffer </a:t>
+            </a:r>
+            <a:r>
+              <a:rPr lang="en-US" dirty="0"/>
+              <a:t>Level = </a:t>
+            </a:r>
             <a:r>
               <a:rPr lang="en-US" dirty="0" smtClean="0"/>
-              <a:t>D</a:t>
-            </a:r>
-            <a:r>
-              <a:rPr lang="en-US" baseline="-25000" dirty="0"/>
-              <a:t>3</a:t>
-            </a:r>
+              <a:t>4</a:t>
+            </a:r>
+          </a:p>
+          <a:p>
+            <a:pPr algn="ctr"/>
             <a:r>
               <a:rPr lang="en-US" dirty="0" smtClean="0"/>
-              <a:t> ~6%</a:t>
-            </a:r>
-            <a:endParaRPr lang="en-US" dirty="0"/>
-          </a:p>
-        </p:txBody>
-      </p:sp>
-      <p:grpSp>
-        <p:nvGrpSpPr>
-          <p:cNvPr id="8" name="Group 7"/>
-          <p:cNvGrpSpPr/>
-          <p:nvPr/>
-        </p:nvGrpSpPr>
-        <p:grpSpPr>
-          <a:xfrm>
-            <a:off x="3429000" y="1676400"/>
-            <a:ext cx="1592560" cy="595836"/>
-            <a:chOff x="3962400" y="1524000"/>
-            <a:chExt cx="1592560" cy="595836"/>
-          </a:xfrm>
-        </p:grpSpPr>
-        <p:sp>
-          <p:nvSpPr>
-            <p:cNvPr id="4" name="Rounded Rectangle 3"/>
-            <p:cNvSpPr/>
-            <p:nvPr/>
-          </p:nvSpPr>
-          <p:spPr>
-            <a:xfrm>
-              <a:off x="3962400" y="1524000"/>
-              <a:ext cx="1592560" cy="595836"/>
-            </a:xfrm>
-            <a:prstGeom prst="roundRect">
-              <a:avLst/>
-            </a:prstGeom>
-            <a:solidFill>
-              <a:schemeClr val="bg1"/>
-            </a:solidFill>
-            <a:ln w="38100" cmpd="sng">
-              <a:solidFill>
-                <a:srgbClr val="800000"/>
-              </a:solidFill>
-            </a:ln>
-            <a:effectLst/>
-          </p:spPr>
-          <p:style>
-            <a:lnRef idx="1">
-              <a:schemeClr val="accent1"/>
-            </a:lnRef>
-            <a:fillRef idx="3">
-              <a:schemeClr val="accent1"/>
-            </a:fillRef>
-            <a:effectRef idx="2">
-              <a:schemeClr val="accent1"/>
-            </a:effectRef>
-            <a:fontRef idx="minor">
-              <a:schemeClr val="lt1"/>
-            </a:fontRef>
-          </p:style>
-          <p:txBody>
-            <a:bodyPr rtlCol="0" anchor="ctr"/>
-            <a:lstStyle/>
-            <a:p>
-              <a:pPr algn="ctr"/>
-              <a:endParaRPr lang="en-US"/>
-            </a:p>
-          </p:txBody>
-        </p:sp>
-        <p:sp>
-          <p:nvSpPr>
-            <p:cNvPr id="14" name="TextBox 13"/>
-            <p:cNvSpPr txBox="1"/>
-            <p:nvPr/>
-          </p:nvSpPr>
-          <p:spPr>
-            <a:xfrm>
-              <a:off x="4051729" y="1595735"/>
-              <a:ext cx="1429182" cy="461665"/>
-            </a:xfrm>
-            <a:prstGeom prst="rect">
-              <a:avLst/>
-            </a:prstGeom>
-            <a:solidFill>
-              <a:schemeClr val="bg1"/>
-            </a:solidFill>
-          </p:spPr>
-          <p:txBody>
-            <a:bodyPr wrap="square" rtlCol="0">
-              <a:spAutoFit/>
-            </a:bodyPr>
-            <a:lstStyle/>
-            <a:p>
-              <a:pPr algn="ctr"/>
-              <a:r>
-                <a:rPr lang="en-US" sz="2400" dirty="0" smtClean="0"/>
-                <a:t>D</a:t>
-              </a:r>
-              <a:r>
-                <a:rPr lang="en-US" sz="2400" baseline="-25000" dirty="0" smtClean="0"/>
-                <a:t>3 </a:t>
-              </a:r>
-              <a:r>
-                <a:rPr lang="en-US" sz="2400" dirty="0" smtClean="0"/>
-                <a:t> ~ (D</a:t>
-              </a:r>
-              <a:r>
-                <a:rPr lang="en-US" sz="2400" baseline="-25000" dirty="0"/>
-                <a:t>1</a:t>
-              </a:r>
-              <a:r>
-                <a:rPr lang="en-US" sz="2400" dirty="0" smtClean="0"/>
-                <a:t>)</a:t>
-              </a:r>
-              <a:r>
-                <a:rPr lang="en-US" sz="2400" baseline="30000" dirty="0" smtClean="0"/>
-                <a:t>3</a:t>
-              </a:r>
-              <a:r>
-                <a:rPr lang="en-US" sz="2400" dirty="0" smtClean="0"/>
-                <a:t> </a:t>
-              </a:r>
-              <a:endParaRPr lang="en-US" sz="2400" dirty="0"/>
-            </a:p>
-          </p:txBody>
-        </p:sp>
-      </p:grpSp>
-      <p:sp>
-        <p:nvSpPr>
-          <p:cNvPr id="22" name="Rectangle 21"/>
-          <p:cNvSpPr/>
-          <p:nvPr/>
-        </p:nvSpPr>
-        <p:spPr>
-          <a:xfrm>
-            <a:off x="791230" y="989929"/>
-            <a:ext cx="3243837" cy="369332"/>
-          </a:xfrm>
-          <a:prstGeom prst="rect">
-            <a:avLst/>
-          </a:prstGeom>
-        </p:spPr>
-        <p:txBody>
-          <a:bodyPr wrap="none">
-            <a:spAutoFit/>
-          </a:bodyPr>
-          <a:lstStyle/>
-          <a:p>
-            <a:r>
-              <a:rPr lang="en-US" b="1" dirty="0"/>
-              <a:t>No pedestal suppression (8ADC)</a:t>
-            </a:r>
-          </a:p>
-        </p:txBody>
-      </p:sp>
-      <p:sp>
-        <p:nvSpPr>
-          <p:cNvPr id="23" name="Rectangle 22"/>
-          <p:cNvSpPr/>
-          <p:nvPr/>
-        </p:nvSpPr>
-        <p:spPr>
-          <a:xfrm>
-            <a:off x="5715000" y="1005984"/>
-            <a:ext cx="2710294" cy="369332"/>
-          </a:xfrm>
-          <a:prstGeom prst="rect">
-            <a:avLst/>
-          </a:prstGeom>
-        </p:spPr>
-        <p:txBody>
-          <a:bodyPr wrap="none">
-            <a:spAutoFit/>
-          </a:bodyPr>
-          <a:lstStyle/>
-          <a:p>
-            <a:r>
-              <a:rPr lang="en-US" b="1" dirty="0" smtClean="0"/>
-              <a:t>Local </a:t>
-            </a:r>
-            <a:r>
-              <a:rPr lang="en-US" b="1" dirty="0"/>
-              <a:t>trigger rate ~ </a:t>
-            </a:r>
-            <a:r>
-              <a:rPr lang="en-US" b="1" dirty="0" smtClean="0"/>
-              <a:t>100kHz</a:t>
-            </a:r>
-            <a:endParaRPr lang="en-US" b="1" dirty="0"/>
+              <a:t>8ADC - (</a:t>
+            </a:r>
+            <a:r>
+              <a:rPr lang="en-US" dirty="0"/>
+              <a:t>reading pedestals on 6 channels in each ADC)</a:t>
+            </a:r>
           </a:p>
         </p:txBody>
       </p:sp>
     </p:spTree>
     <p:extLst>
       <p:ext uri="{BB962C8B-B14F-4D97-AF65-F5344CB8AC3E}">
-        <p14:creationId xmlns:p14="http://schemas.microsoft.com/office/powerpoint/2010/main" val="86548187"/>
+        <p14:creationId xmlns:p14="http://schemas.microsoft.com/office/powerpoint/2010/main" val="2770918126"/>
       </p:ext>
     </p:extLst>
   </p:cSld>
   <p:clrMapOvr>
     <a:masterClrMapping/>
   </p:clrMapOvr>
-  <p:timing>
-    <p:tnLst>
-      <p:par>
-        <p:cTn id="1" dur="indefinite" restart="never" nodeType="tmRoot"/>
-      </p:par>
-    </p:tnLst>
-  </p:timing>
 </p:sld>
 </file>
 
@@ -17918,7 +16889,7 @@
           <a:p>
             <a:fld id="{B41FAE2C-98F2-4AEB-9028-7681F5825C1E}" type="datetimeFigureOut">
               <a:rPr lang="en-US" smtClean="0"/>
-              <a:t>11/10/2015</a:t>
+              <a:t>11/11/2015</a:t>
             </a:fld>
             <a:endParaRPr lang="en-US"/>
           </a:p>

</xml_diff>